<commit_message>
Fixed User<->UserProfile in ER diagram
</commit_message>
<xml_diff>
--- a/design_spec/design_specification.pptx
+++ b/design_spec/design_specification.pptx
@@ -109,6 +109,11 @@
       </a:defRPr>
     </a:lvl9pPr>
   </p:defaultTextStyle>
+  <p:extLst>
+    <p:ext uri="{EFAFB233-063F-42B5-8137-9DF3F51BA10A}">
+      <p15:sldGuideLst xmlns:p15="http://schemas.microsoft.com/office/powerpoint/2012/main"/>
+    </p:ext>
+  </p:extLst>
 </p:presentation>
 </file>
 
@@ -3051,36 +3056,6 @@
           <a:chExt cx="0" cy="0"/>
         </a:xfrm>
       </p:grpSpPr>
-      <p:pic>
-        <p:nvPicPr>
-          <p:cNvPr id="3" name="Picture 2">
-            <a:extLst>
-              <a:ext uri="{FF2B5EF4-FFF2-40B4-BE49-F238E27FC236}">
-                <a16:creationId xmlns:a16="http://schemas.microsoft.com/office/drawing/2014/main" id="{456A1C26-08EB-4814-B74C-C5EC98D892D3}"/>
-              </a:ext>
-            </a:extLst>
-          </p:cNvPr>
-          <p:cNvPicPr>
-            <a:picLocks noChangeAspect="1"/>
-          </p:cNvPicPr>
-          <p:nvPr/>
-        </p:nvPicPr>
-        <p:blipFill>
-          <a:blip r:embed="rId2"/>
-          <a:stretch>
-            <a:fillRect/>
-          </a:stretch>
-        </p:blipFill>
-        <p:spPr>
-          <a:xfrm>
-            <a:off x="1293342" y="431237"/>
-            <a:ext cx="6754646" cy="2786828"/>
-          </a:xfrm>
-          <a:prstGeom prst="rect">
-            <a:avLst/>
-          </a:prstGeom>
-        </p:spPr>
-      </p:pic>
       <p:graphicFrame>
         <p:nvGraphicFramePr>
           <p:cNvPr id="5" name="Table 4">
@@ -4097,6 +4072,36 @@
           </a:p>
         </p:txBody>
       </p:sp>
+      <p:pic>
+        <p:nvPicPr>
+          <p:cNvPr id="2" name="Picture 1">
+            <a:extLst>
+              <a:ext uri="{FF2B5EF4-FFF2-40B4-BE49-F238E27FC236}">
+                <a16:creationId xmlns:a16="http://schemas.microsoft.com/office/drawing/2014/main" id="{B11341E8-1F2C-4267-A771-6AC9338F2A0C}"/>
+              </a:ext>
+            </a:extLst>
+          </p:cNvPr>
+          <p:cNvPicPr>
+            <a:picLocks noChangeAspect="1"/>
+          </p:cNvPicPr>
+          <p:nvPr/>
+        </p:nvPicPr>
+        <p:blipFill>
+          <a:blip r:embed="rId2"/>
+          <a:stretch>
+            <a:fillRect/>
+          </a:stretch>
+        </p:blipFill>
+        <p:spPr>
+          <a:xfrm>
+            <a:off x="1074949" y="251090"/>
+            <a:ext cx="6994102" cy="2885622"/>
+          </a:xfrm>
+          <a:prstGeom prst="rect">
+            <a:avLst/>
+          </a:prstGeom>
+        </p:spPr>
+      </p:pic>
     </p:spTree>
     <p:extLst>
       <p:ext uri="{BB962C8B-B14F-4D97-AF65-F5344CB8AC3E}">

</xml_diff>

<commit_message>
Add system architecture diagram
Add a high level system architecture diagram into the design overview powerpoint.
</commit_message>
<xml_diff>
--- a/design_spec/design_specification.pptx
+++ b/design_spec/design_specification.pptx
@@ -13,6 +13,7 @@
     <p:sldId id="261" r:id="rId7"/>
     <p:sldId id="262" r:id="rId8"/>
     <p:sldId id="263" r:id="rId9"/>
+    <p:sldId id="264" r:id="rId10"/>
   </p:sldIdLst>
   <p:sldSz cx="9144000" cy="6858000" type="screen4x3"/>
   <p:notesSz cx="6858000" cy="9144000"/>
@@ -250,7 +251,7 @@
           <a:p>
             <a:fld id="{D6FBD183-3D04-4611-AEF6-5384B5B85F0E}" type="datetimeFigureOut">
               <a:rPr lang="en-GB" smtClean="0"/>
-              <a:t>22/02/2018</a:t>
+              <a:t>23/02/2018</a:t>
             </a:fld>
             <a:endParaRPr lang="en-GB"/>
           </a:p>
@@ -420,7 +421,7 @@
           <a:p>
             <a:fld id="{D6FBD183-3D04-4611-AEF6-5384B5B85F0E}" type="datetimeFigureOut">
               <a:rPr lang="en-GB" smtClean="0"/>
-              <a:t>22/02/2018</a:t>
+              <a:t>23/02/2018</a:t>
             </a:fld>
             <a:endParaRPr lang="en-GB"/>
           </a:p>
@@ -600,7 +601,7 @@
           <a:p>
             <a:fld id="{D6FBD183-3D04-4611-AEF6-5384B5B85F0E}" type="datetimeFigureOut">
               <a:rPr lang="en-GB" smtClean="0"/>
-              <a:t>22/02/2018</a:t>
+              <a:t>23/02/2018</a:t>
             </a:fld>
             <a:endParaRPr lang="en-GB"/>
           </a:p>
@@ -770,7 +771,7 @@
           <a:p>
             <a:fld id="{D6FBD183-3D04-4611-AEF6-5384B5B85F0E}" type="datetimeFigureOut">
               <a:rPr lang="en-GB" smtClean="0"/>
-              <a:t>22/02/2018</a:t>
+              <a:t>23/02/2018</a:t>
             </a:fld>
             <a:endParaRPr lang="en-GB"/>
           </a:p>
@@ -1014,7 +1015,7 @@
           <a:p>
             <a:fld id="{D6FBD183-3D04-4611-AEF6-5384B5B85F0E}" type="datetimeFigureOut">
               <a:rPr lang="en-GB" smtClean="0"/>
-              <a:t>22/02/2018</a:t>
+              <a:t>23/02/2018</a:t>
             </a:fld>
             <a:endParaRPr lang="en-GB"/>
           </a:p>
@@ -1246,7 +1247,7 @@
           <a:p>
             <a:fld id="{D6FBD183-3D04-4611-AEF6-5384B5B85F0E}" type="datetimeFigureOut">
               <a:rPr lang="en-GB" smtClean="0"/>
-              <a:t>22/02/2018</a:t>
+              <a:t>23/02/2018</a:t>
             </a:fld>
             <a:endParaRPr lang="en-GB"/>
           </a:p>
@@ -1613,7 +1614,7 @@
           <a:p>
             <a:fld id="{D6FBD183-3D04-4611-AEF6-5384B5B85F0E}" type="datetimeFigureOut">
               <a:rPr lang="en-GB" smtClean="0"/>
-              <a:t>22/02/2018</a:t>
+              <a:t>23/02/2018</a:t>
             </a:fld>
             <a:endParaRPr lang="en-GB"/>
           </a:p>
@@ -1731,7 +1732,7 @@
           <a:p>
             <a:fld id="{D6FBD183-3D04-4611-AEF6-5384B5B85F0E}" type="datetimeFigureOut">
               <a:rPr lang="en-GB" smtClean="0"/>
-              <a:t>22/02/2018</a:t>
+              <a:t>23/02/2018</a:t>
             </a:fld>
             <a:endParaRPr lang="en-GB"/>
           </a:p>
@@ -1826,7 +1827,7 @@
           <a:p>
             <a:fld id="{D6FBD183-3D04-4611-AEF6-5384B5B85F0E}" type="datetimeFigureOut">
               <a:rPr lang="en-GB" smtClean="0"/>
-              <a:t>22/02/2018</a:t>
+              <a:t>23/02/2018</a:t>
             </a:fld>
             <a:endParaRPr lang="en-GB"/>
           </a:p>
@@ -2103,7 +2104,7 @@
           <a:p>
             <a:fld id="{D6FBD183-3D04-4611-AEF6-5384B5B85F0E}" type="datetimeFigureOut">
               <a:rPr lang="en-GB" smtClean="0"/>
-              <a:t>22/02/2018</a:t>
+              <a:t>23/02/2018</a:t>
             </a:fld>
             <a:endParaRPr lang="en-GB"/>
           </a:p>
@@ -2360,7 +2361,7 @@
           <a:p>
             <a:fld id="{D6FBD183-3D04-4611-AEF6-5384B5B85F0E}" type="datetimeFigureOut">
               <a:rPr lang="en-GB" smtClean="0"/>
-              <a:t>22/02/2018</a:t>
+              <a:t>23/02/2018</a:t>
             </a:fld>
             <a:endParaRPr lang="en-GB"/>
           </a:p>
@@ -2573,7 +2574,7 @@
           <a:p>
             <a:fld id="{D6FBD183-3D04-4611-AEF6-5384B5B85F0E}" type="datetimeFigureOut">
               <a:rPr lang="en-GB" smtClean="0"/>
-              <a:t>22/02/2018</a:t>
+              <a:t>23/02/2018</a:t>
             </a:fld>
             <a:endParaRPr lang="en-GB"/>
           </a:p>
@@ -4546,6 +4547,955 @@
 </p:sld>
 </file>
 
+<file path=ppt/slides/slide9.xml><?xml version="1.0" encoding="utf-8"?>
+<p:sld xmlns:a="http://schemas.openxmlformats.org/drawingml/2006/main" xmlns:r="http://schemas.openxmlformats.org/officeDocument/2006/relationships" xmlns:p="http://schemas.openxmlformats.org/presentationml/2006/main">
+  <p:cSld>
+    <p:spTree>
+      <p:nvGrpSpPr>
+        <p:cNvPr id="1" name=""/>
+        <p:cNvGrpSpPr/>
+        <p:nvPr/>
+      </p:nvGrpSpPr>
+      <p:grpSpPr>
+        <a:xfrm>
+          <a:off x="0" y="0"/>
+          <a:ext cx="0" cy="0"/>
+          <a:chOff x="0" y="0"/>
+          <a:chExt cx="0" cy="0"/>
+        </a:xfrm>
+      </p:grpSpPr>
+      <p:sp>
+        <p:nvSpPr>
+          <p:cNvPr id="2" name="Flowchart: Connector 1">
+            <a:extLst>
+              <a:ext uri="{FF2B5EF4-FFF2-40B4-BE49-F238E27FC236}">
+                <a16:creationId xmlns:a16="http://schemas.microsoft.com/office/drawing/2014/main" id="{64453680-0BB2-4A4C-8712-EEA5A3AD3F51}"/>
+              </a:ext>
+            </a:extLst>
+          </p:cNvPr>
+          <p:cNvSpPr/>
+          <p:nvPr/>
+        </p:nvSpPr>
+        <p:spPr>
+          <a:xfrm>
+            <a:off x="661182" y="2433711"/>
+            <a:ext cx="675249" cy="661181"/>
+          </a:xfrm>
+          <a:prstGeom prst="flowChartConnector">
+            <a:avLst/>
+          </a:prstGeom>
+          <a:ln>
+            <a:solidFill>
+              <a:schemeClr val="tx1"/>
+            </a:solidFill>
+          </a:ln>
+        </p:spPr>
+        <p:style>
+          <a:lnRef idx="2">
+            <a:schemeClr val="accent6"/>
+          </a:lnRef>
+          <a:fillRef idx="1">
+            <a:schemeClr val="lt1"/>
+          </a:fillRef>
+          <a:effectRef idx="0">
+            <a:schemeClr val="accent6"/>
+          </a:effectRef>
+          <a:fontRef idx="minor">
+            <a:schemeClr val="dk1"/>
+          </a:fontRef>
+        </p:style>
+        <p:txBody>
+          <a:bodyPr rtlCol="0" anchor="ctr"/>
+          <a:lstStyle/>
+          <a:p>
+            <a:pPr algn="ctr"/>
+            <a:endParaRPr lang="en-GB"/>
+          </a:p>
+        </p:txBody>
+      </p:sp>
+      <p:sp>
+        <p:nvSpPr>
+          <p:cNvPr id="4" name="Rectangle: Rounded Corners 3">
+            <a:extLst>
+              <a:ext uri="{FF2B5EF4-FFF2-40B4-BE49-F238E27FC236}">
+                <a16:creationId xmlns:a16="http://schemas.microsoft.com/office/drawing/2014/main" id="{6FED4133-0FD4-437F-A164-D623E18B10F9}"/>
+              </a:ext>
+            </a:extLst>
+          </p:cNvPr>
+          <p:cNvSpPr/>
+          <p:nvPr/>
+        </p:nvSpPr>
+        <p:spPr>
+          <a:xfrm>
+            <a:off x="583809" y="3101928"/>
+            <a:ext cx="829993" cy="661181"/>
+          </a:xfrm>
+          <a:prstGeom prst="roundRect">
+            <a:avLst/>
+          </a:prstGeom>
+          <a:ln>
+            <a:solidFill>
+              <a:schemeClr val="tx1"/>
+            </a:solidFill>
+          </a:ln>
+        </p:spPr>
+        <p:style>
+          <a:lnRef idx="2">
+            <a:schemeClr val="accent6"/>
+          </a:lnRef>
+          <a:fillRef idx="1">
+            <a:schemeClr val="lt1"/>
+          </a:fillRef>
+          <a:effectRef idx="0">
+            <a:schemeClr val="accent6"/>
+          </a:effectRef>
+          <a:fontRef idx="minor">
+            <a:schemeClr val="dk1"/>
+          </a:fontRef>
+        </p:style>
+        <p:txBody>
+          <a:bodyPr rtlCol="0" anchor="ctr"/>
+          <a:lstStyle/>
+          <a:p>
+            <a:pPr algn="ctr"/>
+            <a:r>
+              <a:rPr lang="en-GB" dirty="0"/>
+              <a:t>User</a:t>
+            </a:r>
+          </a:p>
+        </p:txBody>
+      </p:sp>
+      <p:sp>
+        <p:nvSpPr>
+          <p:cNvPr id="5" name="Rectangle 4">
+            <a:extLst>
+              <a:ext uri="{FF2B5EF4-FFF2-40B4-BE49-F238E27FC236}">
+                <a16:creationId xmlns:a16="http://schemas.microsoft.com/office/drawing/2014/main" id="{ABDBCB31-F53D-4507-A378-BE7CFA17B456}"/>
+              </a:ext>
+            </a:extLst>
+          </p:cNvPr>
+          <p:cNvSpPr/>
+          <p:nvPr/>
+        </p:nvSpPr>
+        <p:spPr>
+          <a:xfrm>
+            <a:off x="2089055" y="2764301"/>
+            <a:ext cx="1470072" cy="998806"/>
+          </a:xfrm>
+          <a:prstGeom prst="rect">
+            <a:avLst/>
+          </a:prstGeom>
+          <a:ln>
+            <a:solidFill>
+              <a:schemeClr val="tx1"/>
+            </a:solidFill>
+          </a:ln>
+        </p:spPr>
+        <p:style>
+          <a:lnRef idx="2">
+            <a:schemeClr val="accent6"/>
+          </a:lnRef>
+          <a:fillRef idx="1">
+            <a:schemeClr val="lt1"/>
+          </a:fillRef>
+          <a:effectRef idx="0">
+            <a:schemeClr val="accent6"/>
+          </a:effectRef>
+          <a:fontRef idx="minor">
+            <a:schemeClr val="dk1"/>
+          </a:fontRef>
+        </p:style>
+        <p:txBody>
+          <a:bodyPr rtlCol="0" anchor="ctr"/>
+          <a:lstStyle/>
+          <a:p>
+            <a:pPr algn="ctr"/>
+            <a:r>
+              <a:rPr lang="en-GB" sz="1600" dirty="0"/>
+              <a:t>Client/Browser</a:t>
+            </a:r>
+          </a:p>
+        </p:txBody>
+      </p:sp>
+      <p:sp>
+        <p:nvSpPr>
+          <p:cNvPr id="6" name="Rectangle 5">
+            <a:extLst>
+              <a:ext uri="{FF2B5EF4-FFF2-40B4-BE49-F238E27FC236}">
+                <a16:creationId xmlns:a16="http://schemas.microsoft.com/office/drawing/2014/main" id="{6F5EF35C-A1D4-4B07-9AA4-D013EBFCAC74}"/>
+              </a:ext>
+            </a:extLst>
+          </p:cNvPr>
+          <p:cNvSpPr/>
+          <p:nvPr/>
+        </p:nvSpPr>
+        <p:spPr>
+          <a:xfrm>
+            <a:off x="4571999" y="2433710"/>
+            <a:ext cx="1659985" cy="1659989"/>
+          </a:xfrm>
+          <a:prstGeom prst="rect">
+            <a:avLst/>
+          </a:prstGeom>
+          <a:ln>
+            <a:solidFill>
+              <a:schemeClr val="tx1"/>
+            </a:solidFill>
+          </a:ln>
+        </p:spPr>
+        <p:style>
+          <a:lnRef idx="2">
+            <a:schemeClr val="accent6"/>
+          </a:lnRef>
+          <a:fillRef idx="1">
+            <a:schemeClr val="lt1"/>
+          </a:fillRef>
+          <a:effectRef idx="0">
+            <a:schemeClr val="accent6"/>
+          </a:effectRef>
+          <a:fontRef idx="minor">
+            <a:schemeClr val="dk1"/>
+          </a:fontRef>
+        </p:style>
+        <p:txBody>
+          <a:bodyPr rtlCol="0" anchor="ctr"/>
+          <a:lstStyle/>
+          <a:p>
+            <a:pPr algn="ctr"/>
+            <a:r>
+              <a:rPr lang="en-GB" sz="1600" dirty="0"/>
+              <a:t>Web + App server: generate requested event and user pages from models and web APIs</a:t>
+            </a:r>
+          </a:p>
+        </p:txBody>
+      </p:sp>
+      <p:sp>
+        <p:nvSpPr>
+          <p:cNvPr id="7" name="Cylinder 6">
+            <a:extLst>
+              <a:ext uri="{FF2B5EF4-FFF2-40B4-BE49-F238E27FC236}">
+                <a16:creationId xmlns:a16="http://schemas.microsoft.com/office/drawing/2014/main" id="{FE7C4D8C-B989-4686-962B-D7E23B2C22DE}"/>
+              </a:ext>
+            </a:extLst>
+          </p:cNvPr>
+          <p:cNvSpPr/>
+          <p:nvPr/>
+        </p:nvSpPr>
+        <p:spPr>
+          <a:xfrm>
+            <a:off x="6654024" y="3763107"/>
+            <a:ext cx="1659986" cy="1835835"/>
+          </a:xfrm>
+          <a:prstGeom prst="can">
+            <a:avLst/>
+          </a:prstGeom>
+          <a:ln>
+            <a:solidFill>
+              <a:schemeClr val="tx1"/>
+            </a:solidFill>
+          </a:ln>
+        </p:spPr>
+        <p:style>
+          <a:lnRef idx="2">
+            <a:schemeClr val="accent6"/>
+          </a:lnRef>
+          <a:fillRef idx="1">
+            <a:schemeClr val="lt1"/>
+          </a:fillRef>
+          <a:effectRef idx="0">
+            <a:schemeClr val="accent6"/>
+          </a:effectRef>
+          <a:fontRef idx="minor">
+            <a:schemeClr val="dk1"/>
+          </a:fontRef>
+        </p:style>
+        <p:txBody>
+          <a:bodyPr rtlCol="0" anchor="ctr"/>
+          <a:lstStyle/>
+          <a:p>
+            <a:pPr algn="ctr"/>
+            <a:r>
+              <a:rPr lang="en-GB" dirty="0"/>
+              <a:t>User and Event Models</a:t>
+            </a:r>
+          </a:p>
+        </p:txBody>
+      </p:sp>
+      <p:sp>
+        <p:nvSpPr>
+          <p:cNvPr id="8" name="Cloud 7">
+            <a:extLst>
+              <a:ext uri="{FF2B5EF4-FFF2-40B4-BE49-F238E27FC236}">
+                <a16:creationId xmlns:a16="http://schemas.microsoft.com/office/drawing/2014/main" id="{22FCD021-5F16-4E81-898B-41D4C4FA17AF}"/>
+              </a:ext>
+            </a:extLst>
+          </p:cNvPr>
+          <p:cNvSpPr/>
+          <p:nvPr/>
+        </p:nvSpPr>
+        <p:spPr>
+          <a:xfrm>
+            <a:off x="6414873" y="1062110"/>
+            <a:ext cx="2138289" cy="1702191"/>
+          </a:xfrm>
+          <a:prstGeom prst="cloud">
+            <a:avLst/>
+          </a:prstGeom>
+          <a:ln>
+            <a:solidFill>
+              <a:schemeClr val="tx1"/>
+            </a:solidFill>
+          </a:ln>
+        </p:spPr>
+        <p:style>
+          <a:lnRef idx="2">
+            <a:schemeClr val="accent6"/>
+          </a:lnRef>
+          <a:fillRef idx="1">
+            <a:schemeClr val="lt1"/>
+          </a:fillRef>
+          <a:effectRef idx="0">
+            <a:schemeClr val="accent6"/>
+          </a:effectRef>
+          <a:fontRef idx="minor">
+            <a:schemeClr val="dk1"/>
+          </a:fontRef>
+        </p:style>
+        <p:txBody>
+          <a:bodyPr rtlCol="0" anchor="ctr"/>
+          <a:lstStyle/>
+          <a:p>
+            <a:pPr algn="ctr"/>
+            <a:r>
+              <a:rPr lang="en-GB" sz="1700" dirty="0"/>
+              <a:t>Google Maps/Search API</a:t>
+            </a:r>
+          </a:p>
+        </p:txBody>
+      </p:sp>
+      <p:cxnSp>
+        <p:nvCxnSpPr>
+          <p:cNvPr id="10" name="Straight Arrow Connector 9">
+            <a:extLst>
+              <a:ext uri="{FF2B5EF4-FFF2-40B4-BE49-F238E27FC236}">
+                <a16:creationId xmlns:a16="http://schemas.microsoft.com/office/drawing/2014/main" id="{B55D699D-AA73-4291-9F66-3CC406F2B1F1}"/>
+              </a:ext>
+            </a:extLst>
+          </p:cNvPr>
+          <p:cNvCxnSpPr/>
+          <p:nvPr/>
+        </p:nvCxnSpPr>
+        <p:spPr>
+          <a:xfrm>
+            <a:off x="1413802" y="3334043"/>
+            <a:ext cx="675252" cy="0"/>
+          </a:xfrm>
+          <a:prstGeom prst="straightConnector1">
+            <a:avLst/>
+          </a:prstGeom>
+          <a:ln>
+            <a:headEnd type="triangle"/>
+            <a:tailEnd type="triangle"/>
+          </a:ln>
+        </p:spPr>
+        <p:style>
+          <a:lnRef idx="1">
+            <a:schemeClr val="dk1"/>
+          </a:lnRef>
+          <a:fillRef idx="0">
+            <a:schemeClr val="dk1"/>
+          </a:fillRef>
+          <a:effectRef idx="0">
+            <a:schemeClr val="dk1"/>
+          </a:effectRef>
+          <a:fontRef idx="minor">
+            <a:schemeClr val="tx1"/>
+          </a:fontRef>
+        </p:style>
+      </p:cxnSp>
+      <p:cxnSp>
+        <p:nvCxnSpPr>
+          <p:cNvPr id="12" name="Straight Arrow Connector 11">
+            <a:extLst>
+              <a:ext uri="{FF2B5EF4-FFF2-40B4-BE49-F238E27FC236}">
+                <a16:creationId xmlns:a16="http://schemas.microsoft.com/office/drawing/2014/main" id="{421EB064-C123-401C-8916-BD749239F660}"/>
+              </a:ext>
+            </a:extLst>
+          </p:cNvPr>
+          <p:cNvCxnSpPr/>
+          <p:nvPr/>
+        </p:nvCxnSpPr>
+        <p:spPr>
+          <a:xfrm>
+            <a:off x="3559127" y="2954215"/>
+            <a:ext cx="1012873" cy="0"/>
+          </a:xfrm>
+          <a:prstGeom prst="straightConnector1">
+            <a:avLst/>
+          </a:prstGeom>
+          <a:ln>
+            <a:tailEnd type="triangle"/>
+          </a:ln>
+        </p:spPr>
+        <p:style>
+          <a:lnRef idx="1">
+            <a:schemeClr val="dk1"/>
+          </a:lnRef>
+          <a:fillRef idx="0">
+            <a:schemeClr val="dk1"/>
+          </a:fillRef>
+          <a:effectRef idx="0">
+            <a:schemeClr val="dk1"/>
+          </a:effectRef>
+          <a:fontRef idx="minor">
+            <a:schemeClr val="tx1"/>
+          </a:fontRef>
+        </p:style>
+      </p:cxnSp>
+      <p:cxnSp>
+        <p:nvCxnSpPr>
+          <p:cNvPr id="14" name="Straight Arrow Connector 13">
+            <a:extLst>
+              <a:ext uri="{FF2B5EF4-FFF2-40B4-BE49-F238E27FC236}">
+                <a16:creationId xmlns:a16="http://schemas.microsoft.com/office/drawing/2014/main" id="{7BEA5191-9807-4E93-BFEC-1F9975B34C64}"/>
+              </a:ext>
+            </a:extLst>
+          </p:cNvPr>
+          <p:cNvCxnSpPr/>
+          <p:nvPr/>
+        </p:nvCxnSpPr>
+        <p:spPr>
+          <a:xfrm flipH="1">
+            <a:off x="3559127" y="3569676"/>
+            <a:ext cx="1012873" cy="0"/>
+          </a:xfrm>
+          <a:prstGeom prst="straightConnector1">
+            <a:avLst/>
+          </a:prstGeom>
+          <a:ln>
+            <a:tailEnd type="triangle"/>
+          </a:ln>
+        </p:spPr>
+        <p:style>
+          <a:lnRef idx="1">
+            <a:schemeClr val="dk1"/>
+          </a:lnRef>
+          <a:fillRef idx="0">
+            <a:schemeClr val="dk1"/>
+          </a:fillRef>
+          <a:effectRef idx="0">
+            <a:schemeClr val="dk1"/>
+          </a:effectRef>
+          <a:fontRef idx="minor">
+            <a:schemeClr val="tx1"/>
+          </a:fontRef>
+        </p:style>
+      </p:cxnSp>
+      <p:sp>
+        <p:nvSpPr>
+          <p:cNvPr id="15" name="Rectangle 14">
+            <a:extLst>
+              <a:ext uri="{FF2B5EF4-FFF2-40B4-BE49-F238E27FC236}">
+                <a16:creationId xmlns:a16="http://schemas.microsoft.com/office/drawing/2014/main" id="{57BD7027-013B-4781-BA76-526CB5D06242}"/>
+              </a:ext>
+            </a:extLst>
+          </p:cNvPr>
+          <p:cNvSpPr/>
+          <p:nvPr/>
+        </p:nvSpPr>
+        <p:spPr>
+          <a:xfrm>
+            <a:off x="2222695" y="2834645"/>
+            <a:ext cx="1223890" cy="267283"/>
+          </a:xfrm>
+          <a:prstGeom prst="rect">
+            <a:avLst/>
+          </a:prstGeom>
+          <a:ln>
+            <a:solidFill>
+              <a:schemeClr val="tx1"/>
+            </a:solidFill>
+          </a:ln>
+        </p:spPr>
+        <p:style>
+          <a:lnRef idx="2">
+            <a:schemeClr val="accent6"/>
+          </a:lnRef>
+          <a:fillRef idx="1">
+            <a:schemeClr val="lt1"/>
+          </a:fillRef>
+          <a:effectRef idx="0">
+            <a:schemeClr val="accent6"/>
+          </a:effectRef>
+          <a:fontRef idx="minor">
+            <a:schemeClr val="dk1"/>
+          </a:fontRef>
+        </p:style>
+        <p:txBody>
+          <a:bodyPr rtlCol="0" anchor="ctr"/>
+          <a:lstStyle/>
+          <a:p>
+            <a:pPr algn="ctr"/>
+            <a:r>
+              <a:rPr lang="en-GB" dirty="0"/>
+              <a:t>Content</a:t>
+            </a:r>
+          </a:p>
+        </p:txBody>
+      </p:sp>
+      <p:sp>
+        <p:nvSpPr>
+          <p:cNvPr id="16" name="Rectangle 15">
+            <a:extLst>
+              <a:ext uri="{FF2B5EF4-FFF2-40B4-BE49-F238E27FC236}">
+                <a16:creationId xmlns:a16="http://schemas.microsoft.com/office/drawing/2014/main" id="{CA0406A8-ADC9-4812-B145-2A6767AC9C37}"/>
+              </a:ext>
+            </a:extLst>
+          </p:cNvPr>
+          <p:cNvSpPr/>
+          <p:nvPr/>
+        </p:nvSpPr>
+        <p:spPr>
+          <a:xfrm>
+            <a:off x="2222695" y="3421964"/>
+            <a:ext cx="1223890" cy="267283"/>
+          </a:xfrm>
+          <a:prstGeom prst="rect">
+            <a:avLst/>
+          </a:prstGeom>
+          <a:ln>
+            <a:solidFill>
+              <a:schemeClr val="tx1"/>
+            </a:solidFill>
+          </a:ln>
+        </p:spPr>
+        <p:style>
+          <a:lnRef idx="2">
+            <a:schemeClr val="accent6"/>
+          </a:lnRef>
+          <a:fillRef idx="1">
+            <a:schemeClr val="lt1"/>
+          </a:fillRef>
+          <a:effectRef idx="0">
+            <a:schemeClr val="accent6"/>
+          </a:effectRef>
+          <a:fontRef idx="minor">
+            <a:schemeClr val="dk1"/>
+          </a:fontRef>
+        </p:style>
+        <p:txBody>
+          <a:bodyPr rtlCol="0" anchor="ctr"/>
+          <a:lstStyle/>
+          <a:p>
+            <a:pPr algn="ctr"/>
+            <a:r>
+              <a:rPr lang="en-GB" sz="1500" dirty="0"/>
+              <a:t>Presentation</a:t>
+            </a:r>
+          </a:p>
+        </p:txBody>
+      </p:sp>
+      <p:sp>
+        <p:nvSpPr>
+          <p:cNvPr id="17" name="TextBox 16">
+            <a:extLst>
+              <a:ext uri="{FF2B5EF4-FFF2-40B4-BE49-F238E27FC236}">
+                <a16:creationId xmlns:a16="http://schemas.microsoft.com/office/drawing/2014/main" id="{A7529262-3903-4209-A4D1-67903BF8ACD3}"/>
+              </a:ext>
+            </a:extLst>
+          </p:cNvPr>
+          <p:cNvSpPr txBox="1"/>
+          <p:nvPr/>
+        </p:nvSpPr>
+        <p:spPr>
+          <a:xfrm>
+            <a:off x="3716495" y="2706676"/>
+            <a:ext cx="718979" cy="523220"/>
+          </a:xfrm>
+          <a:prstGeom prst="rect">
+            <a:avLst/>
+          </a:prstGeom>
+          <a:solidFill>
+            <a:schemeClr val="bg1"/>
+          </a:solidFill>
+        </p:spPr>
+        <p:txBody>
+          <a:bodyPr wrap="none" rtlCol="0">
+            <a:spAutoFit/>
+          </a:bodyPr>
+          <a:lstStyle/>
+          <a:p>
+            <a:pPr algn="ctr"/>
+            <a:r>
+              <a:rPr lang="en-GB" sz="1400" dirty="0"/>
+              <a:t>URL+</a:t>
+            </a:r>
+          </a:p>
+          <a:p>
+            <a:pPr algn="ctr"/>
+            <a:r>
+              <a:rPr lang="en-GB" sz="1400" dirty="0" err="1"/>
+              <a:t>Params</a:t>
+            </a:r>
+            <a:endParaRPr lang="en-GB" sz="1400" dirty="0"/>
+          </a:p>
+        </p:txBody>
+      </p:sp>
+      <p:sp>
+        <p:nvSpPr>
+          <p:cNvPr id="18" name="TextBox 17">
+            <a:extLst>
+              <a:ext uri="{FF2B5EF4-FFF2-40B4-BE49-F238E27FC236}">
+                <a16:creationId xmlns:a16="http://schemas.microsoft.com/office/drawing/2014/main" id="{EC5B60FF-6956-4E97-BDC4-3CDF156ECA9E}"/>
+              </a:ext>
+            </a:extLst>
+          </p:cNvPr>
+          <p:cNvSpPr txBox="1"/>
+          <p:nvPr/>
+        </p:nvSpPr>
+        <p:spPr>
+          <a:xfrm>
+            <a:off x="3692767" y="3323547"/>
+            <a:ext cx="766436" cy="523220"/>
+          </a:xfrm>
+          <a:prstGeom prst="rect">
+            <a:avLst/>
+          </a:prstGeom>
+          <a:solidFill>
+            <a:schemeClr val="bg1"/>
+          </a:solidFill>
+        </p:spPr>
+        <p:txBody>
+          <a:bodyPr wrap="square" rtlCol="0">
+            <a:spAutoFit/>
+          </a:bodyPr>
+          <a:lstStyle/>
+          <a:p>
+            <a:pPr algn="ctr"/>
+            <a:r>
+              <a:rPr lang="en-GB" sz="1400" dirty="0"/>
+              <a:t>HTML+CSS</a:t>
+            </a:r>
+          </a:p>
+        </p:txBody>
+      </p:sp>
+      <p:cxnSp>
+        <p:nvCxnSpPr>
+          <p:cNvPr id="22" name="Straight Arrow Connector 21">
+            <a:extLst>
+              <a:ext uri="{FF2B5EF4-FFF2-40B4-BE49-F238E27FC236}">
+                <a16:creationId xmlns:a16="http://schemas.microsoft.com/office/drawing/2014/main" id="{AE7A2AB0-8ABE-4898-8B62-81D71839AB86}"/>
+              </a:ext>
+            </a:extLst>
+          </p:cNvPr>
+          <p:cNvCxnSpPr>
+            <a:cxnSpLocks/>
+          </p:cNvCxnSpPr>
+          <p:nvPr/>
+        </p:nvCxnSpPr>
+        <p:spPr>
+          <a:xfrm flipV="1">
+            <a:off x="6231984" y="2222695"/>
+            <a:ext cx="217925" cy="211015"/>
+          </a:xfrm>
+          <a:prstGeom prst="straightConnector1">
+            <a:avLst/>
+          </a:prstGeom>
+          <a:ln>
+            <a:tailEnd type="triangle"/>
+          </a:ln>
+        </p:spPr>
+        <p:style>
+          <a:lnRef idx="1">
+            <a:schemeClr val="dk1"/>
+          </a:lnRef>
+          <a:fillRef idx="0">
+            <a:schemeClr val="dk1"/>
+          </a:fillRef>
+          <a:effectRef idx="0">
+            <a:schemeClr val="dk1"/>
+          </a:effectRef>
+          <a:fontRef idx="minor">
+            <a:schemeClr val="tx1"/>
+          </a:fontRef>
+        </p:style>
+      </p:cxnSp>
+      <p:cxnSp>
+        <p:nvCxnSpPr>
+          <p:cNvPr id="24" name="Straight Arrow Connector 23">
+            <a:extLst>
+              <a:ext uri="{FF2B5EF4-FFF2-40B4-BE49-F238E27FC236}">
+                <a16:creationId xmlns:a16="http://schemas.microsoft.com/office/drawing/2014/main" id="{5CADEF16-C162-4C87-A04B-6F9B93F3F5B7}"/>
+              </a:ext>
+            </a:extLst>
+          </p:cNvPr>
+          <p:cNvCxnSpPr>
+            <a:cxnSpLocks/>
+          </p:cNvCxnSpPr>
+          <p:nvPr/>
+        </p:nvCxnSpPr>
+        <p:spPr>
+          <a:xfrm flipH="1">
+            <a:off x="6231984" y="2507566"/>
+            <a:ext cx="583554" cy="587326"/>
+          </a:xfrm>
+          <a:prstGeom prst="straightConnector1">
+            <a:avLst/>
+          </a:prstGeom>
+          <a:ln>
+            <a:tailEnd type="triangle"/>
+          </a:ln>
+        </p:spPr>
+        <p:style>
+          <a:lnRef idx="1">
+            <a:schemeClr val="dk1"/>
+          </a:lnRef>
+          <a:fillRef idx="0">
+            <a:schemeClr val="dk1"/>
+          </a:fillRef>
+          <a:effectRef idx="0">
+            <a:schemeClr val="dk1"/>
+          </a:effectRef>
+          <a:fontRef idx="minor">
+            <a:schemeClr val="tx1"/>
+          </a:fontRef>
+        </p:style>
+      </p:cxnSp>
+      <p:cxnSp>
+        <p:nvCxnSpPr>
+          <p:cNvPr id="28" name="Straight Arrow Connector 27">
+            <a:extLst>
+              <a:ext uri="{FF2B5EF4-FFF2-40B4-BE49-F238E27FC236}">
+                <a16:creationId xmlns:a16="http://schemas.microsoft.com/office/drawing/2014/main" id="{10184162-74F3-4537-9440-65BEB7E75D86}"/>
+              </a:ext>
+            </a:extLst>
+          </p:cNvPr>
+          <p:cNvCxnSpPr>
+            <a:cxnSpLocks/>
+          </p:cNvCxnSpPr>
+          <p:nvPr/>
+        </p:nvCxnSpPr>
+        <p:spPr>
+          <a:xfrm>
+            <a:off x="6231984" y="3689247"/>
+            <a:ext cx="422040" cy="263775"/>
+          </a:xfrm>
+          <a:prstGeom prst="straightConnector1">
+            <a:avLst/>
+          </a:prstGeom>
+          <a:ln>
+            <a:tailEnd type="triangle"/>
+          </a:ln>
+        </p:spPr>
+        <p:style>
+          <a:lnRef idx="1">
+            <a:schemeClr val="dk1"/>
+          </a:lnRef>
+          <a:fillRef idx="0">
+            <a:schemeClr val="dk1"/>
+          </a:fillRef>
+          <a:effectRef idx="0">
+            <a:schemeClr val="dk1"/>
+          </a:effectRef>
+          <a:fontRef idx="minor">
+            <a:schemeClr val="tx1"/>
+          </a:fontRef>
+        </p:style>
+      </p:cxnSp>
+      <p:cxnSp>
+        <p:nvCxnSpPr>
+          <p:cNvPr id="30" name="Straight Arrow Connector 29">
+            <a:extLst>
+              <a:ext uri="{FF2B5EF4-FFF2-40B4-BE49-F238E27FC236}">
+                <a16:creationId xmlns:a16="http://schemas.microsoft.com/office/drawing/2014/main" id="{C0993F0E-01DC-4605-937D-F89034A76AD7}"/>
+              </a:ext>
+            </a:extLst>
+          </p:cNvPr>
+          <p:cNvCxnSpPr>
+            <a:cxnSpLocks/>
+          </p:cNvCxnSpPr>
+          <p:nvPr/>
+        </p:nvCxnSpPr>
+        <p:spPr>
+          <a:xfrm flipH="1" flipV="1">
+            <a:off x="6231984" y="4026871"/>
+            <a:ext cx="422040" cy="263776"/>
+          </a:xfrm>
+          <a:prstGeom prst="straightConnector1">
+            <a:avLst/>
+          </a:prstGeom>
+          <a:ln>
+            <a:tailEnd type="triangle"/>
+          </a:ln>
+        </p:spPr>
+        <p:style>
+          <a:lnRef idx="1">
+            <a:schemeClr val="dk1"/>
+          </a:lnRef>
+          <a:fillRef idx="0">
+            <a:schemeClr val="dk1"/>
+          </a:fillRef>
+          <a:effectRef idx="0">
+            <a:schemeClr val="dk1"/>
+          </a:effectRef>
+          <a:fontRef idx="minor">
+            <a:schemeClr val="tx1"/>
+          </a:fontRef>
+        </p:style>
+      </p:cxnSp>
+      <p:sp>
+        <p:nvSpPr>
+          <p:cNvPr id="38" name="TextBox 37">
+            <a:extLst>
+              <a:ext uri="{FF2B5EF4-FFF2-40B4-BE49-F238E27FC236}">
+                <a16:creationId xmlns:a16="http://schemas.microsoft.com/office/drawing/2014/main" id="{A7BEE1E4-2D76-45F0-9200-84B2AE1C7997}"/>
+              </a:ext>
+            </a:extLst>
+          </p:cNvPr>
+          <p:cNvSpPr txBox="1"/>
+          <p:nvPr/>
+        </p:nvSpPr>
+        <p:spPr>
+          <a:xfrm>
+            <a:off x="6231984" y="3492299"/>
+            <a:ext cx="2858731" cy="307777"/>
+          </a:xfrm>
+          <a:prstGeom prst="rect">
+            <a:avLst/>
+          </a:prstGeom>
+          <a:noFill/>
+        </p:spPr>
+        <p:txBody>
+          <a:bodyPr wrap="none" rtlCol="0">
+            <a:spAutoFit/>
+          </a:bodyPr>
+          <a:lstStyle/>
+          <a:p>
+            <a:r>
+              <a:rPr lang="en-GB" sz="1400" dirty="0"/>
+              <a:t>Request models from search criteria </a:t>
+            </a:r>
+          </a:p>
+        </p:txBody>
+      </p:sp>
+      <p:sp>
+        <p:nvSpPr>
+          <p:cNvPr id="39" name="TextBox 38">
+            <a:extLst>
+              <a:ext uri="{FF2B5EF4-FFF2-40B4-BE49-F238E27FC236}">
+                <a16:creationId xmlns:a16="http://schemas.microsoft.com/office/drawing/2014/main" id="{0E25F410-5105-4FD8-AFC9-9FB88EB97FFC}"/>
+              </a:ext>
+            </a:extLst>
+          </p:cNvPr>
+          <p:cNvSpPr txBox="1"/>
+          <p:nvPr/>
+        </p:nvSpPr>
+        <p:spPr>
+          <a:xfrm>
+            <a:off x="4941439" y="4164039"/>
+            <a:ext cx="1712585" cy="307777"/>
+          </a:xfrm>
+          <a:prstGeom prst="rect">
+            <a:avLst/>
+          </a:prstGeom>
+          <a:noFill/>
+        </p:spPr>
+        <p:txBody>
+          <a:bodyPr wrap="none" rtlCol="0">
+            <a:spAutoFit/>
+          </a:bodyPr>
+          <a:lstStyle/>
+          <a:p>
+            <a:r>
+              <a:rPr lang="en-GB" sz="1400" dirty="0"/>
+              <a:t>Required model data</a:t>
+            </a:r>
+          </a:p>
+        </p:txBody>
+      </p:sp>
+      <p:sp>
+        <p:nvSpPr>
+          <p:cNvPr id="40" name="TextBox 39">
+            <a:extLst>
+              <a:ext uri="{FF2B5EF4-FFF2-40B4-BE49-F238E27FC236}">
+                <a16:creationId xmlns:a16="http://schemas.microsoft.com/office/drawing/2014/main" id="{6A0D94D3-5211-4295-AA8D-84628DCA26EB}"/>
+              </a:ext>
+            </a:extLst>
+          </p:cNvPr>
+          <p:cNvSpPr txBox="1"/>
+          <p:nvPr/>
+        </p:nvSpPr>
+        <p:spPr>
+          <a:xfrm>
+            <a:off x="4801674" y="2098652"/>
+            <a:ext cx="1613199" cy="307777"/>
+          </a:xfrm>
+          <a:prstGeom prst="rect">
+            <a:avLst/>
+          </a:prstGeom>
+          <a:noFill/>
+        </p:spPr>
+        <p:txBody>
+          <a:bodyPr wrap="none" rtlCol="0">
+            <a:spAutoFit/>
+          </a:bodyPr>
+          <a:lstStyle/>
+          <a:p>
+            <a:r>
+              <a:rPr lang="en-GB" sz="1400" dirty="0"/>
+              <a:t>Post search request</a:t>
+            </a:r>
+          </a:p>
+        </p:txBody>
+      </p:sp>
+      <p:sp>
+        <p:nvSpPr>
+          <p:cNvPr id="41" name="TextBox 40">
+            <a:extLst>
+              <a:ext uri="{FF2B5EF4-FFF2-40B4-BE49-F238E27FC236}">
+                <a16:creationId xmlns:a16="http://schemas.microsoft.com/office/drawing/2014/main" id="{1BB2ACFD-E294-4943-ACE3-7ABC7F7A8E52}"/>
+              </a:ext>
+            </a:extLst>
+          </p:cNvPr>
+          <p:cNvSpPr txBox="1"/>
+          <p:nvPr/>
+        </p:nvSpPr>
+        <p:spPr>
+          <a:xfrm>
+            <a:off x="6432167" y="2764301"/>
+            <a:ext cx="2711833" cy="307777"/>
+          </a:xfrm>
+          <a:prstGeom prst="rect">
+            <a:avLst/>
+          </a:prstGeom>
+          <a:noFill/>
+        </p:spPr>
+        <p:txBody>
+          <a:bodyPr wrap="none" rtlCol="0">
+            <a:spAutoFit/>
+          </a:bodyPr>
+          <a:lstStyle/>
+          <a:p>
+            <a:r>
+              <a:rPr lang="en-GB" sz="1400" dirty="0"/>
+              <a:t>Location/search data in map form</a:t>
+            </a:r>
+          </a:p>
+        </p:txBody>
+      </p:sp>
+    </p:spTree>
+    <p:extLst>
+      <p:ext uri="{BB962C8B-B14F-4D97-AF65-F5344CB8AC3E}">
+        <p14:creationId xmlns:p14="http://schemas.microsoft.com/office/powerpoint/2010/main" val="3112033317"/>
+      </p:ext>
+    </p:extLst>
+  </p:cSld>
+  <p:clrMapOvr>
+    <a:masterClrMapping/>
+  </p:clrMapOvr>
+</p:sld>
+</file>
+
 <file path=ppt/theme/theme1.xml><?xml version="1.0" encoding="utf-8"?>
 <a:theme xmlns:a="http://schemas.openxmlformats.org/drawingml/2006/main" name="Office Theme">
   <a:themeElements>

</xml_diff>

<commit_message>
Started putting the powerpoint together
</commit_message>
<xml_diff>
--- a/design_spec/design_specification.pptx
+++ b/design_spec/design_specification.pptx
@@ -6,13 +6,20 @@
   </p:sldMasterIdLst>
   <p:sldIdLst>
     <p:sldId id="256" r:id="rId2"/>
-    <p:sldId id="257" r:id="rId3"/>
-    <p:sldId id="258" r:id="rId4"/>
-    <p:sldId id="259" r:id="rId5"/>
-    <p:sldId id="260" r:id="rId6"/>
-    <p:sldId id="261" r:id="rId7"/>
-    <p:sldId id="262" r:id="rId8"/>
-    <p:sldId id="263" r:id="rId9"/>
+    <p:sldId id="264" r:id="rId3"/>
+    <p:sldId id="265" r:id="rId4"/>
+    <p:sldId id="266" r:id="rId5"/>
+    <p:sldId id="267" r:id="rId6"/>
+    <p:sldId id="268" r:id="rId7"/>
+    <p:sldId id="269" r:id="rId8"/>
+    <p:sldId id="257" r:id="rId9"/>
+    <p:sldId id="258" r:id="rId10"/>
+    <p:sldId id="259" r:id="rId11"/>
+    <p:sldId id="260" r:id="rId12"/>
+    <p:sldId id="261" r:id="rId13"/>
+    <p:sldId id="262" r:id="rId14"/>
+    <p:sldId id="263" r:id="rId15"/>
+    <p:sldId id="270" r:id="rId16"/>
   </p:sldIdLst>
   <p:sldSz cx="9144000" cy="6858000" type="screen4x3"/>
   <p:notesSz cx="6858000" cy="9144000"/>
@@ -250,7 +257,7 @@
           <a:p>
             <a:fld id="{D6FBD183-3D04-4611-AEF6-5384B5B85F0E}" type="datetimeFigureOut">
               <a:rPr lang="en-GB" smtClean="0"/>
-              <a:t>22/02/2018</a:t>
+              <a:t>23/02/2018</a:t>
             </a:fld>
             <a:endParaRPr lang="en-GB"/>
           </a:p>
@@ -420,7 +427,7 @@
           <a:p>
             <a:fld id="{D6FBD183-3D04-4611-AEF6-5384B5B85F0E}" type="datetimeFigureOut">
               <a:rPr lang="en-GB" smtClean="0"/>
-              <a:t>22/02/2018</a:t>
+              <a:t>23/02/2018</a:t>
             </a:fld>
             <a:endParaRPr lang="en-GB"/>
           </a:p>
@@ -600,7 +607,7 @@
           <a:p>
             <a:fld id="{D6FBD183-3D04-4611-AEF6-5384B5B85F0E}" type="datetimeFigureOut">
               <a:rPr lang="en-GB" smtClean="0"/>
-              <a:t>22/02/2018</a:t>
+              <a:t>23/02/2018</a:t>
             </a:fld>
             <a:endParaRPr lang="en-GB"/>
           </a:p>
@@ -770,7 +777,7 @@
           <a:p>
             <a:fld id="{D6FBD183-3D04-4611-AEF6-5384B5B85F0E}" type="datetimeFigureOut">
               <a:rPr lang="en-GB" smtClean="0"/>
-              <a:t>22/02/2018</a:t>
+              <a:t>23/02/2018</a:t>
             </a:fld>
             <a:endParaRPr lang="en-GB"/>
           </a:p>
@@ -1014,7 +1021,7 @@
           <a:p>
             <a:fld id="{D6FBD183-3D04-4611-AEF6-5384B5B85F0E}" type="datetimeFigureOut">
               <a:rPr lang="en-GB" smtClean="0"/>
-              <a:t>22/02/2018</a:t>
+              <a:t>23/02/2018</a:t>
             </a:fld>
             <a:endParaRPr lang="en-GB"/>
           </a:p>
@@ -1246,7 +1253,7 @@
           <a:p>
             <a:fld id="{D6FBD183-3D04-4611-AEF6-5384B5B85F0E}" type="datetimeFigureOut">
               <a:rPr lang="en-GB" smtClean="0"/>
-              <a:t>22/02/2018</a:t>
+              <a:t>23/02/2018</a:t>
             </a:fld>
             <a:endParaRPr lang="en-GB"/>
           </a:p>
@@ -1613,7 +1620,7 @@
           <a:p>
             <a:fld id="{D6FBD183-3D04-4611-AEF6-5384B5B85F0E}" type="datetimeFigureOut">
               <a:rPr lang="en-GB" smtClean="0"/>
-              <a:t>22/02/2018</a:t>
+              <a:t>23/02/2018</a:t>
             </a:fld>
             <a:endParaRPr lang="en-GB"/>
           </a:p>
@@ -1731,7 +1738,7 @@
           <a:p>
             <a:fld id="{D6FBD183-3D04-4611-AEF6-5384B5B85F0E}" type="datetimeFigureOut">
               <a:rPr lang="en-GB" smtClean="0"/>
-              <a:t>22/02/2018</a:t>
+              <a:t>23/02/2018</a:t>
             </a:fld>
             <a:endParaRPr lang="en-GB"/>
           </a:p>
@@ -1826,7 +1833,7 @@
           <a:p>
             <a:fld id="{D6FBD183-3D04-4611-AEF6-5384B5B85F0E}" type="datetimeFigureOut">
               <a:rPr lang="en-GB" smtClean="0"/>
-              <a:t>22/02/2018</a:t>
+              <a:t>23/02/2018</a:t>
             </a:fld>
             <a:endParaRPr lang="en-GB"/>
           </a:p>
@@ -2103,7 +2110,7 @@
           <a:p>
             <a:fld id="{D6FBD183-3D04-4611-AEF6-5384B5B85F0E}" type="datetimeFigureOut">
               <a:rPr lang="en-GB" smtClean="0"/>
-              <a:t>22/02/2018</a:t>
+              <a:t>23/02/2018</a:t>
             </a:fld>
             <a:endParaRPr lang="en-GB"/>
           </a:p>
@@ -2360,7 +2367,7 @@
           <a:p>
             <a:fld id="{D6FBD183-3D04-4611-AEF6-5384B5B85F0E}" type="datetimeFigureOut">
               <a:rPr lang="en-GB" smtClean="0"/>
-              <a:t>22/02/2018</a:t>
+              <a:t>23/02/2018</a:t>
             </a:fld>
             <a:endParaRPr lang="en-GB"/>
           </a:p>
@@ -2573,7 +2580,7 @@
           <a:p>
             <a:fld id="{D6FBD183-3D04-4611-AEF6-5384B5B85F0E}" type="datetimeFigureOut">
               <a:rPr lang="en-GB" smtClean="0"/>
-              <a:t>22/02/2018</a:t>
+              <a:t>23/02/2018</a:t>
             </a:fld>
             <a:endParaRPr lang="en-GB"/>
           </a:p>
@@ -2983,7 +2990,7 @@
           <p:cNvPr id="2" name="Title 1">
             <a:extLst>
               <a:ext uri="{FF2B5EF4-FFF2-40B4-BE49-F238E27FC236}">
-                <a16:creationId xmlns:a16="http://schemas.microsoft.com/office/drawing/2014/main" id="{ECC8C8D2-1F7F-4BC8-947F-454A74E21F2B}"/>
+                <a16:creationId xmlns:a16="http://schemas.microsoft.com/office/drawing/2014/main" xmlns="" id="{ECC8C8D2-1F7F-4BC8-947F-454A74E21F2B}"/>
               </a:ext>
             </a:extLst>
           </p:cNvPr>
@@ -3008,7 +3015,7 @@
           <p:cNvPr id="3" name="Subtitle 2">
             <a:extLst>
               <a:ext uri="{FF2B5EF4-FFF2-40B4-BE49-F238E27FC236}">
-                <a16:creationId xmlns:a16="http://schemas.microsoft.com/office/drawing/2014/main" id="{652BA8EB-AECB-40A3-B6AC-E1EC1073FB98}"/>
+                <a16:creationId xmlns:a16="http://schemas.microsoft.com/office/drawing/2014/main" xmlns="" id="{652BA8EB-AECB-40A3-B6AC-E1EC1073FB98}"/>
               </a:ext>
             </a:extLst>
           </p:cNvPr>
@@ -3032,6 +3039,455 @@
     <p:extLst>
       <p:ext uri="{BB962C8B-B14F-4D97-AF65-F5344CB8AC3E}">
         <p14:creationId xmlns:p14="http://schemas.microsoft.com/office/powerpoint/2010/main" val="3381107127"/>
+      </p:ext>
+    </p:extLst>
+  </p:cSld>
+  <p:clrMapOvr>
+    <a:masterClrMapping/>
+  </p:clrMapOvr>
+  <p:timing>
+    <p:tnLst>
+      <p:par>
+        <p:cTn id="1" dur="indefinite" restart="never" nodeType="tmRoot"/>
+      </p:par>
+    </p:tnLst>
+  </p:timing>
+</p:sld>
+</file>
+
+<file path=ppt/slides/slide10.xml><?xml version="1.0" encoding="utf-8"?>
+<p:sld xmlns:a="http://schemas.openxmlformats.org/drawingml/2006/main" xmlns:r="http://schemas.openxmlformats.org/officeDocument/2006/relationships" xmlns:p="http://schemas.openxmlformats.org/presentationml/2006/main">
+  <p:cSld>
+    <p:spTree>
+      <p:nvGrpSpPr>
+        <p:cNvPr id="1" name=""/>
+        <p:cNvGrpSpPr/>
+        <p:nvPr/>
+      </p:nvGrpSpPr>
+      <p:grpSpPr>
+        <a:xfrm>
+          <a:off x="0" y="0"/>
+          <a:ext cx="0" cy="0"/>
+          <a:chOff x="0" y="0"/>
+          <a:chExt cx="0" cy="0"/>
+        </a:xfrm>
+      </p:grpSpPr>
+      <p:pic>
+        <p:nvPicPr>
+          <p:cNvPr id="3" name="Picture 2" descr="A screenshot of a cell phone&#10;&#10;Description generated with high confidence">
+            <a:extLst>
+              <a:ext uri="{FF2B5EF4-FFF2-40B4-BE49-F238E27FC236}">
+                <a16:creationId xmlns:a16="http://schemas.microsoft.com/office/drawing/2014/main" xmlns="" id="{EDCD0D7D-7CB1-4295-BB37-FFC3C3A19AEA}"/>
+              </a:ext>
+            </a:extLst>
+          </p:cNvPr>
+          <p:cNvPicPr>
+            <a:picLocks noChangeAspect="1"/>
+          </p:cNvPicPr>
+          <p:nvPr/>
+        </p:nvPicPr>
+        <p:blipFill>
+          <a:blip r:embed="rId2" cstate="print">
+            <a:extLst>
+              <a:ext uri="{28A0092B-C50C-407E-A947-70E740481C1C}">
+                <a14:useLocalDpi xmlns:a14="http://schemas.microsoft.com/office/drawing/2010/main" val="0"/>
+              </a:ext>
+            </a:extLst>
+          </a:blip>
+          <a:stretch>
+            <a:fillRect/>
+          </a:stretch>
+        </p:blipFill>
+        <p:spPr>
+          <a:xfrm>
+            <a:off x="60262" y="0"/>
+            <a:ext cx="9023476" cy="6858000"/>
+          </a:xfrm>
+          <a:prstGeom prst="rect">
+            <a:avLst/>
+          </a:prstGeom>
+        </p:spPr>
+      </p:pic>
+    </p:spTree>
+    <p:extLst>
+      <p:ext uri="{BB962C8B-B14F-4D97-AF65-F5344CB8AC3E}">
+        <p14:creationId xmlns:p14="http://schemas.microsoft.com/office/powerpoint/2010/main" val="530035007"/>
+      </p:ext>
+    </p:extLst>
+  </p:cSld>
+  <p:clrMapOvr>
+    <a:masterClrMapping/>
+  </p:clrMapOvr>
+  <p:timing>
+    <p:tnLst>
+      <p:par>
+        <p:cTn id="1" dur="indefinite" restart="never" nodeType="tmRoot"/>
+      </p:par>
+    </p:tnLst>
+  </p:timing>
+</p:sld>
+</file>
+
+<file path=ppt/slides/slide11.xml><?xml version="1.0" encoding="utf-8"?>
+<p:sld xmlns:a="http://schemas.openxmlformats.org/drawingml/2006/main" xmlns:r="http://schemas.openxmlformats.org/officeDocument/2006/relationships" xmlns:p="http://schemas.openxmlformats.org/presentationml/2006/main">
+  <p:cSld>
+    <p:spTree>
+      <p:nvGrpSpPr>
+        <p:cNvPr id="1" name=""/>
+        <p:cNvGrpSpPr/>
+        <p:nvPr/>
+      </p:nvGrpSpPr>
+      <p:grpSpPr>
+        <a:xfrm>
+          <a:off x="0" y="0"/>
+          <a:ext cx="0" cy="0"/>
+          <a:chOff x="0" y="0"/>
+          <a:chExt cx="0" cy="0"/>
+        </a:xfrm>
+      </p:grpSpPr>
+      <p:pic>
+        <p:nvPicPr>
+          <p:cNvPr id="3" name="Picture 2" descr="A screenshot of a cell phone&#10;&#10;Description generated with very high confidence">
+            <a:extLst>
+              <a:ext uri="{FF2B5EF4-FFF2-40B4-BE49-F238E27FC236}">
+                <a16:creationId xmlns:a16="http://schemas.microsoft.com/office/drawing/2014/main" xmlns="" id="{6DA31AC6-0FD4-4823-BBB0-681B2A6ADF78}"/>
+              </a:ext>
+            </a:extLst>
+          </p:cNvPr>
+          <p:cNvPicPr>
+            <a:picLocks noChangeAspect="1"/>
+          </p:cNvPicPr>
+          <p:nvPr/>
+        </p:nvPicPr>
+        <p:blipFill>
+          <a:blip r:embed="rId2" cstate="print">
+            <a:extLst>
+              <a:ext uri="{28A0092B-C50C-407E-A947-70E740481C1C}">
+                <a14:useLocalDpi xmlns:a14="http://schemas.microsoft.com/office/drawing/2010/main" val="0"/>
+              </a:ext>
+            </a:extLst>
+          </a:blip>
+          <a:stretch>
+            <a:fillRect/>
+          </a:stretch>
+        </p:blipFill>
+        <p:spPr>
+          <a:xfrm>
+            <a:off x="40186" y="0"/>
+            <a:ext cx="9063627" cy="6858000"/>
+          </a:xfrm>
+          <a:prstGeom prst="rect">
+            <a:avLst/>
+          </a:prstGeom>
+        </p:spPr>
+      </p:pic>
+    </p:spTree>
+    <p:extLst>
+      <p:ext uri="{BB962C8B-B14F-4D97-AF65-F5344CB8AC3E}">
+        <p14:creationId xmlns:p14="http://schemas.microsoft.com/office/powerpoint/2010/main" val="3198413972"/>
+      </p:ext>
+    </p:extLst>
+  </p:cSld>
+  <p:clrMapOvr>
+    <a:masterClrMapping/>
+  </p:clrMapOvr>
+  <p:timing>
+    <p:tnLst>
+      <p:par>
+        <p:cTn id="1" dur="indefinite" restart="never" nodeType="tmRoot"/>
+      </p:par>
+    </p:tnLst>
+  </p:timing>
+</p:sld>
+</file>
+
+<file path=ppt/slides/slide12.xml><?xml version="1.0" encoding="utf-8"?>
+<p:sld xmlns:a="http://schemas.openxmlformats.org/drawingml/2006/main" xmlns:r="http://schemas.openxmlformats.org/officeDocument/2006/relationships" xmlns:p="http://schemas.openxmlformats.org/presentationml/2006/main">
+  <p:cSld>
+    <p:spTree>
+      <p:nvGrpSpPr>
+        <p:cNvPr id="1" name=""/>
+        <p:cNvGrpSpPr/>
+        <p:nvPr/>
+      </p:nvGrpSpPr>
+      <p:grpSpPr>
+        <a:xfrm>
+          <a:off x="0" y="0"/>
+          <a:ext cx="0" cy="0"/>
+          <a:chOff x="0" y="0"/>
+          <a:chExt cx="0" cy="0"/>
+        </a:xfrm>
+      </p:grpSpPr>
+      <p:pic>
+        <p:nvPicPr>
+          <p:cNvPr id="3" name="Picture 2" descr="A close up of text on a white background&#10;&#10;Description generated with high confidence">
+            <a:extLst>
+              <a:ext uri="{FF2B5EF4-FFF2-40B4-BE49-F238E27FC236}">
+                <a16:creationId xmlns:a16="http://schemas.microsoft.com/office/drawing/2014/main" xmlns="" id="{691E7D02-A01A-4C51-B34B-8717A90A5B54}"/>
+              </a:ext>
+            </a:extLst>
+          </p:cNvPr>
+          <p:cNvPicPr>
+            <a:picLocks noChangeAspect="1"/>
+          </p:cNvPicPr>
+          <p:nvPr/>
+        </p:nvPicPr>
+        <p:blipFill>
+          <a:blip r:embed="rId2" cstate="print">
+            <a:extLst>
+              <a:ext uri="{28A0092B-C50C-407E-A947-70E740481C1C}">
+                <a14:useLocalDpi xmlns:a14="http://schemas.microsoft.com/office/drawing/2010/main" val="0"/>
+              </a:ext>
+            </a:extLst>
+          </a:blip>
+          <a:stretch>
+            <a:fillRect/>
+          </a:stretch>
+        </p:blipFill>
+        <p:spPr>
+          <a:xfrm>
+            <a:off x="62141" y="0"/>
+            <a:ext cx="9019717" cy="6858000"/>
+          </a:xfrm>
+          <a:prstGeom prst="rect">
+            <a:avLst/>
+          </a:prstGeom>
+        </p:spPr>
+      </p:pic>
+    </p:spTree>
+    <p:extLst>
+      <p:ext uri="{BB962C8B-B14F-4D97-AF65-F5344CB8AC3E}">
+        <p14:creationId xmlns:p14="http://schemas.microsoft.com/office/powerpoint/2010/main" val="2259478953"/>
+      </p:ext>
+    </p:extLst>
+  </p:cSld>
+  <p:clrMapOvr>
+    <a:masterClrMapping/>
+  </p:clrMapOvr>
+  <p:timing>
+    <p:tnLst>
+      <p:par>
+        <p:cTn id="1" dur="indefinite" restart="never" nodeType="tmRoot"/>
+      </p:par>
+    </p:tnLst>
+  </p:timing>
+</p:sld>
+</file>
+
+<file path=ppt/slides/slide13.xml><?xml version="1.0" encoding="utf-8"?>
+<p:sld xmlns:a="http://schemas.openxmlformats.org/drawingml/2006/main" xmlns:r="http://schemas.openxmlformats.org/officeDocument/2006/relationships" xmlns:p="http://schemas.openxmlformats.org/presentationml/2006/main">
+  <p:cSld>
+    <p:spTree>
+      <p:nvGrpSpPr>
+        <p:cNvPr id="1" name=""/>
+        <p:cNvGrpSpPr/>
+        <p:nvPr/>
+      </p:nvGrpSpPr>
+      <p:grpSpPr>
+        <a:xfrm>
+          <a:off x="0" y="0"/>
+          <a:ext cx="0" cy="0"/>
+          <a:chOff x="0" y="0"/>
+          <a:chExt cx="0" cy="0"/>
+        </a:xfrm>
+      </p:grpSpPr>
+      <p:pic>
+        <p:nvPicPr>
+          <p:cNvPr id="3" name="Picture 2" descr="A screenshot of a cell phone&#10;&#10;Description generated with very high confidence">
+            <a:extLst>
+              <a:ext uri="{FF2B5EF4-FFF2-40B4-BE49-F238E27FC236}">
+                <a16:creationId xmlns:a16="http://schemas.microsoft.com/office/drawing/2014/main" xmlns="" id="{5E1653C3-E9F8-43A9-BF34-EBDCD0305308}"/>
+              </a:ext>
+            </a:extLst>
+          </p:cNvPr>
+          <p:cNvPicPr>
+            <a:picLocks noChangeAspect="1"/>
+          </p:cNvPicPr>
+          <p:nvPr/>
+        </p:nvPicPr>
+        <p:blipFill>
+          <a:blip r:embed="rId2" cstate="print">
+            <a:extLst>
+              <a:ext uri="{28A0092B-C50C-407E-A947-70E740481C1C}">
+                <a14:useLocalDpi xmlns:a14="http://schemas.microsoft.com/office/drawing/2010/main" val="0"/>
+              </a:ext>
+            </a:extLst>
+          </a:blip>
+          <a:stretch>
+            <a:fillRect/>
+          </a:stretch>
+        </p:blipFill>
+        <p:spPr>
+          <a:xfrm>
+            <a:off x="36095" y="0"/>
+            <a:ext cx="9071810" cy="6858000"/>
+          </a:xfrm>
+          <a:prstGeom prst="rect">
+            <a:avLst/>
+          </a:prstGeom>
+        </p:spPr>
+      </p:pic>
+    </p:spTree>
+    <p:extLst>
+      <p:ext uri="{BB962C8B-B14F-4D97-AF65-F5344CB8AC3E}">
+        <p14:creationId xmlns:p14="http://schemas.microsoft.com/office/powerpoint/2010/main" val="1412373299"/>
+      </p:ext>
+    </p:extLst>
+  </p:cSld>
+  <p:clrMapOvr>
+    <a:masterClrMapping/>
+  </p:clrMapOvr>
+  <p:timing>
+    <p:tnLst>
+      <p:par>
+        <p:cTn id="1" dur="indefinite" restart="never" nodeType="tmRoot"/>
+      </p:par>
+    </p:tnLst>
+  </p:timing>
+</p:sld>
+</file>
+
+<file path=ppt/slides/slide14.xml><?xml version="1.0" encoding="utf-8"?>
+<p:sld xmlns:a="http://schemas.openxmlformats.org/drawingml/2006/main" xmlns:r="http://schemas.openxmlformats.org/officeDocument/2006/relationships" xmlns:p="http://schemas.openxmlformats.org/presentationml/2006/main">
+  <p:cSld>
+    <p:spTree>
+      <p:nvGrpSpPr>
+        <p:cNvPr id="1" name=""/>
+        <p:cNvGrpSpPr/>
+        <p:nvPr/>
+      </p:nvGrpSpPr>
+      <p:grpSpPr>
+        <a:xfrm>
+          <a:off x="0" y="0"/>
+          <a:ext cx="0" cy="0"/>
+          <a:chOff x="0" y="0"/>
+          <a:chExt cx="0" cy="0"/>
+        </a:xfrm>
+      </p:grpSpPr>
+      <p:pic>
+        <p:nvPicPr>
+          <p:cNvPr id="3" name="Picture 2" descr="A screenshot of a cell phone&#10;&#10;Description generated with very high confidence">
+            <a:extLst>
+              <a:ext uri="{FF2B5EF4-FFF2-40B4-BE49-F238E27FC236}">
+                <a16:creationId xmlns:a16="http://schemas.microsoft.com/office/drawing/2014/main" xmlns="" id="{1BB99D6C-959A-444C-BBCF-791F9F3CA48A}"/>
+              </a:ext>
+            </a:extLst>
+          </p:cNvPr>
+          <p:cNvPicPr>
+            <a:picLocks noChangeAspect="1"/>
+          </p:cNvPicPr>
+          <p:nvPr/>
+        </p:nvPicPr>
+        <p:blipFill>
+          <a:blip r:embed="rId2" cstate="print">
+            <a:extLst>
+              <a:ext uri="{28A0092B-C50C-407E-A947-70E740481C1C}">
+                <a14:useLocalDpi xmlns:a14="http://schemas.microsoft.com/office/drawing/2010/main" val="0"/>
+              </a:ext>
+            </a:extLst>
+          </a:blip>
+          <a:stretch>
+            <a:fillRect/>
+          </a:stretch>
+        </p:blipFill>
+        <p:spPr>
+          <a:xfrm>
+            <a:off x="49696" y="0"/>
+            <a:ext cx="9044608" cy="6858000"/>
+          </a:xfrm>
+          <a:prstGeom prst="rect">
+            <a:avLst/>
+          </a:prstGeom>
+        </p:spPr>
+      </p:pic>
+    </p:spTree>
+    <p:extLst>
+      <p:ext uri="{BB962C8B-B14F-4D97-AF65-F5344CB8AC3E}">
+        <p14:creationId xmlns:p14="http://schemas.microsoft.com/office/powerpoint/2010/main" val="342653159"/>
+      </p:ext>
+    </p:extLst>
+  </p:cSld>
+  <p:clrMapOvr>
+    <a:masterClrMapping/>
+  </p:clrMapOvr>
+  <p:timing>
+    <p:tnLst>
+      <p:par>
+        <p:cTn id="1" dur="indefinite" restart="never" nodeType="tmRoot"/>
+      </p:par>
+    </p:tnLst>
+  </p:timing>
+</p:sld>
+</file>
+
+<file path=ppt/slides/slide15.xml><?xml version="1.0" encoding="utf-8"?>
+<p:sld xmlns:a="http://schemas.openxmlformats.org/drawingml/2006/main" xmlns:r="http://schemas.openxmlformats.org/officeDocument/2006/relationships" xmlns:p="http://schemas.openxmlformats.org/presentationml/2006/main">
+  <p:cSld>
+    <p:spTree>
+      <p:nvGrpSpPr>
+        <p:cNvPr id="1" name=""/>
+        <p:cNvGrpSpPr/>
+        <p:nvPr/>
+      </p:nvGrpSpPr>
+      <p:grpSpPr>
+        <a:xfrm>
+          <a:off x="0" y="0"/>
+          <a:ext cx="0" cy="0"/>
+          <a:chOff x="0" y="0"/>
+          <a:chExt cx="0" cy="0"/>
+        </a:xfrm>
+      </p:grpSpPr>
+      <p:sp>
+        <p:nvSpPr>
+          <p:cNvPr id="2" name="Title 1"/>
+          <p:cNvSpPr txBox="1">
+            <a:spLocks/>
+          </p:cNvSpPr>
+          <p:nvPr/>
+        </p:nvSpPr>
+        <p:spPr>
+          <a:xfrm>
+            <a:off x="628650" y="365126"/>
+            <a:ext cx="7886700" cy="1325563"/>
+          </a:xfrm>
+          <a:prstGeom prst="rect">
+            <a:avLst/>
+          </a:prstGeom>
+        </p:spPr>
+        <p:txBody>
+          <a:bodyPr/>
+          <a:lstStyle>
+            <a:lvl1pPr algn="l" defTabSz="914400" rtl="0" eaLnBrk="1" latinLnBrk="0" hangingPunct="1">
+              <a:lnSpc>
+                <a:spcPct val="90000"/>
+              </a:lnSpc>
+              <a:spcBef>
+                <a:spcPct val="0"/>
+              </a:spcBef>
+              <a:buNone/>
+              <a:defRPr sz="4400" kern="1200">
+                <a:solidFill>
+                  <a:schemeClr val="tx1"/>
+                </a:solidFill>
+                <a:latin typeface="+mj-lt"/>
+                <a:ea typeface="+mj-ea"/>
+                <a:cs typeface="+mj-cs"/>
+              </a:defRPr>
+            </a:lvl1pPr>
+          </a:lstStyle>
+          <a:p>
+            <a:r>
+              <a:rPr lang="en-GB" smtClean="0"/>
+              <a:t>Walkthrough</a:t>
+            </a:r>
+            <a:endParaRPr lang="en-GB" dirty="0"/>
+          </a:p>
+        </p:txBody>
+      </p:sp>
+    </p:spTree>
+    <p:extLst>
+      <p:ext uri="{BB962C8B-B14F-4D97-AF65-F5344CB8AC3E}">
+        <p14:creationId xmlns:p14="http://schemas.microsoft.com/office/powerpoint/2010/main" val="1733838519"/>
       </p:ext>
     </p:extLst>
   </p:cSld>
@@ -3058,12 +3514,773 @@
           <a:chExt cx="0" cy="0"/>
         </a:xfrm>
       </p:grpSpPr>
+      <p:sp>
+        <p:nvSpPr>
+          <p:cNvPr id="2" name="Title 1"/>
+          <p:cNvSpPr>
+            <a:spLocks noGrp="1"/>
+          </p:cNvSpPr>
+          <p:nvPr>
+            <p:ph type="title"/>
+          </p:nvPr>
+        </p:nvSpPr>
+        <p:spPr/>
+        <p:txBody>
+          <a:bodyPr/>
+          <a:lstStyle/>
+          <a:p>
+            <a:r>
+              <a:rPr lang="en-GB" dirty="0" smtClean="0"/>
+              <a:t>Overview</a:t>
+            </a:r>
+            <a:endParaRPr lang="en-GB" dirty="0"/>
+          </a:p>
+        </p:txBody>
+      </p:sp>
+      <p:sp>
+        <p:nvSpPr>
+          <p:cNvPr id="3" name="Content Placeholder 2"/>
+          <p:cNvSpPr>
+            <a:spLocks noGrp="1"/>
+          </p:cNvSpPr>
+          <p:nvPr>
+            <p:ph idx="1"/>
+          </p:nvPr>
+        </p:nvSpPr>
+        <p:spPr/>
+        <p:txBody>
+          <a:bodyPr/>
+          <a:lstStyle/>
+          <a:p>
+            <a:r>
+              <a:rPr lang="en-GB" dirty="0" smtClean="0"/>
+              <a:t>Show users events local to them via list of event items or visually via </a:t>
+            </a:r>
+            <a:r>
+              <a:rPr lang="en-GB" dirty="0" err="1" smtClean="0"/>
+              <a:t>Gmaps</a:t>
+            </a:r>
+            <a:r>
+              <a:rPr lang="en-GB" dirty="0" smtClean="0"/>
+              <a:t> API</a:t>
+            </a:r>
+          </a:p>
+          <a:p>
+            <a:r>
+              <a:rPr lang="en-GB" dirty="0" smtClean="0"/>
+              <a:t>Events filterable based on tags, </a:t>
+            </a:r>
+            <a:r>
+              <a:rPr lang="en-GB" dirty="0" err="1" smtClean="0"/>
+              <a:t>datetime</a:t>
+            </a:r>
+            <a:r>
+              <a:rPr lang="en-GB" dirty="0" smtClean="0"/>
+              <a:t> of event, category, location etc.</a:t>
+            </a:r>
+          </a:p>
+          <a:p>
+            <a:r>
+              <a:rPr lang="en-GB" dirty="0" smtClean="0"/>
+              <a:t>Users that are logged in are able to create and event. </a:t>
+            </a:r>
+          </a:p>
+          <a:p>
+            <a:r>
+              <a:rPr lang="en-GB" dirty="0" smtClean="0"/>
+              <a:t>Anyone can view events</a:t>
+            </a:r>
+          </a:p>
+          <a:p>
+            <a:r>
+              <a:rPr lang="en-GB" dirty="0" smtClean="0"/>
+              <a:t>Follow certain users to be notified of their events</a:t>
+            </a:r>
+            <a:endParaRPr lang="en-GB" dirty="0"/>
+          </a:p>
+        </p:txBody>
+      </p:sp>
+    </p:spTree>
+    <p:extLst>
+      <p:ext uri="{BB962C8B-B14F-4D97-AF65-F5344CB8AC3E}">
+        <p14:creationId xmlns:p14="http://schemas.microsoft.com/office/powerpoint/2010/main" val="3895398988"/>
+      </p:ext>
+    </p:extLst>
+  </p:cSld>
+  <p:clrMapOvr>
+    <a:masterClrMapping/>
+  </p:clrMapOvr>
+  <p:timing>
+    <p:tnLst>
+      <p:par>
+        <p:cTn id="1" dur="indefinite" restart="never" nodeType="tmRoot"/>
+      </p:par>
+    </p:tnLst>
+  </p:timing>
+</p:sld>
+</file>
+
+<file path=ppt/slides/slide3.xml><?xml version="1.0" encoding="utf-8"?>
+<p:sld xmlns:a="http://schemas.openxmlformats.org/drawingml/2006/main" xmlns:r="http://schemas.openxmlformats.org/officeDocument/2006/relationships" xmlns:p="http://schemas.openxmlformats.org/presentationml/2006/main">
+  <p:cSld>
+    <p:spTree>
+      <p:nvGrpSpPr>
+        <p:cNvPr id="1" name=""/>
+        <p:cNvGrpSpPr/>
+        <p:nvPr/>
+      </p:nvGrpSpPr>
+      <p:grpSpPr>
+        <a:xfrm>
+          <a:off x="0" y="0"/>
+          <a:ext cx="0" cy="0"/>
+          <a:chOff x="0" y="0"/>
+          <a:chExt cx="0" cy="0"/>
+        </a:xfrm>
+      </p:grpSpPr>
+      <p:sp>
+        <p:nvSpPr>
+          <p:cNvPr id="2" name="Title 1"/>
+          <p:cNvSpPr>
+            <a:spLocks noGrp="1"/>
+          </p:cNvSpPr>
+          <p:nvPr>
+            <p:ph type="title"/>
+          </p:nvPr>
+        </p:nvSpPr>
+        <p:spPr>
+          <a:xfrm>
+            <a:off x="532397" y="389730"/>
+            <a:ext cx="7886700" cy="1325563"/>
+          </a:xfrm>
+        </p:spPr>
+        <p:txBody>
+          <a:bodyPr/>
+          <a:lstStyle/>
+          <a:p>
+            <a:r>
+              <a:rPr lang="en-GB" dirty="0" smtClean="0"/>
+              <a:t>Personas - Mercedes</a:t>
+            </a:r>
+            <a:endParaRPr lang="en-GB" dirty="0"/>
+          </a:p>
+        </p:txBody>
+      </p:sp>
+      <p:sp>
+        <p:nvSpPr>
+          <p:cNvPr id="3" name="Content Placeholder 2"/>
+          <p:cNvSpPr>
+            <a:spLocks noGrp="1"/>
+          </p:cNvSpPr>
+          <p:nvPr>
+            <p:ph idx="1"/>
+          </p:nvPr>
+        </p:nvSpPr>
+        <p:spPr>
+          <a:xfrm>
+            <a:off x="628650" y="2105023"/>
+            <a:ext cx="7886700" cy="4351338"/>
+          </a:xfrm>
+        </p:spPr>
+        <p:txBody>
+          <a:bodyPr/>
+          <a:lstStyle/>
+          <a:p>
+            <a:r>
+              <a:rPr lang="en-GB" dirty="0" smtClean="0"/>
+              <a:t>20-year-old </a:t>
+            </a:r>
+            <a:r>
+              <a:rPr lang="en-GB" dirty="0"/>
+              <a:t>promoter </a:t>
+            </a:r>
+            <a:r>
+              <a:rPr lang="en-GB" dirty="0" smtClean="0"/>
+              <a:t>for club </a:t>
+            </a:r>
+            <a:r>
+              <a:rPr lang="en-GB" dirty="0"/>
+              <a:t>in Glasgow</a:t>
+            </a:r>
+            <a:r>
+              <a:rPr lang="en-GB" dirty="0" smtClean="0"/>
+              <a:t>.</a:t>
+            </a:r>
+          </a:p>
+          <a:p>
+            <a:r>
+              <a:rPr lang="en-GB" dirty="0" smtClean="0"/>
+              <a:t> Her Job means she must promote her club and events to locals via social media.</a:t>
+            </a:r>
+          </a:p>
+          <a:p>
+            <a:r>
+              <a:rPr lang="en-GB" dirty="0" smtClean="0"/>
+              <a:t> Fed up </a:t>
+            </a:r>
+            <a:r>
+              <a:rPr lang="en-GB" dirty="0"/>
+              <a:t>of </a:t>
+            </a:r>
+            <a:r>
+              <a:rPr lang="en-GB" dirty="0" smtClean="0"/>
+              <a:t>advertising via flyers to people new to the area as they don’t </a:t>
+            </a:r>
+            <a:r>
+              <a:rPr lang="en-GB" dirty="0"/>
+              <a:t>know any </a:t>
+            </a:r>
+            <a:r>
+              <a:rPr lang="en-GB" dirty="0" smtClean="0"/>
+              <a:t>venues</a:t>
+            </a:r>
+          </a:p>
+          <a:p>
+            <a:r>
+              <a:rPr lang="en-GB" dirty="0" smtClean="0"/>
+              <a:t> Would prefer if </a:t>
+            </a:r>
+            <a:r>
+              <a:rPr lang="en-GB" dirty="0"/>
+              <a:t>she could list social events on an app </a:t>
+            </a:r>
+            <a:r>
+              <a:rPr lang="en-GB" dirty="0" smtClean="0"/>
+              <a:t>that people new to the area check to </a:t>
+            </a:r>
+            <a:r>
+              <a:rPr lang="en-GB" dirty="0"/>
+              <a:t>see rather than doing strenuous manual labour</a:t>
+            </a:r>
+            <a:r>
+              <a:rPr lang="en-GB" dirty="0" smtClean="0"/>
+              <a:t>. Allowing her to do all her work online.</a:t>
+            </a:r>
+            <a:endParaRPr lang="en-GB" dirty="0"/>
+          </a:p>
+          <a:p>
+            <a:endParaRPr lang="en-GB" dirty="0"/>
+          </a:p>
+        </p:txBody>
+      </p:sp>
+      <p:pic>
+        <p:nvPicPr>
+          <p:cNvPr id="5" name="Picture 4"/>
+          <p:cNvPicPr/>
+          <p:nvPr/>
+        </p:nvPicPr>
+        <p:blipFill>
+          <a:blip r:embed="rId2"/>
+          <a:stretch>
+            <a:fillRect/>
+          </a:stretch>
+        </p:blipFill>
+        <p:spPr>
+          <a:xfrm>
+            <a:off x="5427746" y="-2"/>
+            <a:ext cx="3800475" cy="2105025"/>
+          </a:xfrm>
+          <a:prstGeom prst="rect">
+            <a:avLst/>
+          </a:prstGeom>
+        </p:spPr>
+      </p:pic>
+    </p:spTree>
+    <p:extLst>
+      <p:ext uri="{BB962C8B-B14F-4D97-AF65-F5344CB8AC3E}">
+        <p14:creationId xmlns:p14="http://schemas.microsoft.com/office/powerpoint/2010/main" val="4028098492"/>
+      </p:ext>
+    </p:extLst>
+  </p:cSld>
+  <p:clrMapOvr>
+    <a:masterClrMapping/>
+  </p:clrMapOvr>
+  <p:timing>
+    <p:tnLst>
+      <p:par>
+        <p:cTn id="1" dur="indefinite" restart="never" nodeType="tmRoot"/>
+      </p:par>
+    </p:tnLst>
+  </p:timing>
+</p:sld>
+</file>
+
+<file path=ppt/slides/slide4.xml><?xml version="1.0" encoding="utf-8"?>
+<p:sld xmlns:a="http://schemas.openxmlformats.org/drawingml/2006/main" xmlns:r="http://schemas.openxmlformats.org/officeDocument/2006/relationships" xmlns:p="http://schemas.openxmlformats.org/presentationml/2006/main">
+  <p:cSld>
+    <p:spTree>
+      <p:nvGrpSpPr>
+        <p:cNvPr id="1" name=""/>
+        <p:cNvGrpSpPr/>
+        <p:nvPr/>
+      </p:nvGrpSpPr>
+      <p:grpSpPr>
+        <a:xfrm>
+          <a:off x="0" y="0"/>
+          <a:ext cx="0" cy="0"/>
+          <a:chOff x="0" y="0"/>
+          <a:chExt cx="0" cy="0"/>
+        </a:xfrm>
+      </p:grpSpPr>
+      <p:sp>
+        <p:nvSpPr>
+          <p:cNvPr id="2" name="Title 1"/>
+          <p:cNvSpPr>
+            <a:spLocks noGrp="1"/>
+          </p:cNvSpPr>
+          <p:nvPr>
+            <p:ph type="title"/>
+          </p:nvPr>
+        </p:nvSpPr>
+        <p:spPr/>
+        <p:txBody>
+          <a:bodyPr/>
+          <a:lstStyle/>
+          <a:p>
+            <a:r>
+              <a:rPr lang="en-GB" dirty="0" smtClean="0"/>
+              <a:t>Personas - Ken</a:t>
+            </a:r>
+            <a:endParaRPr lang="en-GB" dirty="0"/>
+          </a:p>
+        </p:txBody>
+      </p:sp>
+      <p:sp>
+        <p:nvSpPr>
+          <p:cNvPr id="3" name="Content Placeholder 2"/>
+          <p:cNvSpPr>
+            <a:spLocks noGrp="1"/>
+          </p:cNvSpPr>
+          <p:nvPr>
+            <p:ph idx="1"/>
+          </p:nvPr>
+        </p:nvSpPr>
+        <p:spPr>
+          <a:xfrm>
+            <a:off x="628650" y="2018131"/>
+            <a:ext cx="7886700" cy="4351338"/>
+          </a:xfrm>
+        </p:spPr>
+        <p:txBody>
+          <a:bodyPr/>
+          <a:lstStyle/>
+          <a:p>
+            <a:r>
+              <a:rPr lang="en-GB" dirty="0" smtClean="0"/>
+              <a:t>18 </a:t>
+            </a:r>
+            <a:r>
+              <a:rPr lang="en-GB" dirty="0" err="1" smtClean="0"/>
+              <a:t>yr</a:t>
+            </a:r>
+            <a:r>
+              <a:rPr lang="en-GB" dirty="0" smtClean="0"/>
+              <a:t> old foreign exchange from Amsterdam</a:t>
+            </a:r>
+          </a:p>
+          <a:p>
+            <a:r>
+              <a:rPr lang="en-GB" dirty="0" smtClean="0"/>
+              <a:t>Doesn’t know anyone in his new city</a:t>
+            </a:r>
+          </a:p>
+          <a:p>
+            <a:r>
+              <a:rPr lang="en-GB" dirty="0" smtClean="0"/>
+              <a:t>Doesn’t know what’s going on in </a:t>
+            </a:r>
+            <a:r>
+              <a:rPr lang="en-GB" dirty="0" err="1" smtClean="0"/>
+              <a:t>freshers</a:t>
+            </a:r>
+            <a:endParaRPr lang="en-GB" dirty="0" smtClean="0"/>
+          </a:p>
+          <a:p>
+            <a:r>
+              <a:rPr lang="en-GB" dirty="0" smtClean="0"/>
+              <a:t>Doesn’t handle verbal directions well due to language barrier so has gotten lost</a:t>
+            </a:r>
+          </a:p>
+          <a:p>
+            <a:r>
+              <a:rPr lang="en-GB" dirty="0" smtClean="0"/>
+              <a:t>Wants to see socials that are happening in the near future so he can make friends and needs a map to guide him to the location so he won’t get lost again.</a:t>
+            </a:r>
+            <a:endParaRPr lang="en-GB" dirty="0"/>
+          </a:p>
+        </p:txBody>
+      </p:sp>
+      <p:pic>
+        <p:nvPicPr>
+          <p:cNvPr id="4" name="Picture 3"/>
+          <p:cNvPicPr/>
+          <p:nvPr/>
+        </p:nvPicPr>
+        <p:blipFill>
+          <a:blip r:embed="rId2"/>
+          <a:stretch>
+            <a:fillRect/>
+          </a:stretch>
+        </p:blipFill>
+        <p:spPr>
+          <a:xfrm>
+            <a:off x="5944603" y="-57943"/>
+            <a:ext cx="3295650" cy="2171700"/>
+          </a:xfrm>
+          <a:prstGeom prst="rect">
+            <a:avLst/>
+          </a:prstGeom>
+        </p:spPr>
+      </p:pic>
+    </p:spTree>
+    <p:extLst>
+      <p:ext uri="{BB962C8B-B14F-4D97-AF65-F5344CB8AC3E}">
+        <p14:creationId xmlns:p14="http://schemas.microsoft.com/office/powerpoint/2010/main" val="1863676379"/>
+      </p:ext>
+    </p:extLst>
+  </p:cSld>
+  <p:clrMapOvr>
+    <a:masterClrMapping/>
+  </p:clrMapOvr>
+  <p:timing>
+    <p:tnLst>
+      <p:par>
+        <p:cTn id="1" dur="indefinite" restart="never" nodeType="tmRoot"/>
+      </p:par>
+    </p:tnLst>
+  </p:timing>
+</p:sld>
+</file>
+
+<file path=ppt/slides/slide5.xml><?xml version="1.0" encoding="utf-8"?>
+<p:sld xmlns:a="http://schemas.openxmlformats.org/drawingml/2006/main" xmlns:r="http://schemas.openxmlformats.org/officeDocument/2006/relationships" xmlns:p="http://schemas.openxmlformats.org/presentationml/2006/main">
+  <p:cSld>
+    <p:spTree>
+      <p:nvGrpSpPr>
+        <p:cNvPr id="1" name=""/>
+        <p:cNvGrpSpPr/>
+        <p:nvPr/>
+      </p:nvGrpSpPr>
+      <p:grpSpPr>
+        <a:xfrm>
+          <a:off x="0" y="0"/>
+          <a:ext cx="0" cy="0"/>
+          <a:chOff x="0" y="0"/>
+          <a:chExt cx="0" cy="0"/>
+        </a:xfrm>
+      </p:grpSpPr>
+      <p:sp>
+        <p:nvSpPr>
+          <p:cNvPr id="2" name="Title 1"/>
+          <p:cNvSpPr>
+            <a:spLocks noGrp="1"/>
+          </p:cNvSpPr>
+          <p:nvPr>
+            <p:ph type="title"/>
+          </p:nvPr>
+        </p:nvSpPr>
+        <p:spPr/>
+        <p:txBody>
+          <a:bodyPr/>
+          <a:lstStyle/>
+          <a:p>
+            <a:r>
+              <a:rPr lang="en-GB" dirty="0" smtClean="0"/>
+              <a:t>Personas - Sam</a:t>
+            </a:r>
+            <a:endParaRPr lang="en-GB" dirty="0"/>
+          </a:p>
+        </p:txBody>
+      </p:sp>
+      <p:sp>
+        <p:nvSpPr>
+          <p:cNvPr id="3" name="Content Placeholder 2"/>
+          <p:cNvSpPr>
+            <a:spLocks noGrp="1"/>
+          </p:cNvSpPr>
+          <p:nvPr>
+            <p:ph idx="1"/>
+          </p:nvPr>
+        </p:nvSpPr>
+        <p:spPr/>
+        <p:txBody>
+          <a:bodyPr/>
+          <a:lstStyle/>
+          <a:p>
+            <a:r>
+              <a:rPr lang="en-GB" dirty="0" smtClean="0"/>
+              <a:t>Member of several clubs and societies</a:t>
+            </a:r>
+          </a:p>
+          <a:p>
+            <a:r>
+              <a:rPr lang="en-GB" dirty="0" smtClean="0"/>
+              <a:t>Doesn’t use social media so ends up missing events as they’re only publicised on there</a:t>
+            </a:r>
+          </a:p>
+          <a:p>
+            <a:r>
+              <a:rPr lang="en-GB" dirty="0" smtClean="0"/>
+              <a:t>Wants to see events for all societies he is a part of in one place</a:t>
+            </a:r>
+            <a:endParaRPr lang="en-GB" dirty="0"/>
+          </a:p>
+        </p:txBody>
+      </p:sp>
+      <p:pic>
+        <p:nvPicPr>
+          <p:cNvPr id="5" name="Picture 4" descr="Image result for stressed guy at computer stock no watermark"/>
+          <p:cNvPicPr/>
+          <p:nvPr/>
+        </p:nvPicPr>
+        <p:blipFill>
+          <a:blip r:embed="rId2">
+            <a:extLst>
+              <a:ext uri="{28A0092B-C50C-407E-A947-70E740481C1C}">
+                <a14:useLocalDpi xmlns:a14="http://schemas.microsoft.com/office/drawing/2010/main" val="0"/>
+              </a:ext>
+            </a:extLst>
+          </a:blip>
+          <a:srcRect/>
+          <a:stretch>
+            <a:fillRect/>
+          </a:stretch>
+        </p:blipFill>
+        <p:spPr bwMode="auto">
+          <a:xfrm>
+            <a:off x="4042610" y="3693695"/>
+            <a:ext cx="5101389" cy="3164305"/>
+          </a:xfrm>
+          <a:prstGeom prst="rect">
+            <a:avLst/>
+          </a:prstGeom>
+          <a:noFill/>
+          <a:ln>
+            <a:noFill/>
+          </a:ln>
+        </p:spPr>
+      </p:pic>
+    </p:spTree>
+    <p:extLst>
+      <p:ext uri="{BB962C8B-B14F-4D97-AF65-F5344CB8AC3E}">
+        <p14:creationId xmlns:p14="http://schemas.microsoft.com/office/powerpoint/2010/main" val="871530353"/>
+      </p:ext>
+    </p:extLst>
+  </p:cSld>
+  <p:clrMapOvr>
+    <a:masterClrMapping/>
+  </p:clrMapOvr>
+  <p:timing>
+    <p:tnLst>
+      <p:par>
+        <p:cTn id="1" dur="indefinite" restart="never" nodeType="tmRoot"/>
+      </p:par>
+    </p:tnLst>
+  </p:timing>
+</p:sld>
+</file>
+
+<file path=ppt/slides/slide6.xml><?xml version="1.0" encoding="utf-8"?>
+<p:sld xmlns:a="http://schemas.openxmlformats.org/drawingml/2006/main" xmlns:r="http://schemas.openxmlformats.org/officeDocument/2006/relationships" xmlns:p="http://schemas.openxmlformats.org/presentationml/2006/main">
+  <p:cSld>
+    <p:spTree>
+      <p:nvGrpSpPr>
+        <p:cNvPr id="1" name=""/>
+        <p:cNvGrpSpPr/>
+        <p:nvPr/>
+      </p:nvGrpSpPr>
+      <p:grpSpPr>
+        <a:xfrm>
+          <a:off x="0" y="0"/>
+          <a:ext cx="0" cy="0"/>
+          <a:chOff x="0" y="0"/>
+          <a:chExt cx="0" cy="0"/>
+        </a:xfrm>
+      </p:grpSpPr>
+      <p:sp>
+        <p:nvSpPr>
+          <p:cNvPr id="2" name="Title 1"/>
+          <p:cNvSpPr>
+            <a:spLocks noGrp="1"/>
+          </p:cNvSpPr>
+          <p:nvPr>
+            <p:ph type="title"/>
+          </p:nvPr>
+        </p:nvSpPr>
+        <p:spPr/>
+        <p:txBody>
+          <a:bodyPr/>
+          <a:lstStyle/>
+          <a:p>
+            <a:r>
+              <a:rPr lang="en-GB" dirty="0" smtClean="0"/>
+              <a:t>Specification - </a:t>
+            </a:r>
+            <a:r>
+              <a:rPr lang="en-GB" dirty="0"/>
+              <a:t>Minimum Requirements </a:t>
+            </a:r>
+          </a:p>
+        </p:txBody>
+      </p:sp>
+      <p:sp>
+        <p:nvSpPr>
+          <p:cNvPr id="3" name="Content Placeholder 2"/>
+          <p:cNvSpPr>
+            <a:spLocks noGrp="1"/>
+          </p:cNvSpPr>
+          <p:nvPr>
+            <p:ph idx="1"/>
+          </p:nvPr>
+        </p:nvSpPr>
+        <p:spPr/>
+        <p:txBody>
+          <a:bodyPr/>
+          <a:lstStyle/>
+          <a:p>
+            <a:r>
+              <a:rPr lang="en-GB" dirty="0" smtClean="0"/>
+              <a:t>Event items show location, </a:t>
+            </a:r>
+            <a:r>
+              <a:rPr lang="en-GB" dirty="0" err="1" smtClean="0"/>
+              <a:t>datetime</a:t>
+            </a:r>
+            <a:r>
+              <a:rPr lang="en-GB" dirty="0" smtClean="0"/>
+              <a:t>, description and host</a:t>
+            </a:r>
+          </a:p>
+          <a:p>
+            <a:r>
+              <a:rPr lang="en-GB" dirty="0" smtClean="0"/>
+              <a:t>User sign in functionality</a:t>
+            </a:r>
+          </a:p>
+          <a:p>
+            <a:r>
+              <a:rPr lang="en-GB" dirty="0" smtClean="0"/>
+              <a:t>Signed in users can create events</a:t>
+            </a:r>
+          </a:p>
+          <a:p>
+            <a:r>
+              <a:rPr lang="en-GB" dirty="0" smtClean="0"/>
+              <a:t>Anyone can browse events and sort by date and location</a:t>
+            </a:r>
+          </a:p>
+          <a:p>
+            <a:endParaRPr lang="en-GB" dirty="0" smtClean="0"/>
+          </a:p>
+        </p:txBody>
+      </p:sp>
+    </p:spTree>
+    <p:extLst>
+      <p:ext uri="{BB962C8B-B14F-4D97-AF65-F5344CB8AC3E}">
+        <p14:creationId xmlns:p14="http://schemas.microsoft.com/office/powerpoint/2010/main" val="3947202687"/>
+      </p:ext>
+    </p:extLst>
+  </p:cSld>
+  <p:clrMapOvr>
+    <a:masterClrMapping/>
+  </p:clrMapOvr>
+</p:sld>
+</file>
+
+<file path=ppt/slides/slide7.xml><?xml version="1.0" encoding="utf-8"?>
+<p:sld xmlns:a="http://schemas.openxmlformats.org/drawingml/2006/main" xmlns:r="http://schemas.openxmlformats.org/officeDocument/2006/relationships" xmlns:p="http://schemas.openxmlformats.org/presentationml/2006/main">
+  <p:cSld>
+    <p:spTree>
+      <p:nvGrpSpPr>
+        <p:cNvPr id="1" name=""/>
+        <p:cNvGrpSpPr/>
+        <p:nvPr/>
+      </p:nvGrpSpPr>
+      <p:grpSpPr>
+        <a:xfrm>
+          <a:off x="0" y="0"/>
+          <a:ext cx="0" cy="0"/>
+          <a:chOff x="0" y="0"/>
+          <a:chExt cx="0" cy="0"/>
+        </a:xfrm>
+      </p:grpSpPr>
+      <p:sp>
+        <p:nvSpPr>
+          <p:cNvPr id="2" name="Title 1"/>
+          <p:cNvSpPr>
+            <a:spLocks noGrp="1"/>
+          </p:cNvSpPr>
+          <p:nvPr>
+            <p:ph type="title"/>
+          </p:nvPr>
+        </p:nvSpPr>
+        <p:spPr/>
+        <p:txBody>
+          <a:bodyPr/>
+          <a:lstStyle/>
+          <a:p>
+            <a:r>
+              <a:rPr lang="en-GB" dirty="0" smtClean="0"/>
+              <a:t>System Architecture Diagram</a:t>
+            </a:r>
+            <a:endParaRPr lang="en-GB" dirty="0"/>
+          </a:p>
+        </p:txBody>
+      </p:sp>
+      <p:sp>
+        <p:nvSpPr>
+          <p:cNvPr id="3" name="Content Placeholder 2"/>
+          <p:cNvSpPr>
+            <a:spLocks noGrp="1"/>
+          </p:cNvSpPr>
+          <p:nvPr>
+            <p:ph idx="1"/>
+          </p:nvPr>
+        </p:nvSpPr>
+        <p:spPr/>
+        <p:txBody>
+          <a:bodyPr/>
+          <a:lstStyle/>
+          <a:p>
+            <a:endParaRPr lang="en-GB" dirty="0"/>
+          </a:p>
+        </p:txBody>
+      </p:sp>
+    </p:spTree>
+    <p:extLst>
+      <p:ext uri="{BB962C8B-B14F-4D97-AF65-F5344CB8AC3E}">
+        <p14:creationId xmlns:p14="http://schemas.microsoft.com/office/powerpoint/2010/main" val="3903864967"/>
+      </p:ext>
+    </p:extLst>
+  </p:cSld>
+  <p:clrMapOvr>
+    <a:masterClrMapping/>
+  </p:clrMapOvr>
+</p:sld>
+</file>
+
+<file path=ppt/slides/slide8.xml><?xml version="1.0" encoding="utf-8"?>
+<p:sld xmlns:a="http://schemas.openxmlformats.org/drawingml/2006/main" xmlns:r="http://schemas.openxmlformats.org/officeDocument/2006/relationships" xmlns:p="http://schemas.openxmlformats.org/presentationml/2006/main">
+  <p:cSld>
+    <p:spTree>
+      <p:nvGrpSpPr>
+        <p:cNvPr id="1" name=""/>
+        <p:cNvGrpSpPr/>
+        <p:nvPr/>
+      </p:nvGrpSpPr>
+      <p:grpSpPr>
+        <a:xfrm>
+          <a:off x="0" y="0"/>
+          <a:ext cx="0" cy="0"/>
+          <a:chOff x="0" y="0"/>
+          <a:chExt cx="0" cy="0"/>
+        </a:xfrm>
+      </p:grpSpPr>
       <p:graphicFrame>
         <p:nvGraphicFramePr>
           <p:cNvPr id="5" name="Table 4">
             <a:extLst>
               <a:ext uri="{FF2B5EF4-FFF2-40B4-BE49-F238E27FC236}">
-                <a16:creationId xmlns:a16="http://schemas.microsoft.com/office/drawing/2014/main" id="{365EDA1F-1541-4126-934C-CA43CF471398}"/>
+                <a16:creationId xmlns:a16="http://schemas.microsoft.com/office/drawing/2014/main" xmlns="" id="{365EDA1F-1541-4126-934C-CA43CF471398}"/>
               </a:ext>
             </a:extLst>
           </p:cNvPr>
@@ -3092,14 +4309,14 @@
                 <a:gridCol w="1038272">
                   <a:extLst>
                     <a:ext uri="{9D8B030D-6E8A-4147-A177-3AD203B41FA5}">
-                      <a16:colId xmlns:a16="http://schemas.microsoft.com/office/drawing/2014/main" val="878989178"/>
+                      <a16:colId xmlns:a16="http://schemas.microsoft.com/office/drawing/2014/main" xmlns="" val="878989178"/>
                     </a:ext>
                   </a:extLst>
                 </a:gridCol>
                 <a:gridCol w="1038272">
                   <a:extLst>
                     <a:ext uri="{9D8B030D-6E8A-4147-A177-3AD203B41FA5}">
-                      <a16:colId xmlns:a16="http://schemas.microsoft.com/office/drawing/2014/main" val="1781752622"/>
+                      <a16:colId xmlns:a16="http://schemas.microsoft.com/office/drawing/2014/main" xmlns="" val="1781752622"/>
                     </a:ext>
                   </a:extLst>
                 </a:gridCol>
@@ -3133,7 +4350,7 @@
                 </a:tc>
                 <a:extLst>
                   <a:ext uri="{0D108BD9-81ED-4DB2-BD59-A6C34878D82A}">
-                    <a16:rowId xmlns:a16="http://schemas.microsoft.com/office/drawing/2014/main" val="2130340444"/>
+                    <a16:rowId xmlns:a16="http://schemas.microsoft.com/office/drawing/2014/main" xmlns="" val="2130340444"/>
                   </a:ext>
                 </a:extLst>
               </a:tr>
@@ -3166,7 +4383,7 @@
                 </a:tc>
                 <a:extLst>
                   <a:ext uri="{0D108BD9-81ED-4DB2-BD59-A6C34878D82A}">
-                    <a16:rowId xmlns:a16="http://schemas.microsoft.com/office/drawing/2014/main" val="81030552"/>
+                    <a16:rowId xmlns:a16="http://schemas.microsoft.com/office/drawing/2014/main" xmlns="" val="81030552"/>
                   </a:ext>
                 </a:extLst>
               </a:tr>
@@ -3200,7 +4417,7 @@
                 </a:tc>
                 <a:extLst>
                   <a:ext uri="{0D108BD9-81ED-4DB2-BD59-A6C34878D82A}">
-                    <a16:rowId xmlns:a16="http://schemas.microsoft.com/office/drawing/2014/main" val="3671086148"/>
+                    <a16:rowId xmlns:a16="http://schemas.microsoft.com/office/drawing/2014/main" xmlns="" val="3671086148"/>
                   </a:ext>
                 </a:extLst>
               </a:tr>
@@ -3233,7 +4450,7 @@
                 </a:tc>
                 <a:extLst>
                   <a:ext uri="{0D108BD9-81ED-4DB2-BD59-A6C34878D82A}">
-                    <a16:rowId xmlns:a16="http://schemas.microsoft.com/office/drawing/2014/main" val="1672081942"/>
+                    <a16:rowId xmlns:a16="http://schemas.microsoft.com/office/drawing/2014/main" xmlns="" val="1672081942"/>
                   </a:ext>
                 </a:extLst>
               </a:tr>
@@ -3246,7 +4463,7 @@
           <p:cNvPr id="6" name="TextBox 5">
             <a:extLst>
               <a:ext uri="{FF2B5EF4-FFF2-40B4-BE49-F238E27FC236}">
-                <a16:creationId xmlns:a16="http://schemas.microsoft.com/office/drawing/2014/main" id="{DB6A7B9B-F972-4130-9A6E-F0FECA868C7C}"/>
+                <a16:creationId xmlns:a16="http://schemas.microsoft.com/office/drawing/2014/main" xmlns="" id="{DB6A7B9B-F972-4130-9A6E-F0FECA868C7C}"/>
               </a:ext>
             </a:extLst>
           </p:cNvPr>
@@ -3282,7 +4499,7 @@
           <p:cNvPr id="10" name="Table 9">
             <a:extLst>
               <a:ext uri="{FF2B5EF4-FFF2-40B4-BE49-F238E27FC236}">
-                <a16:creationId xmlns:a16="http://schemas.microsoft.com/office/drawing/2014/main" id="{8B74C660-078B-4C7C-B965-C2A6A39D9D32}"/>
+                <a16:creationId xmlns:a16="http://schemas.microsoft.com/office/drawing/2014/main" xmlns="" id="{8B74C660-078B-4C7C-B965-C2A6A39D9D32}"/>
               </a:ext>
             </a:extLst>
           </p:cNvPr>
@@ -3311,14 +4528,14 @@
                 <a:gridCol w="1038272">
                   <a:extLst>
                     <a:ext uri="{9D8B030D-6E8A-4147-A177-3AD203B41FA5}">
-                      <a16:colId xmlns:a16="http://schemas.microsoft.com/office/drawing/2014/main" val="878989178"/>
+                      <a16:colId xmlns:a16="http://schemas.microsoft.com/office/drawing/2014/main" xmlns="" val="878989178"/>
                     </a:ext>
                   </a:extLst>
                 </a:gridCol>
                 <a:gridCol w="1038272">
                   <a:extLst>
                     <a:ext uri="{9D8B030D-6E8A-4147-A177-3AD203B41FA5}">
-                      <a16:colId xmlns:a16="http://schemas.microsoft.com/office/drawing/2014/main" val="1781752622"/>
+                      <a16:colId xmlns:a16="http://schemas.microsoft.com/office/drawing/2014/main" xmlns="" val="1781752622"/>
                     </a:ext>
                   </a:extLst>
                 </a:gridCol>
@@ -3352,7 +4569,7 @@
                 </a:tc>
                 <a:extLst>
                   <a:ext uri="{0D108BD9-81ED-4DB2-BD59-A6C34878D82A}">
-                    <a16:rowId xmlns:a16="http://schemas.microsoft.com/office/drawing/2014/main" val="2130340444"/>
+                    <a16:rowId xmlns:a16="http://schemas.microsoft.com/office/drawing/2014/main" xmlns="" val="2130340444"/>
                   </a:ext>
                 </a:extLst>
               </a:tr>
@@ -3385,7 +4602,7 @@
                 </a:tc>
                 <a:extLst>
                   <a:ext uri="{0D108BD9-81ED-4DB2-BD59-A6C34878D82A}">
-                    <a16:rowId xmlns:a16="http://schemas.microsoft.com/office/drawing/2014/main" val="81030552"/>
+                    <a16:rowId xmlns:a16="http://schemas.microsoft.com/office/drawing/2014/main" xmlns="" val="81030552"/>
                   </a:ext>
                 </a:extLst>
               </a:tr>
@@ -3420,7 +4637,7 @@
                 </a:tc>
                 <a:extLst>
                   <a:ext uri="{0D108BD9-81ED-4DB2-BD59-A6C34878D82A}">
-                    <a16:rowId xmlns:a16="http://schemas.microsoft.com/office/drawing/2014/main" val="3671086148"/>
+                    <a16:rowId xmlns:a16="http://schemas.microsoft.com/office/drawing/2014/main" xmlns="" val="3671086148"/>
                   </a:ext>
                 </a:extLst>
               </a:tr>
@@ -3453,7 +4670,7 @@
                 </a:tc>
                 <a:extLst>
                   <a:ext uri="{0D108BD9-81ED-4DB2-BD59-A6C34878D82A}">
-                    <a16:rowId xmlns:a16="http://schemas.microsoft.com/office/drawing/2014/main" val="1526194231"/>
+                    <a16:rowId xmlns:a16="http://schemas.microsoft.com/office/drawing/2014/main" xmlns="" val="1526194231"/>
                   </a:ext>
                 </a:extLst>
               </a:tr>
@@ -3486,7 +4703,7 @@
                 </a:tc>
                 <a:extLst>
                   <a:ext uri="{0D108BD9-81ED-4DB2-BD59-A6C34878D82A}">
-                    <a16:rowId xmlns:a16="http://schemas.microsoft.com/office/drawing/2014/main" val="637810848"/>
+                    <a16:rowId xmlns:a16="http://schemas.microsoft.com/office/drawing/2014/main" xmlns="" val="637810848"/>
                   </a:ext>
                 </a:extLst>
               </a:tr>
@@ -3520,7 +4737,7 @@
                 </a:tc>
                 <a:extLst>
                   <a:ext uri="{0D108BD9-81ED-4DB2-BD59-A6C34878D82A}">
-                    <a16:rowId xmlns:a16="http://schemas.microsoft.com/office/drawing/2014/main" val="2916221623"/>
+                    <a16:rowId xmlns:a16="http://schemas.microsoft.com/office/drawing/2014/main" xmlns="" val="2916221623"/>
                   </a:ext>
                 </a:extLst>
               </a:tr>
@@ -3553,7 +4770,7 @@
                 </a:tc>
                 <a:extLst>
                   <a:ext uri="{0D108BD9-81ED-4DB2-BD59-A6C34878D82A}">
-                    <a16:rowId xmlns:a16="http://schemas.microsoft.com/office/drawing/2014/main" val="340746273"/>
+                    <a16:rowId xmlns:a16="http://schemas.microsoft.com/office/drawing/2014/main" xmlns="" val="340746273"/>
                   </a:ext>
                 </a:extLst>
               </a:tr>
@@ -3586,7 +4803,7 @@
                 </a:tc>
                 <a:extLst>
                   <a:ext uri="{0D108BD9-81ED-4DB2-BD59-A6C34878D82A}">
-                    <a16:rowId xmlns:a16="http://schemas.microsoft.com/office/drawing/2014/main" val="3394361114"/>
+                    <a16:rowId xmlns:a16="http://schemas.microsoft.com/office/drawing/2014/main" xmlns="" val="3394361114"/>
                   </a:ext>
                 </a:extLst>
               </a:tr>
@@ -3620,7 +4837,7 @@
                 </a:tc>
                 <a:extLst>
                   <a:ext uri="{0D108BD9-81ED-4DB2-BD59-A6C34878D82A}">
-                    <a16:rowId xmlns:a16="http://schemas.microsoft.com/office/drawing/2014/main" val="1415310725"/>
+                    <a16:rowId xmlns:a16="http://schemas.microsoft.com/office/drawing/2014/main" xmlns="" val="1415310725"/>
                   </a:ext>
                 </a:extLst>
               </a:tr>
@@ -3654,7 +4871,7 @@
                 </a:tc>
                 <a:extLst>
                   <a:ext uri="{0D108BD9-81ED-4DB2-BD59-A6C34878D82A}">
-                    <a16:rowId xmlns:a16="http://schemas.microsoft.com/office/drawing/2014/main" val="1615912020"/>
+                    <a16:rowId xmlns:a16="http://schemas.microsoft.com/office/drawing/2014/main" xmlns="" val="1615912020"/>
                   </a:ext>
                 </a:extLst>
               </a:tr>
@@ -3667,7 +4884,7 @@
           <p:cNvPr id="11" name="TextBox 10">
             <a:extLst>
               <a:ext uri="{FF2B5EF4-FFF2-40B4-BE49-F238E27FC236}">
-                <a16:creationId xmlns:a16="http://schemas.microsoft.com/office/drawing/2014/main" id="{766B9BC0-F8FD-4833-9D3F-2A02098DD164}"/>
+                <a16:creationId xmlns:a16="http://schemas.microsoft.com/office/drawing/2014/main" xmlns="" id="{766B9BC0-F8FD-4833-9D3F-2A02098DD164}"/>
               </a:ext>
             </a:extLst>
           </p:cNvPr>
@@ -3702,7 +4919,7 @@
           <p:cNvPr id="12" name="Table 11">
             <a:extLst>
               <a:ext uri="{FF2B5EF4-FFF2-40B4-BE49-F238E27FC236}">
-                <a16:creationId xmlns:a16="http://schemas.microsoft.com/office/drawing/2014/main" id="{7B0247E3-668D-4504-8785-282ACBA05B05}"/>
+                <a16:creationId xmlns:a16="http://schemas.microsoft.com/office/drawing/2014/main" xmlns="" id="{7B0247E3-668D-4504-8785-282ACBA05B05}"/>
               </a:ext>
             </a:extLst>
           </p:cNvPr>
@@ -3731,14 +4948,14 @@
                 <a:gridCol w="1038272">
                   <a:extLst>
                     <a:ext uri="{9D8B030D-6E8A-4147-A177-3AD203B41FA5}">
-                      <a16:colId xmlns:a16="http://schemas.microsoft.com/office/drawing/2014/main" val="878989178"/>
+                      <a16:colId xmlns:a16="http://schemas.microsoft.com/office/drawing/2014/main" xmlns="" val="878989178"/>
                     </a:ext>
                   </a:extLst>
                 </a:gridCol>
                 <a:gridCol w="1038272">
                   <a:extLst>
                     <a:ext uri="{9D8B030D-6E8A-4147-A177-3AD203B41FA5}">
-                      <a16:colId xmlns:a16="http://schemas.microsoft.com/office/drawing/2014/main" val="1781752622"/>
+                      <a16:colId xmlns:a16="http://schemas.microsoft.com/office/drawing/2014/main" xmlns="" val="1781752622"/>
                     </a:ext>
                   </a:extLst>
                 </a:gridCol>
@@ -3772,7 +4989,7 @@
                 </a:tc>
                 <a:extLst>
                   <a:ext uri="{0D108BD9-81ED-4DB2-BD59-A6C34878D82A}">
-                    <a16:rowId xmlns:a16="http://schemas.microsoft.com/office/drawing/2014/main" val="2130340444"/>
+                    <a16:rowId xmlns:a16="http://schemas.microsoft.com/office/drawing/2014/main" xmlns="" val="2130340444"/>
                   </a:ext>
                 </a:extLst>
               </a:tr>
@@ -3805,7 +5022,7 @@
                 </a:tc>
                 <a:extLst>
                   <a:ext uri="{0D108BD9-81ED-4DB2-BD59-A6C34878D82A}">
-                    <a16:rowId xmlns:a16="http://schemas.microsoft.com/office/drawing/2014/main" val="81030552"/>
+                    <a16:rowId xmlns:a16="http://schemas.microsoft.com/office/drawing/2014/main" xmlns="" val="81030552"/>
                   </a:ext>
                 </a:extLst>
               </a:tr>
@@ -3832,7 +5049,7 @@
                 </a:tc>
                 <a:extLst>
                   <a:ext uri="{0D108BD9-81ED-4DB2-BD59-A6C34878D82A}">
-                    <a16:rowId xmlns:a16="http://schemas.microsoft.com/office/drawing/2014/main" val="3671086148"/>
+                    <a16:rowId xmlns:a16="http://schemas.microsoft.com/office/drawing/2014/main" xmlns="" val="3671086148"/>
                   </a:ext>
                 </a:extLst>
               </a:tr>
@@ -3859,7 +5076,7 @@
                 </a:tc>
                 <a:extLst>
                   <a:ext uri="{0D108BD9-81ED-4DB2-BD59-A6C34878D82A}">
-                    <a16:rowId xmlns:a16="http://schemas.microsoft.com/office/drawing/2014/main" val="1526194231"/>
+                    <a16:rowId xmlns:a16="http://schemas.microsoft.com/office/drawing/2014/main" xmlns="" val="1526194231"/>
                   </a:ext>
                 </a:extLst>
               </a:tr>
@@ -3872,7 +5089,7 @@
           <p:cNvPr id="13" name="TextBox 12">
             <a:extLst>
               <a:ext uri="{FF2B5EF4-FFF2-40B4-BE49-F238E27FC236}">
-                <a16:creationId xmlns:a16="http://schemas.microsoft.com/office/drawing/2014/main" id="{FF587116-4EFF-4E65-9E1D-22072E7889F3}"/>
+                <a16:creationId xmlns:a16="http://schemas.microsoft.com/office/drawing/2014/main" xmlns="" id="{FF587116-4EFF-4E65-9E1D-22072E7889F3}"/>
               </a:ext>
             </a:extLst>
           </p:cNvPr>
@@ -3907,7 +5124,7 @@
           <p:cNvPr id="14" name="Table 13">
             <a:extLst>
               <a:ext uri="{FF2B5EF4-FFF2-40B4-BE49-F238E27FC236}">
-                <a16:creationId xmlns:a16="http://schemas.microsoft.com/office/drawing/2014/main" id="{BE01E2E6-17CC-420F-867C-5C529B2404C7}"/>
+                <a16:creationId xmlns:a16="http://schemas.microsoft.com/office/drawing/2014/main" xmlns="" id="{BE01E2E6-17CC-420F-867C-5C529B2404C7}"/>
               </a:ext>
             </a:extLst>
           </p:cNvPr>
@@ -3936,14 +5153,14 @@
                 <a:gridCol w="1038272">
                   <a:extLst>
                     <a:ext uri="{9D8B030D-6E8A-4147-A177-3AD203B41FA5}">
-                      <a16:colId xmlns:a16="http://schemas.microsoft.com/office/drawing/2014/main" val="878989178"/>
+                      <a16:colId xmlns:a16="http://schemas.microsoft.com/office/drawing/2014/main" xmlns="" val="878989178"/>
                     </a:ext>
                   </a:extLst>
                 </a:gridCol>
                 <a:gridCol w="1038272">
                   <a:extLst>
                     <a:ext uri="{9D8B030D-6E8A-4147-A177-3AD203B41FA5}">
-                      <a16:colId xmlns:a16="http://schemas.microsoft.com/office/drawing/2014/main" val="1781752622"/>
+                      <a16:colId xmlns:a16="http://schemas.microsoft.com/office/drawing/2014/main" xmlns="" val="1781752622"/>
                     </a:ext>
                   </a:extLst>
                 </a:gridCol>
@@ -3977,7 +5194,7 @@
                 </a:tc>
                 <a:extLst>
                   <a:ext uri="{0D108BD9-81ED-4DB2-BD59-A6C34878D82A}">
-                    <a16:rowId xmlns:a16="http://schemas.microsoft.com/office/drawing/2014/main" val="2130340444"/>
+                    <a16:rowId xmlns:a16="http://schemas.microsoft.com/office/drawing/2014/main" xmlns="" val="2130340444"/>
                   </a:ext>
                 </a:extLst>
               </a:tr>
@@ -4010,7 +5227,7 @@
                 </a:tc>
                 <a:extLst>
                   <a:ext uri="{0D108BD9-81ED-4DB2-BD59-A6C34878D82A}">
-                    <a16:rowId xmlns:a16="http://schemas.microsoft.com/office/drawing/2014/main" val="81030552"/>
+                    <a16:rowId xmlns:a16="http://schemas.microsoft.com/office/drawing/2014/main" xmlns="" val="81030552"/>
                   </a:ext>
                 </a:extLst>
               </a:tr>
@@ -4037,7 +5254,7 @@
                 </a:tc>
                 <a:extLst>
                   <a:ext uri="{0D108BD9-81ED-4DB2-BD59-A6C34878D82A}">
-                    <a16:rowId xmlns:a16="http://schemas.microsoft.com/office/drawing/2014/main" val="3671086148"/>
+                    <a16:rowId xmlns:a16="http://schemas.microsoft.com/office/drawing/2014/main" xmlns="" val="3671086148"/>
                   </a:ext>
                 </a:extLst>
               </a:tr>
@@ -4064,7 +5281,7 @@
                 </a:tc>
                 <a:extLst>
                   <a:ext uri="{0D108BD9-81ED-4DB2-BD59-A6C34878D82A}">
-                    <a16:rowId xmlns:a16="http://schemas.microsoft.com/office/drawing/2014/main" val="1526194231"/>
+                    <a16:rowId xmlns:a16="http://schemas.microsoft.com/office/drawing/2014/main" xmlns="" val="1526194231"/>
                   </a:ext>
                 </a:extLst>
               </a:tr>
@@ -4077,7 +5294,7 @@
           <p:cNvPr id="15" name="TextBox 14">
             <a:extLst>
               <a:ext uri="{FF2B5EF4-FFF2-40B4-BE49-F238E27FC236}">
-                <a16:creationId xmlns:a16="http://schemas.microsoft.com/office/drawing/2014/main" id="{0587D61C-CB7D-4F06-973B-B7543E5097A3}"/>
+                <a16:creationId xmlns:a16="http://schemas.microsoft.com/office/drawing/2014/main" xmlns="" id="{0587D61C-CB7D-4F06-973B-B7543E5097A3}"/>
               </a:ext>
             </a:extLst>
           </p:cNvPr>
@@ -4112,7 +5329,7 @@
           <p:cNvPr id="2" name="Picture 1">
             <a:extLst>
               <a:ext uri="{FF2B5EF4-FFF2-40B4-BE49-F238E27FC236}">
-                <a16:creationId xmlns:a16="http://schemas.microsoft.com/office/drawing/2014/main" id="{B11341E8-1F2C-4267-A771-6AC9338F2A0C}"/>
+                <a16:creationId xmlns:a16="http://schemas.microsoft.com/office/drawing/2014/main" xmlns="" id="{B11341E8-1F2C-4267-A771-6AC9338F2A0C}"/>
               </a:ext>
             </a:extLst>
           </p:cNvPr>
@@ -4147,10 +5364,17 @@
   <p:clrMapOvr>
     <a:masterClrMapping/>
   </p:clrMapOvr>
+  <p:timing>
+    <p:tnLst>
+      <p:par>
+        <p:cTn id="1" dur="indefinite" restart="never" nodeType="tmRoot"/>
+      </p:par>
+    </p:tnLst>
+  </p:timing>
 </p:sld>
 </file>
 
-<file path=ppt/slides/slide3.xml><?xml version="1.0" encoding="utf-8"?>
+<file path=ppt/slides/slide9.xml><?xml version="1.0" encoding="utf-8"?>
 <p:sld xmlns:a="http://schemas.openxmlformats.org/drawingml/2006/main" xmlns:r="http://schemas.openxmlformats.org/officeDocument/2006/relationships" xmlns:p="http://schemas.openxmlformats.org/presentationml/2006/main">
   <p:cSld>
     <p:spTree>
@@ -4172,7 +5396,7 @@
           <p:cNvPr id="6" name="Picture 5" descr="A screenshot of a cell phone&#10;&#10;Description generated with high confidence">
             <a:extLst>
               <a:ext uri="{FF2B5EF4-FFF2-40B4-BE49-F238E27FC236}">
-                <a16:creationId xmlns:a16="http://schemas.microsoft.com/office/drawing/2014/main" id="{D3F5FB72-5230-462B-B988-0AB9742EDDBD}"/>
+                <a16:creationId xmlns:a16="http://schemas.microsoft.com/office/drawing/2014/main" xmlns="" id="{D3F5FB72-5230-462B-B988-0AB9742EDDBD}"/>
               </a:ext>
             </a:extLst>
           </p:cNvPr>
@@ -4182,7 +5406,7 @@
           <p:nvPr/>
         </p:nvPicPr>
         <p:blipFill>
-          <a:blip r:embed="rId2">
+          <a:blip r:embed="rId2" cstate="print">
             <a:extLst>
               <a:ext uri="{28A0092B-C50C-407E-A947-70E740481C1C}">
                 <a14:useLocalDpi xmlns:a14="http://schemas.microsoft.com/office/drawing/2010/main" val="0"/>
@@ -4213,336 +5437,13 @@
   <p:clrMapOvr>
     <a:masterClrMapping/>
   </p:clrMapOvr>
-</p:sld>
-</file>
-
-<file path=ppt/slides/slide4.xml><?xml version="1.0" encoding="utf-8"?>
-<p:sld xmlns:a="http://schemas.openxmlformats.org/drawingml/2006/main" xmlns:r="http://schemas.openxmlformats.org/officeDocument/2006/relationships" xmlns:p="http://schemas.openxmlformats.org/presentationml/2006/main">
-  <p:cSld>
-    <p:spTree>
-      <p:nvGrpSpPr>
-        <p:cNvPr id="1" name=""/>
-        <p:cNvGrpSpPr/>
-        <p:nvPr/>
-      </p:nvGrpSpPr>
-      <p:grpSpPr>
-        <a:xfrm>
-          <a:off x="0" y="0"/>
-          <a:ext cx="0" cy="0"/>
-          <a:chOff x="0" y="0"/>
-          <a:chExt cx="0" cy="0"/>
-        </a:xfrm>
-      </p:grpSpPr>
-      <p:pic>
-        <p:nvPicPr>
-          <p:cNvPr id="3" name="Picture 2" descr="A screenshot of a cell phone&#10;&#10;Description generated with high confidence">
-            <a:extLst>
-              <a:ext uri="{FF2B5EF4-FFF2-40B4-BE49-F238E27FC236}">
-                <a16:creationId xmlns:a16="http://schemas.microsoft.com/office/drawing/2014/main" id="{EDCD0D7D-7CB1-4295-BB37-FFC3C3A19AEA}"/>
-              </a:ext>
-            </a:extLst>
-          </p:cNvPr>
-          <p:cNvPicPr>
-            <a:picLocks noChangeAspect="1"/>
-          </p:cNvPicPr>
-          <p:nvPr/>
-        </p:nvPicPr>
-        <p:blipFill>
-          <a:blip r:embed="rId2">
-            <a:extLst>
-              <a:ext uri="{28A0092B-C50C-407E-A947-70E740481C1C}">
-                <a14:useLocalDpi xmlns:a14="http://schemas.microsoft.com/office/drawing/2010/main" val="0"/>
-              </a:ext>
-            </a:extLst>
-          </a:blip>
-          <a:stretch>
-            <a:fillRect/>
-          </a:stretch>
-        </p:blipFill>
-        <p:spPr>
-          <a:xfrm>
-            <a:off x="60262" y="0"/>
-            <a:ext cx="9023476" cy="6858000"/>
-          </a:xfrm>
-          <a:prstGeom prst="rect">
-            <a:avLst/>
-          </a:prstGeom>
-        </p:spPr>
-      </p:pic>
-    </p:spTree>
-    <p:extLst>
-      <p:ext uri="{BB962C8B-B14F-4D97-AF65-F5344CB8AC3E}">
-        <p14:creationId xmlns:p14="http://schemas.microsoft.com/office/powerpoint/2010/main" val="530035007"/>
-      </p:ext>
-    </p:extLst>
-  </p:cSld>
-  <p:clrMapOvr>
-    <a:masterClrMapping/>
-  </p:clrMapOvr>
-</p:sld>
-</file>
-
-<file path=ppt/slides/slide5.xml><?xml version="1.0" encoding="utf-8"?>
-<p:sld xmlns:a="http://schemas.openxmlformats.org/drawingml/2006/main" xmlns:r="http://schemas.openxmlformats.org/officeDocument/2006/relationships" xmlns:p="http://schemas.openxmlformats.org/presentationml/2006/main">
-  <p:cSld>
-    <p:spTree>
-      <p:nvGrpSpPr>
-        <p:cNvPr id="1" name=""/>
-        <p:cNvGrpSpPr/>
-        <p:nvPr/>
-      </p:nvGrpSpPr>
-      <p:grpSpPr>
-        <a:xfrm>
-          <a:off x="0" y="0"/>
-          <a:ext cx="0" cy="0"/>
-          <a:chOff x="0" y="0"/>
-          <a:chExt cx="0" cy="0"/>
-        </a:xfrm>
-      </p:grpSpPr>
-      <p:pic>
-        <p:nvPicPr>
-          <p:cNvPr id="3" name="Picture 2" descr="A screenshot of a cell phone&#10;&#10;Description generated with very high confidence">
-            <a:extLst>
-              <a:ext uri="{FF2B5EF4-FFF2-40B4-BE49-F238E27FC236}">
-                <a16:creationId xmlns:a16="http://schemas.microsoft.com/office/drawing/2014/main" id="{6DA31AC6-0FD4-4823-BBB0-681B2A6ADF78}"/>
-              </a:ext>
-            </a:extLst>
-          </p:cNvPr>
-          <p:cNvPicPr>
-            <a:picLocks noChangeAspect="1"/>
-          </p:cNvPicPr>
-          <p:nvPr/>
-        </p:nvPicPr>
-        <p:blipFill>
-          <a:blip r:embed="rId2">
-            <a:extLst>
-              <a:ext uri="{28A0092B-C50C-407E-A947-70E740481C1C}">
-                <a14:useLocalDpi xmlns:a14="http://schemas.microsoft.com/office/drawing/2010/main" val="0"/>
-              </a:ext>
-            </a:extLst>
-          </a:blip>
-          <a:stretch>
-            <a:fillRect/>
-          </a:stretch>
-        </p:blipFill>
-        <p:spPr>
-          <a:xfrm>
-            <a:off x="40186" y="0"/>
-            <a:ext cx="9063627" cy="6858000"/>
-          </a:xfrm>
-          <a:prstGeom prst="rect">
-            <a:avLst/>
-          </a:prstGeom>
-        </p:spPr>
-      </p:pic>
-    </p:spTree>
-    <p:extLst>
-      <p:ext uri="{BB962C8B-B14F-4D97-AF65-F5344CB8AC3E}">
-        <p14:creationId xmlns:p14="http://schemas.microsoft.com/office/powerpoint/2010/main" val="3198413972"/>
-      </p:ext>
-    </p:extLst>
-  </p:cSld>
-  <p:clrMapOvr>
-    <a:masterClrMapping/>
-  </p:clrMapOvr>
-</p:sld>
-</file>
-
-<file path=ppt/slides/slide6.xml><?xml version="1.0" encoding="utf-8"?>
-<p:sld xmlns:a="http://schemas.openxmlformats.org/drawingml/2006/main" xmlns:r="http://schemas.openxmlformats.org/officeDocument/2006/relationships" xmlns:p="http://schemas.openxmlformats.org/presentationml/2006/main">
-  <p:cSld>
-    <p:spTree>
-      <p:nvGrpSpPr>
-        <p:cNvPr id="1" name=""/>
-        <p:cNvGrpSpPr/>
-        <p:nvPr/>
-      </p:nvGrpSpPr>
-      <p:grpSpPr>
-        <a:xfrm>
-          <a:off x="0" y="0"/>
-          <a:ext cx="0" cy="0"/>
-          <a:chOff x="0" y="0"/>
-          <a:chExt cx="0" cy="0"/>
-        </a:xfrm>
-      </p:grpSpPr>
-      <p:pic>
-        <p:nvPicPr>
-          <p:cNvPr id="3" name="Picture 2" descr="A close up of text on a white background&#10;&#10;Description generated with high confidence">
-            <a:extLst>
-              <a:ext uri="{FF2B5EF4-FFF2-40B4-BE49-F238E27FC236}">
-                <a16:creationId xmlns:a16="http://schemas.microsoft.com/office/drawing/2014/main" id="{691E7D02-A01A-4C51-B34B-8717A90A5B54}"/>
-              </a:ext>
-            </a:extLst>
-          </p:cNvPr>
-          <p:cNvPicPr>
-            <a:picLocks noChangeAspect="1"/>
-          </p:cNvPicPr>
-          <p:nvPr/>
-        </p:nvPicPr>
-        <p:blipFill>
-          <a:blip r:embed="rId2">
-            <a:extLst>
-              <a:ext uri="{28A0092B-C50C-407E-A947-70E740481C1C}">
-                <a14:useLocalDpi xmlns:a14="http://schemas.microsoft.com/office/drawing/2010/main" val="0"/>
-              </a:ext>
-            </a:extLst>
-          </a:blip>
-          <a:stretch>
-            <a:fillRect/>
-          </a:stretch>
-        </p:blipFill>
-        <p:spPr>
-          <a:xfrm>
-            <a:off x="62141" y="0"/>
-            <a:ext cx="9019717" cy="6858000"/>
-          </a:xfrm>
-          <a:prstGeom prst="rect">
-            <a:avLst/>
-          </a:prstGeom>
-        </p:spPr>
-      </p:pic>
-    </p:spTree>
-    <p:extLst>
-      <p:ext uri="{BB962C8B-B14F-4D97-AF65-F5344CB8AC3E}">
-        <p14:creationId xmlns:p14="http://schemas.microsoft.com/office/powerpoint/2010/main" val="2259478953"/>
-      </p:ext>
-    </p:extLst>
-  </p:cSld>
-  <p:clrMapOvr>
-    <a:masterClrMapping/>
-  </p:clrMapOvr>
-</p:sld>
-</file>
-
-<file path=ppt/slides/slide7.xml><?xml version="1.0" encoding="utf-8"?>
-<p:sld xmlns:a="http://schemas.openxmlformats.org/drawingml/2006/main" xmlns:r="http://schemas.openxmlformats.org/officeDocument/2006/relationships" xmlns:p="http://schemas.openxmlformats.org/presentationml/2006/main">
-  <p:cSld>
-    <p:spTree>
-      <p:nvGrpSpPr>
-        <p:cNvPr id="1" name=""/>
-        <p:cNvGrpSpPr/>
-        <p:nvPr/>
-      </p:nvGrpSpPr>
-      <p:grpSpPr>
-        <a:xfrm>
-          <a:off x="0" y="0"/>
-          <a:ext cx="0" cy="0"/>
-          <a:chOff x="0" y="0"/>
-          <a:chExt cx="0" cy="0"/>
-        </a:xfrm>
-      </p:grpSpPr>
-      <p:pic>
-        <p:nvPicPr>
-          <p:cNvPr id="3" name="Picture 2" descr="A screenshot of a cell phone&#10;&#10;Description generated with very high confidence">
-            <a:extLst>
-              <a:ext uri="{FF2B5EF4-FFF2-40B4-BE49-F238E27FC236}">
-                <a16:creationId xmlns:a16="http://schemas.microsoft.com/office/drawing/2014/main" id="{5E1653C3-E9F8-43A9-BF34-EBDCD0305308}"/>
-              </a:ext>
-            </a:extLst>
-          </p:cNvPr>
-          <p:cNvPicPr>
-            <a:picLocks noChangeAspect="1"/>
-          </p:cNvPicPr>
-          <p:nvPr/>
-        </p:nvPicPr>
-        <p:blipFill>
-          <a:blip r:embed="rId2">
-            <a:extLst>
-              <a:ext uri="{28A0092B-C50C-407E-A947-70E740481C1C}">
-                <a14:useLocalDpi xmlns:a14="http://schemas.microsoft.com/office/drawing/2010/main" val="0"/>
-              </a:ext>
-            </a:extLst>
-          </a:blip>
-          <a:stretch>
-            <a:fillRect/>
-          </a:stretch>
-        </p:blipFill>
-        <p:spPr>
-          <a:xfrm>
-            <a:off x="36095" y="0"/>
-            <a:ext cx="9071810" cy="6858000"/>
-          </a:xfrm>
-          <a:prstGeom prst="rect">
-            <a:avLst/>
-          </a:prstGeom>
-        </p:spPr>
-      </p:pic>
-    </p:spTree>
-    <p:extLst>
-      <p:ext uri="{BB962C8B-B14F-4D97-AF65-F5344CB8AC3E}">
-        <p14:creationId xmlns:p14="http://schemas.microsoft.com/office/powerpoint/2010/main" val="1412373299"/>
-      </p:ext>
-    </p:extLst>
-  </p:cSld>
-  <p:clrMapOvr>
-    <a:masterClrMapping/>
-  </p:clrMapOvr>
-</p:sld>
-</file>
-
-<file path=ppt/slides/slide8.xml><?xml version="1.0" encoding="utf-8"?>
-<p:sld xmlns:a="http://schemas.openxmlformats.org/drawingml/2006/main" xmlns:r="http://schemas.openxmlformats.org/officeDocument/2006/relationships" xmlns:p="http://schemas.openxmlformats.org/presentationml/2006/main">
-  <p:cSld>
-    <p:spTree>
-      <p:nvGrpSpPr>
-        <p:cNvPr id="1" name=""/>
-        <p:cNvGrpSpPr/>
-        <p:nvPr/>
-      </p:nvGrpSpPr>
-      <p:grpSpPr>
-        <a:xfrm>
-          <a:off x="0" y="0"/>
-          <a:ext cx="0" cy="0"/>
-          <a:chOff x="0" y="0"/>
-          <a:chExt cx="0" cy="0"/>
-        </a:xfrm>
-      </p:grpSpPr>
-      <p:pic>
-        <p:nvPicPr>
-          <p:cNvPr id="3" name="Picture 2" descr="A screenshot of a cell phone&#10;&#10;Description generated with very high confidence">
-            <a:extLst>
-              <a:ext uri="{FF2B5EF4-FFF2-40B4-BE49-F238E27FC236}">
-                <a16:creationId xmlns:a16="http://schemas.microsoft.com/office/drawing/2014/main" id="{1BB99D6C-959A-444C-BBCF-791F9F3CA48A}"/>
-              </a:ext>
-            </a:extLst>
-          </p:cNvPr>
-          <p:cNvPicPr>
-            <a:picLocks noChangeAspect="1"/>
-          </p:cNvPicPr>
-          <p:nvPr/>
-        </p:nvPicPr>
-        <p:blipFill>
-          <a:blip r:embed="rId2">
-            <a:extLst>
-              <a:ext uri="{28A0092B-C50C-407E-A947-70E740481C1C}">
-                <a14:useLocalDpi xmlns:a14="http://schemas.microsoft.com/office/drawing/2010/main" val="0"/>
-              </a:ext>
-            </a:extLst>
-          </a:blip>
-          <a:stretch>
-            <a:fillRect/>
-          </a:stretch>
-        </p:blipFill>
-        <p:spPr>
-          <a:xfrm>
-            <a:off x="49696" y="0"/>
-            <a:ext cx="9044608" cy="6858000"/>
-          </a:xfrm>
-          <a:prstGeom prst="rect">
-            <a:avLst/>
-          </a:prstGeom>
-        </p:spPr>
-      </p:pic>
-    </p:spTree>
-    <p:extLst>
-      <p:ext uri="{BB962C8B-B14F-4D97-AF65-F5344CB8AC3E}">
-        <p14:creationId xmlns:p14="http://schemas.microsoft.com/office/powerpoint/2010/main" val="342653159"/>
-      </p:ext>
-    </p:extLst>
-  </p:cSld>
-  <p:clrMapOvr>
-    <a:masterClrMapping/>
-  </p:clrMapOvr>
+  <p:timing>
+    <p:tnLst>
+      <p:par>
+        <p:cTn id="1" dur="indefinite" restart="never" nodeType="tmRoot"/>
+      </p:par>
+    </p:tnLst>
+  </p:timing>
 </p:sld>
 </file>
 

</xml_diff>

<commit_message>
Added Max's work to ppt
</commit_message>
<xml_diff>
--- a/design_spec/design_specification.pptx
+++ b/design_spec/design_specification.pptx
@@ -3477,8 +3477,8 @@
           </a:lstStyle>
           <a:p>
             <a:r>
-              <a:rPr lang="en-GB" smtClean="0"/>
-              <a:t>Walkthrough</a:t>
+              <a:rPr lang="en-GB" dirty="0" smtClean="0"/>
+              <a:t>Walkthrough – Site Maps</a:t>
             </a:r>
             <a:endParaRPr lang="en-GB" dirty="0"/>
           </a:p>
@@ -4228,20 +4228,2236 @@
       </p:sp>
       <p:sp>
         <p:nvSpPr>
-          <p:cNvPr id="3" name="Content Placeholder 2"/>
-          <p:cNvSpPr>
-            <a:spLocks noGrp="1"/>
-          </p:cNvSpPr>
-          <p:nvPr>
-            <p:ph idx="1"/>
-          </p:nvPr>
-        </p:nvSpPr>
-        <p:spPr/>
-        <p:txBody>
-          <a:bodyPr/>
-          <a:lstStyle/>
-          <a:p>
-            <a:endParaRPr lang="en-GB" dirty="0"/>
+          <p:cNvPr id="4" name="Flowchart: Connector 3">
+            <a:extLst>
+              <a:ext uri="{FF2B5EF4-FFF2-40B4-BE49-F238E27FC236}">
+                <a16:creationId xmlns="" xmlns:a16="http://schemas.microsoft.com/office/drawing/2014/main" xmlns:lc="http://schemas.openxmlformats.org/drawingml/2006/lockedCanvas" id="{64453680-0BB2-4A4C-8712-EEA5A3AD3F51}"/>
+              </a:ext>
+            </a:extLst>
+          </p:cNvPr>
+          <p:cNvSpPr/>
+          <p:nvPr/>
+        </p:nvSpPr>
+        <p:spPr>
+          <a:xfrm>
+            <a:off x="369278" y="2532185"/>
+            <a:ext cx="675249" cy="661181"/>
+          </a:xfrm>
+          <a:prstGeom prst="flowChartConnector">
+            <a:avLst/>
+          </a:prstGeom>
+          <a:ln>
+            <a:solidFill>
+              <a:schemeClr val="tx1"/>
+            </a:solidFill>
+          </a:ln>
+        </p:spPr>
+        <p:style>
+          <a:lnRef idx="2">
+            <a:schemeClr val="accent6"/>
+          </a:lnRef>
+          <a:fillRef idx="1">
+            <a:schemeClr val="lt1"/>
+          </a:fillRef>
+          <a:effectRef idx="0">
+            <a:schemeClr val="accent6"/>
+          </a:effectRef>
+          <a:fontRef idx="minor">
+            <a:schemeClr val="dk1"/>
+          </a:fontRef>
+        </p:style>
+        <p:txBody>
+          <a:bodyPr rtlCol="0" anchor="ctr"/>
+          <a:lstStyle>
+            <a:defPPr>
+              <a:defRPr lang="en-US"/>
+            </a:defPPr>
+            <a:lvl1pPr marL="0" algn="l" defTabSz="457200" rtl="0" eaLnBrk="1" latinLnBrk="0" hangingPunct="1">
+              <a:defRPr sz="1800" kern="1200">
+                <a:solidFill>
+                  <a:schemeClr val="dk1"/>
+                </a:solidFill>
+                <a:latin typeface="+mn-lt"/>
+                <a:ea typeface="+mn-ea"/>
+                <a:cs typeface="+mn-cs"/>
+              </a:defRPr>
+            </a:lvl1pPr>
+            <a:lvl2pPr marL="457200" algn="l" defTabSz="457200" rtl="0" eaLnBrk="1" latinLnBrk="0" hangingPunct="1">
+              <a:defRPr sz="1800" kern="1200">
+                <a:solidFill>
+                  <a:schemeClr val="dk1"/>
+                </a:solidFill>
+                <a:latin typeface="+mn-lt"/>
+                <a:ea typeface="+mn-ea"/>
+                <a:cs typeface="+mn-cs"/>
+              </a:defRPr>
+            </a:lvl2pPr>
+            <a:lvl3pPr marL="914400" algn="l" defTabSz="457200" rtl="0" eaLnBrk="1" latinLnBrk="0" hangingPunct="1">
+              <a:defRPr sz="1800" kern="1200">
+                <a:solidFill>
+                  <a:schemeClr val="dk1"/>
+                </a:solidFill>
+                <a:latin typeface="+mn-lt"/>
+                <a:ea typeface="+mn-ea"/>
+                <a:cs typeface="+mn-cs"/>
+              </a:defRPr>
+            </a:lvl3pPr>
+            <a:lvl4pPr marL="1371600" algn="l" defTabSz="457200" rtl="0" eaLnBrk="1" latinLnBrk="0" hangingPunct="1">
+              <a:defRPr sz="1800" kern="1200">
+                <a:solidFill>
+                  <a:schemeClr val="dk1"/>
+                </a:solidFill>
+                <a:latin typeface="+mn-lt"/>
+                <a:ea typeface="+mn-ea"/>
+                <a:cs typeface="+mn-cs"/>
+              </a:defRPr>
+            </a:lvl4pPr>
+            <a:lvl5pPr marL="1828800" algn="l" defTabSz="457200" rtl="0" eaLnBrk="1" latinLnBrk="0" hangingPunct="1">
+              <a:defRPr sz="1800" kern="1200">
+                <a:solidFill>
+                  <a:schemeClr val="dk1"/>
+                </a:solidFill>
+                <a:latin typeface="+mn-lt"/>
+                <a:ea typeface="+mn-ea"/>
+                <a:cs typeface="+mn-cs"/>
+              </a:defRPr>
+            </a:lvl5pPr>
+            <a:lvl6pPr marL="2286000" algn="l" defTabSz="457200" rtl="0" eaLnBrk="1" latinLnBrk="0" hangingPunct="1">
+              <a:defRPr sz="1800" kern="1200">
+                <a:solidFill>
+                  <a:schemeClr val="dk1"/>
+                </a:solidFill>
+                <a:latin typeface="+mn-lt"/>
+                <a:ea typeface="+mn-ea"/>
+                <a:cs typeface="+mn-cs"/>
+              </a:defRPr>
+            </a:lvl6pPr>
+            <a:lvl7pPr marL="2743200" algn="l" defTabSz="457200" rtl="0" eaLnBrk="1" latinLnBrk="0" hangingPunct="1">
+              <a:defRPr sz="1800" kern="1200">
+                <a:solidFill>
+                  <a:schemeClr val="dk1"/>
+                </a:solidFill>
+                <a:latin typeface="+mn-lt"/>
+                <a:ea typeface="+mn-ea"/>
+                <a:cs typeface="+mn-cs"/>
+              </a:defRPr>
+            </a:lvl7pPr>
+            <a:lvl8pPr marL="3200400" algn="l" defTabSz="457200" rtl="0" eaLnBrk="1" latinLnBrk="0" hangingPunct="1">
+              <a:defRPr sz="1800" kern="1200">
+                <a:solidFill>
+                  <a:schemeClr val="dk1"/>
+                </a:solidFill>
+                <a:latin typeface="+mn-lt"/>
+                <a:ea typeface="+mn-ea"/>
+                <a:cs typeface="+mn-cs"/>
+              </a:defRPr>
+            </a:lvl8pPr>
+            <a:lvl9pPr marL="3657600" algn="l" defTabSz="457200" rtl="0" eaLnBrk="1" latinLnBrk="0" hangingPunct="1">
+              <a:defRPr sz="1800" kern="1200">
+                <a:solidFill>
+                  <a:schemeClr val="dk1"/>
+                </a:solidFill>
+                <a:latin typeface="+mn-lt"/>
+                <a:ea typeface="+mn-ea"/>
+                <a:cs typeface="+mn-cs"/>
+              </a:defRPr>
+            </a:lvl9pPr>
+          </a:lstStyle>
+          <a:p>
+            <a:pPr algn="ctr"/>
+            <a:endParaRPr lang="en-GB"/>
+          </a:p>
+        </p:txBody>
+      </p:sp>
+      <p:sp>
+        <p:nvSpPr>
+          <p:cNvPr id="5" name="Rectangle: Rounded Corners 3">
+            <a:extLst>
+              <a:ext uri="{FF2B5EF4-FFF2-40B4-BE49-F238E27FC236}">
+                <a16:creationId xmlns="" xmlns:a16="http://schemas.microsoft.com/office/drawing/2014/main" xmlns:lc="http://schemas.openxmlformats.org/drawingml/2006/lockedCanvas" id="{6FED4133-0FD4-437F-A164-D623E18B10F9}"/>
+              </a:ext>
+            </a:extLst>
+          </p:cNvPr>
+          <p:cNvSpPr/>
+          <p:nvPr/>
+        </p:nvSpPr>
+        <p:spPr>
+          <a:xfrm>
+            <a:off x="291905" y="3200402"/>
+            <a:ext cx="829993" cy="661181"/>
+          </a:xfrm>
+          <a:prstGeom prst="roundRect">
+            <a:avLst/>
+          </a:prstGeom>
+          <a:ln>
+            <a:solidFill>
+              <a:schemeClr val="tx1"/>
+            </a:solidFill>
+          </a:ln>
+        </p:spPr>
+        <p:style>
+          <a:lnRef idx="2">
+            <a:schemeClr val="accent6"/>
+          </a:lnRef>
+          <a:fillRef idx="1">
+            <a:schemeClr val="lt1"/>
+          </a:fillRef>
+          <a:effectRef idx="0">
+            <a:schemeClr val="accent6"/>
+          </a:effectRef>
+          <a:fontRef idx="minor">
+            <a:schemeClr val="dk1"/>
+          </a:fontRef>
+        </p:style>
+        <p:txBody>
+          <a:bodyPr rtlCol="0" anchor="ctr"/>
+          <a:lstStyle>
+            <a:defPPr>
+              <a:defRPr lang="en-US"/>
+            </a:defPPr>
+            <a:lvl1pPr marL="0" algn="l" defTabSz="457200" rtl="0" eaLnBrk="1" latinLnBrk="0" hangingPunct="1">
+              <a:defRPr sz="1800" kern="1200">
+                <a:solidFill>
+                  <a:schemeClr val="dk1"/>
+                </a:solidFill>
+                <a:latin typeface="+mn-lt"/>
+                <a:ea typeface="+mn-ea"/>
+                <a:cs typeface="+mn-cs"/>
+              </a:defRPr>
+            </a:lvl1pPr>
+            <a:lvl2pPr marL="457200" algn="l" defTabSz="457200" rtl="0" eaLnBrk="1" latinLnBrk="0" hangingPunct="1">
+              <a:defRPr sz="1800" kern="1200">
+                <a:solidFill>
+                  <a:schemeClr val="dk1"/>
+                </a:solidFill>
+                <a:latin typeface="+mn-lt"/>
+                <a:ea typeface="+mn-ea"/>
+                <a:cs typeface="+mn-cs"/>
+              </a:defRPr>
+            </a:lvl2pPr>
+            <a:lvl3pPr marL="914400" algn="l" defTabSz="457200" rtl="0" eaLnBrk="1" latinLnBrk="0" hangingPunct="1">
+              <a:defRPr sz="1800" kern="1200">
+                <a:solidFill>
+                  <a:schemeClr val="dk1"/>
+                </a:solidFill>
+                <a:latin typeface="+mn-lt"/>
+                <a:ea typeface="+mn-ea"/>
+                <a:cs typeface="+mn-cs"/>
+              </a:defRPr>
+            </a:lvl3pPr>
+            <a:lvl4pPr marL="1371600" algn="l" defTabSz="457200" rtl="0" eaLnBrk="1" latinLnBrk="0" hangingPunct="1">
+              <a:defRPr sz="1800" kern="1200">
+                <a:solidFill>
+                  <a:schemeClr val="dk1"/>
+                </a:solidFill>
+                <a:latin typeface="+mn-lt"/>
+                <a:ea typeface="+mn-ea"/>
+                <a:cs typeface="+mn-cs"/>
+              </a:defRPr>
+            </a:lvl4pPr>
+            <a:lvl5pPr marL="1828800" algn="l" defTabSz="457200" rtl="0" eaLnBrk="1" latinLnBrk="0" hangingPunct="1">
+              <a:defRPr sz="1800" kern="1200">
+                <a:solidFill>
+                  <a:schemeClr val="dk1"/>
+                </a:solidFill>
+                <a:latin typeface="+mn-lt"/>
+                <a:ea typeface="+mn-ea"/>
+                <a:cs typeface="+mn-cs"/>
+              </a:defRPr>
+            </a:lvl5pPr>
+            <a:lvl6pPr marL="2286000" algn="l" defTabSz="457200" rtl="0" eaLnBrk="1" latinLnBrk="0" hangingPunct="1">
+              <a:defRPr sz="1800" kern="1200">
+                <a:solidFill>
+                  <a:schemeClr val="dk1"/>
+                </a:solidFill>
+                <a:latin typeface="+mn-lt"/>
+                <a:ea typeface="+mn-ea"/>
+                <a:cs typeface="+mn-cs"/>
+              </a:defRPr>
+            </a:lvl6pPr>
+            <a:lvl7pPr marL="2743200" algn="l" defTabSz="457200" rtl="0" eaLnBrk="1" latinLnBrk="0" hangingPunct="1">
+              <a:defRPr sz="1800" kern="1200">
+                <a:solidFill>
+                  <a:schemeClr val="dk1"/>
+                </a:solidFill>
+                <a:latin typeface="+mn-lt"/>
+                <a:ea typeface="+mn-ea"/>
+                <a:cs typeface="+mn-cs"/>
+              </a:defRPr>
+            </a:lvl7pPr>
+            <a:lvl8pPr marL="3200400" algn="l" defTabSz="457200" rtl="0" eaLnBrk="1" latinLnBrk="0" hangingPunct="1">
+              <a:defRPr sz="1800" kern="1200">
+                <a:solidFill>
+                  <a:schemeClr val="dk1"/>
+                </a:solidFill>
+                <a:latin typeface="+mn-lt"/>
+                <a:ea typeface="+mn-ea"/>
+                <a:cs typeface="+mn-cs"/>
+              </a:defRPr>
+            </a:lvl8pPr>
+            <a:lvl9pPr marL="3657600" algn="l" defTabSz="457200" rtl="0" eaLnBrk="1" latinLnBrk="0" hangingPunct="1">
+              <a:defRPr sz="1800" kern="1200">
+                <a:solidFill>
+                  <a:schemeClr val="dk1"/>
+                </a:solidFill>
+                <a:latin typeface="+mn-lt"/>
+                <a:ea typeface="+mn-ea"/>
+                <a:cs typeface="+mn-cs"/>
+              </a:defRPr>
+            </a:lvl9pPr>
+          </a:lstStyle>
+          <a:p>
+            <a:pPr algn="ctr"/>
+            <a:r>
+              <a:rPr lang="en-GB" dirty="0"/>
+              <a:t>User</a:t>
+            </a:r>
+          </a:p>
+        </p:txBody>
+      </p:sp>
+      <p:sp>
+        <p:nvSpPr>
+          <p:cNvPr id="6" name="Rectangle 5">
+            <a:extLst>
+              <a:ext uri="{FF2B5EF4-FFF2-40B4-BE49-F238E27FC236}">
+                <a16:creationId xmlns="" xmlns:a16="http://schemas.microsoft.com/office/drawing/2014/main" xmlns:lc="http://schemas.openxmlformats.org/drawingml/2006/lockedCanvas" id="{ABDBCB31-F53D-4507-A378-BE7CFA17B456}"/>
+              </a:ext>
+            </a:extLst>
+          </p:cNvPr>
+          <p:cNvSpPr/>
+          <p:nvPr/>
+        </p:nvSpPr>
+        <p:spPr>
+          <a:xfrm>
+            <a:off x="1797151" y="2862775"/>
+            <a:ext cx="1470072" cy="998806"/>
+          </a:xfrm>
+          <a:prstGeom prst="rect">
+            <a:avLst/>
+          </a:prstGeom>
+          <a:ln>
+            <a:solidFill>
+              <a:schemeClr val="tx1"/>
+            </a:solidFill>
+          </a:ln>
+        </p:spPr>
+        <p:style>
+          <a:lnRef idx="2">
+            <a:schemeClr val="accent6"/>
+          </a:lnRef>
+          <a:fillRef idx="1">
+            <a:schemeClr val="lt1"/>
+          </a:fillRef>
+          <a:effectRef idx="0">
+            <a:schemeClr val="accent6"/>
+          </a:effectRef>
+          <a:fontRef idx="minor">
+            <a:schemeClr val="dk1"/>
+          </a:fontRef>
+        </p:style>
+        <p:txBody>
+          <a:bodyPr rtlCol="0" anchor="ctr"/>
+          <a:lstStyle>
+            <a:defPPr>
+              <a:defRPr lang="en-US"/>
+            </a:defPPr>
+            <a:lvl1pPr marL="0" algn="l" defTabSz="457200" rtl="0" eaLnBrk="1" latinLnBrk="0" hangingPunct="1">
+              <a:defRPr sz="1800" kern="1200">
+                <a:solidFill>
+                  <a:schemeClr val="dk1"/>
+                </a:solidFill>
+                <a:latin typeface="+mn-lt"/>
+                <a:ea typeface="+mn-ea"/>
+                <a:cs typeface="+mn-cs"/>
+              </a:defRPr>
+            </a:lvl1pPr>
+            <a:lvl2pPr marL="457200" algn="l" defTabSz="457200" rtl="0" eaLnBrk="1" latinLnBrk="0" hangingPunct="1">
+              <a:defRPr sz="1800" kern="1200">
+                <a:solidFill>
+                  <a:schemeClr val="dk1"/>
+                </a:solidFill>
+                <a:latin typeface="+mn-lt"/>
+                <a:ea typeface="+mn-ea"/>
+                <a:cs typeface="+mn-cs"/>
+              </a:defRPr>
+            </a:lvl2pPr>
+            <a:lvl3pPr marL="914400" algn="l" defTabSz="457200" rtl="0" eaLnBrk="1" latinLnBrk="0" hangingPunct="1">
+              <a:defRPr sz="1800" kern="1200">
+                <a:solidFill>
+                  <a:schemeClr val="dk1"/>
+                </a:solidFill>
+                <a:latin typeface="+mn-lt"/>
+                <a:ea typeface="+mn-ea"/>
+                <a:cs typeface="+mn-cs"/>
+              </a:defRPr>
+            </a:lvl3pPr>
+            <a:lvl4pPr marL="1371600" algn="l" defTabSz="457200" rtl="0" eaLnBrk="1" latinLnBrk="0" hangingPunct="1">
+              <a:defRPr sz="1800" kern="1200">
+                <a:solidFill>
+                  <a:schemeClr val="dk1"/>
+                </a:solidFill>
+                <a:latin typeface="+mn-lt"/>
+                <a:ea typeface="+mn-ea"/>
+                <a:cs typeface="+mn-cs"/>
+              </a:defRPr>
+            </a:lvl4pPr>
+            <a:lvl5pPr marL="1828800" algn="l" defTabSz="457200" rtl="0" eaLnBrk="1" latinLnBrk="0" hangingPunct="1">
+              <a:defRPr sz="1800" kern="1200">
+                <a:solidFill>
+                  <a:schemeClr val="dk1"/>
+                </a:solidFill>
+                <a:latin typeface="+mn-lt"/>
+                <a:ea typeface="+mn-ea"/>
+                <a:cs typeface="+mn-cs"/>
+              </a:defRPr>
+            </a:lvl5pPr>
+            <a:lvl6pPr marL="2286000" algn="l" defTabSz="457200" rtl="0" eaLnBrk="1" latinLnBrk="0" hangingPunct="1">
+              <a:defRPr sz="1800" kern="1200">
+                <a:solidFill>
+                  <a:schemeClr val="dk1"/>
+                </a:solidFill>
+                <a:latin typeface="+mn-lt"/>
+                <a:ea typeface="+mn-ea"/>
+                <a:cs typeface="+mn-cs"/>
+              </a:defRPr>
+            </a:lvl6pPr>
+            <a:lvl7pPr marL="2743200" algn="l" defTabSz="457200" rtl="0" eaLnBrk="1" latinLnBrk="0" hangingPunct="1">
+              <a:defRPr sz="1800" kern="1200">
+                <a:solidFill>
+                  <a:schemeClr val="dk1"/>
+                </a:solidFill>
+                <a:latin typeface="+mn-lt"/>
+                <a:ea typeface="+mn-ea"/>
+                <a:cs typeface="+mn-cs"/>
+              </a:defRPr>
+            </a:lvl7pPr>
+            <a:lvl8pPr marL="3200400" algn="l" defTabSz="457200" rtl="0" eaLnBrk="1" latinLnBrk="0" hangingPunct="1">
+              <a:defRPr sz="1800" kern="1200">
+                <a:solidFill>
+                  <a:schemeClr val="dk1"/>
+                </a:solidFill>
+                <a:latin typeface="+mn-lt"/>
+                <a:ea typeface="+mn-ea"/>
+                <a:cs typeface="+mn-cs"/>
+              </a:defRPr>
+            </a:lvl8pPr>
+            <a:lvl9pPr marL="3657600" algn="l" defTabSz="457200" rtl="0" eaLnBrk="1" latinLnBrk="0" hangingPunct="1">
+              <a:defRPr sz="1800" kern="1200">
+                <a:solidFill>
+                  <a:schemeClr val="dk1"/>
+                </a:solidFill>
+                <a:latin typeface="+mn-lt"/>
+                <a:ea typeface="+mn-ea"/>
+                <a:cs typeface="+mn-cs"/>
+              </a:defRPr>
+            </a:lvl9pPr>
+          </a:lstStyle>
+          <a:p>
+            <a:pPr algn="ctr"/>
+            <a:r>
+              <a:rPr lang="en-GB" sz="1600" dirty="0"/>
+              <a:t>Client/Browser</a:t>
+            </a:r>
+          </a:p>
+        </p:txBody>
+      </p:sp>
+      <p:sp>
+        <p:nvSpPr>
+          <p:cNvPr id="7" name="Rectangle 6">
+            <a:extLst>
+              <a:ext uri="{FF2B5EF4-FFF2-40B4-BE49-F238E27FC236}">
+                <a16:creationId xmlns="" xmlns:a16="http://schemas.microsoft.com/office/drawing/2014/main" xmlns:lc="http://schemas.openxmlformats.org/drawingml/2006/lockedCanvas" id="{6F5EF35C-A1D4-4B07-9AA4-D013EBFCAC74}"/>
+              </a:ext>
+            </a:extLst>
+          </p:cNvPr>
+          <p:cNvSpPr/>
+          <p:nvPr/>
+        </p:nvSpPr>
+        <p:spPr>
+          <a:xfrm>
+            <a:off x="4280095" y="2532184"/>
+            <a:ext cx="1659985" cy="1659989"/>
+          </a:xfrm>
+          <a:prstGeom prst="rect">
+            <a:avLst/>
+          </a:prstGeom>
+          <a:ln>
+            <a:solidFill>
+              <a:schemeClr val="tx1"/>
+            </a:solidFill>
+          </a:ln>
+        </p:spPr>
+        <p:style>
+          <a:lnRef idx="2">
+            <a:schemeClr val="accent6"/>
+          </a:lnRef>
+          <a:fillRef idx="1">
+            <a:schemeClr val="lt1"/>
+          </a:fillRef>
+          <a:effectRef idx="0">
+            <a:schemeClr val="accent6"/>
+          </a:effectRef>
+          <a:fontRef idx="minor">
+            <a:schemeClr val="dk1"/>
+          </a:fontRef>
+        </p:style>
+        <p:txBody>
+          <a:bodyPr rtlCol="0" anchor="ctr"/>
+          <a:lstStyle>
+            <a:defPPr>
+              <a:defRPr lang="en-US"/>
+            </a:defPPr>
+            <a:lvl1pPr marL="0" algn="l" defTabSz="457200" rtl="0" eaLnBrk="1" latinLnBrk="0" hangingPunct="1">
+              <a:defRPr sz="1800" kern="1200">
+                <a:solidFill>
+                  <a:schemeClr val="dk1"/>
+                </a:solidFill>
+                <a:latin typeface="+mn-lt"/>
+                <a:ea typeface="+mn-ea"/>
+                <a:cs typeface="+mn-cs"/>
+              </a:defRPr>
+            </a:lvl1pPr>
+            <a:lvl2pPr marL="457200" algn="l" defTabSz="457200" rtl="0" eaLnBrk="1" latinLnBrk="0" hangingPunct="1">
+              <a:defRPr sz="1800" kern="1200">
+                <a:solidFill>
+                  <a:schemeClr val="dk1"/>
+                </a:solidFill>
+                <a:latin typeface="+mn-lt"/>
+                <a:ea typeface="+mn-ea"/>
+                <a:cs typeface="+mn-cs"/>
+              </a:defRPr>
+            </a:lvl2pPr>
+            <a:lvl3pPr marL="914400" algn="l" defTabSz="457200" rtl="0" eaLnBrk="1" latinLnBrk="0" hangingPunct="1">
+              <a:defRPr sz="1800" kern="1200">
+                <a:solidFill>
+                  <a:schemeClr val="dk1"/>
+                </a:solidFill>
+                <a:latin typeface="+mn-lt"/>
+                <a:ea typeface="+mn-ea"/>
+                <a:cs typeface="+mn-cs"/>
+              </a:defRPr>
+            </a:lvl3pPr>
+            <a:lvl4pPr marL="1371600" algn="l" defTabSz="457200" rtl="0" eaLnBrk="1" latinLnBrk="0" hangingPunct="1">
+              <a:defRPr sz="1800" kern="1200">
+                <a:solidFill>
+                  <a:schemeClr val="dk1"/>
+                </a:solidFill>
+                <a:latin typeface="+mn-lt"/>
+                <a:ea typeface="+mn-ea"/>
+                <a:cs typeface="+mn-cs"/>
+              </a:defRPr>
+            </a:lvl4pPr>
+            <a:lvl5pPr marL="1828800" algn="l" defTabSz="457200" rtl="0" eaLnBrk="1" latinLnBrk="0" hangingPunct="1">
+              <a:defRPr sz="1800" kern="1200">
+                <a:solidFill>
+                  <a:schemeClr val="dk1"/>
+                </a:solidFill>
+                <a:latin typeface="+mn-lt"/>
+                <a:ea typeface="+mn-ea"/>
+                <a:cs typeface="+mn-cs"/>
+              </a:defRPr>
+            </a:lvl5pPr>
+            <a:lvl6pPr marL="2286000" algn="l" defTabSz="457200" rtl="0" eaLnBrk="1" latinLnBrk="0" hangingPunct="1">
+              <a:defRPr sz="1800" kern="1200">
+                <a:solidFill>
+                  <a:schemeClr val="dk1"/>
+                </a:solidFill>
+                <a:latin typeface="+mn-lt"/>
+                <a:ea typeface="+mn-ea"/>
+                <a:cs typeface="+mn-cs"/>
+              </a:defRPr>
+            </a:lvl6pPr>
+            <a:lvl7pPr marL="2743200" algn="l" defTabSz="457200" rtl="0" eaLnBrk="1" latinLnBrk="0" hangingPunct="1">
+              <a:defRPr sz="1800" kern="1200">
+                <a:solidFill>
+                  <a:schemeClr val="dk1"/>
+                </a:solidFill>
+                <a:latin typeface="+mn-lt"/>
+                <a:ea typeface="+mn-ea"/>
+                <a:cs typeface="+mn-cs"/>
+              </a:defRPr>
+            </a:lvl7pPr>
+            <a:lvl8pPr marL="3200400" algn="l" defTabSz="457200" rtl="0" eaLnBrk="1" latinLnBrk="0" hangingPunct="1">
+              <a:defRPr sz="1800" kern="1200">
+                <a:solidFill>
+                  <a:schemeClr val="dk1"/>
+                </a:solidFill>
+                <a:latin typeface="+mn-lt"/>
+                <a:ea typeface="+mn-ea"/>
+                <a:cs typeface="+mn-cs"/>
+              </a:defRPr>
+            </a:lvl8pPr>
+            <a:lvl9pPr marL="3657600" algn="l" defTabSz="457200" rtl="0" eaLnBrk="1" latinLnBrk="0" hangingPunct="1">
+              <a:defRPr sz="1800" kern="1200">
+                <a:solidFill>
+                  <a:schemeClr val="dk1"/>
+                </a:solidFill>
+                <a:latin typeface="+mn-lt"/>
+                <a:ea typeface="+mn-ea"/>
+                <a:cs typeface="+mn-cs"/>
+              </a:defRPr>
+            </a:lvl9pPr>
+          </a:lstStyle>
+          <a:p>
+            <a:pPr algn="ctr"/>
+            <a:r>
+              <a:rPr lang="en-GB" sz="1600" dirty="0"/>
+              <a:t>Web + App server: generate requested event and user pages from models and web APIs</a:t>
+            </a:r>
+          </a:p>
+        </p:txBody>
+      </p:sp>
+      <p:sp>
+        <p:nvSpPr>
+          <p:cNvPr id="8" name="Cylinder 6">
+            <a:extLst>
+              <a:ext uri="{FF2B5EF4-FFF2-40B4-BE49-F238E27FC236}">
+                <a16:creationId xmlns="" xmlns:a16="http://schemas.microsoft.com/office/drawing/2014/main" xmlns:lc="http://schemas.openxmlformats.org/drawingml/2006/lockedCanvas" id="{FE7C4D8C-B989-4686-962B-D7E23B2C22DE}"/>
+              </a:ext>
+            </a:extLst>
+          </p:cNvPr>
+          <p:cNvSpPr/>
+          <p:nvPr/>
+        </p:nvSpPr>
+        <p:spPr>
+          <a:xfrm>
+            <a:off x="6362120" y="3861581"/>
+            <a:ext cx="1659986" cy="1835835"/>
+          </a:xfrm>
+          <a:prstGeom prst="can">
+            <a:avLst/>
+          </a:prstGeom>
+          <a:ln>
+            <a:solidFill>
+              <a:schemeClr val="tx1"/>
+            </a:solidFill>
+          </a:ln>
+        </p:spPr>
+        <p:style>
+          <a:lnRef idx="2">
+            <a:schemeClr val="accent6"/>
+          </a:lnRef>
+          <a:fillRef idx="1">
+            <a:schemeClr val="lt1"/>
+          </a:fillRef>
+          <a:effectRef idx="0">
+            <a:schemeClr val="accent6"/>
+          </a:effectRef>
+          <a:fontRef idx="minor">
+            <a:schemeClr val="dk1"/>
+          </a:fontRef>
+        </p:style>
+        <p:txBody>
+          <a:bodyPr rtlCol="0" anchor="ctr"/>
+          <a:lstStyle>
+            <a:defPPr>
+              <a:defRPr lang="en-US"/>
+            </a:defPPr>
+            <a:lvl1pPr marL="0" algn="l" defTabSz="457200" rtl="0" eaLnBrk="1" latinLnBrk="0" hangingPunct="1">
+              <a:defRPr sz="1800" kern="1200">
+                <a:solidFill>
+                  <a:schemeClr val="dk1"/>
+                </a:solidFill>
+                <a:latin typeface="+mn-lt"/>
+                <a:ea typeface="+mn-ea"/>
+                <a:cs typeface="+mn-cs"/>
+              </a:defRPr>
+            </a:lvl1pPr>
+            <a:lvl2pPr marL="457200" algn="l" defTabSz="457200" rtl="0" eaLnBrk="1" latinLnBrk="0" hangingPunct="1">
+              <a:defRPr sz="1800" kern="1200">
+                <a:solidFill>
+                  <a:schemeClr val="dk1"/>
+                </a:solidFill>
+                <a:latin typeface="+mn-lt"/>
+                <a:ea typeface="+mn-ea"/>
+                <a:cs typeface="+mn-cs"/>
+              </a:defRPr>
+            </a:lvl2pPr>
+            <a:lvl3pPr marL="914400" algn="l" defTabSz="457200" rtl="0" eaLnBrk="1" latinLnBrk="0" hangingPunct="1">
+              <a:defRPr sz="1800" kern="1200">
+                <a:solidFill>
+                  <a:schemeClr val="dk1"/>
+                </a:solidFill>
+                <a:latin typeface="+mn-lt"/>
+                <a:ea typeface="+mn-ea"/>
+                <a:cs typeface="+mn-cs"/>
+              </a:defRPr>
+            </a:lvl3pPr>
+            <a:lvl4pPr marL="1371600" algn="l" defTabSz="457200" rtl="0" eaLnBrk="1" latinLnBrk="0" hangingPunct="1">
+              <a:defRPr sz="1800" kern="1200">
+                <a:solidFill>
+                  <a:schemeClr val="dk1"/>
+                </a:solidFill>
+                <a:latin typeface="+mn-lt"/>
+                <a:ea typeface="+mn-ea"/>
+                <a:cs typeface="+mn-cs"/>
+              </a:defRPr>
+            </a:lvl4pPr>
+            <a:lvl5pPr marL="1828800" algn="l" defTabSz="457200" rtl="0" eaLnBrk="1" latinLnBrk="0" hangingPunct="1">
+              <a:defRPr sz="1800" kern="1200">
+                <a:solidFill>
+                  <a:schemeClr val="dk1"/>
+                </a:solidFill>
+                <a:latin typeface="+mn-lt"/>
+                <a:ea typeface="+mn-ea"/>
+                <a:cs typeface="+mn-cs"/>
+              </a:defRPr>
+            </a:lvl5pPr>
+            <a:lvl6pPr marL="2286000" algn="l" defTabSz="457200" rtl="0" eaLnBrk="1" latinLnBrk="0" hangingPunct="1">
+              <a:defRPr sz="1800" kern="1200">
+                <a:solidFill>
+                  <a:schemeClr val="dk1"/>
+                </a:solidFill>
+                <a:latin typeface="+mn-lt"/>
+                <a:ea typeface="+mn-ea"/>
+                <a:cs typeface="+mn-cs"/>
+              </a:defRPr>
+            </a:lvl6pPr>
+            <a:lvl7pPr marL="2743200" algn="l" defTabSz="457200" rtl="0" eaLnBrk="1" latinLnBrk="0" hangingPunct="1">
+              <a:defRPr sz="1800" kern="1200">
+                <a:solidFill>
+                  <a:schemeClr val="dk1"/>
+                </a:solidFill>
+                <a:latin typeface="+mn-lt"/>
+                <a:ea typeface="+mn-ea"/>
+                <a:cs typeface="+mn-cs"/>
+              </a:defRPr>
+            </a:lvl7pPr>
+            <a:lvl8pPr marL="3200400" algn="l" defTabSz="457200" rtl="0" eaLnBrk="1" latinLnBrk="0" hangingPunct="1">
+              <a:defRPr sz="1800" kern="1200">
+                <a:solidFill>
+                  <a:schemeClr val="dk1"/>
+                </a:solidFill>
+                <a:latin typeface="+mn-lt"/>
+                <a:ea typeface="+mn-ea"/>
+                <a:cs typeface="+mn-cs"/>
+              </a:defRPr>
+            </a:lvl8pPr>
+            <a:lvl9pPr marL="3657600" algn="l" defTabSz="457200" rtl="0" eaLnBrk="1" latinLnBrk="0" hangingPunct="1">
+              <a:defRPr sz="1800" kern="1200">
+                <a:solidFill>
+                  <a:schemeClr val="dk1"/>
+                </a:solidFill>
+                <a:latin typeface="+mn-lt"/>
+                <a:ea typeface="+mn-ea"/>
+                <a:cs typeface="+mn-cs"/>
+              </a:defRPr>
+            </a:lvl9pPr>
+          </a:lstStyle>
+          <a:p>
+            <a:pPr algn="ctr"/>
+            <a:r>
+              <a:rPr lang="en-GB" dirty="0"/>
+              <a:t>User and Event Models</a:t>
+            </a:r>
+          </a:p>
+        </p:txBody>
+      </p:sp>
+      <p:sp>
+        <p:nvSpPr>
+          <p:cNvPr id="9" name="Cloud 8">
+            <a:extLst>
+              <a:ext uri="{FF2B5EF4-FFF2-40B4-BE49-F238E27FC236}">
+                <a16:creationId xmlns="" xmlns:a16="http://schemas.microsoft.com/office/drawing/2014/main" xmlns:lc="http://schemas.openxmlformats.org/drawingml/2006/lockedCanvas" id="{22FCD021-5F16-4E81-898B-41D4C4FA17AF}"/>
+              </a:ext>
+            </a:extLst>
+          </p:cNvPr>
+          <p:cNvSpPr/>
+          <p:nvPr/>
+        </p:nvSpPr>
+        <p:spPr>
+          <a:xfrm>
+            <a:off x="6122969" y="1160584"/>
+            <a:ext cx="2138289" cy="1702191"/>
+          </a:xfrm>
+          <a:prstGeom prst="cloud">
+            <a:avLst/>
+          </a:prstGeom>
+          <a:ln>
+            <a:solidFill>
+              <a:schemeClr val="tx1"/>
+            </a:solidFill>
+          </a:ln>
+        </p:spPr>
+        <p:style>
+          <a:lnRef idx="2">
+            <a:schemeClr val="accent6"/>
+          </a:lnRef>
+          <a:fillRef idx="1">
+            <a:schemeClr val="lt1"/>
+          </a:fillRef>
+          <a:effectRef idx="0">
+            <a:schemeClr val="accent6"/>
+          </a:effectRef>
+          <a:fontRef idx="minor">
+            <a:schemeClr val="dk1"/>
+          </a:fontRef>
+        </p:style>
+        <p:txBody>
+          <a:bodyPr rtlCol="0" anchor="ctr"/>
+          <a:lstStyle>
+            <a:defPPr>
+              <a:defRPr lang="en-US"/>
+            </a:defPPr>
+            <a:lvl1pPr marL="0" algn="l" defTabSz="457200" rtl="0" eaLnBrk="1" latinLnBrk="0" hangingPunct="1">
+              <a:defRPr sz="1800" kern="1200">
+                <a:solidFill>
+                  <a:schemeClr val="dk1"/>
+                </a:solidFill>
+                <a:latin typeface="+mn-lt"/>
+                <a:ea typeface="+mn-ea"/>
+                <a:cs typeface="+mn-cs"/>
+              </a:defRPr>
+            </a:lvl1pPr>
+            <a:lvl2pPr marL="457200" algn="l" defTabSz="457200" rtl="0" eaLnBrk="1" latinLnBrk="0" hangingPunct="1">
+              <a:defRPr sz="1800" kern="1200">
+                <a:solidFill>
+                  <a:schemeClr val="dk1"/>
+                </a:solidFill>
+                <a:latin typeface="+mn-lt"/>
+                <a:ea typeface="+mn-ea"/>
+                <a:cs typeface="+mn-cs"/>
+              </a:defRPr>
+            </a:lvl2pPr>
+            <a:lvl3pPr marL="914400" algn="l" defTabSz="457200" rtl="0" eaLnBrk="1" latinLnBrk="0" hangingPunct="1">
+              <a:defRPr sz="1800" kern="1200">
+                <a:solidFill>
+                  <a:schemeClr val="dk1"/>
+                </a:solidFill>
+                <a:latin typeface="+mn-lt"/>
+                <a:ea typeface="+mn-ea"/>
+                <a:cs typeface="+mn-cs"/>
+              </a:defRPr>
+            </a:lvl3pPr>
+            <a:lvl4pPr marL="1371600" algn="l" defTabSz="457200" rtl="0" eaLnBrk="1" latinLnBrk="0" hangingPunct="1">
+              <a:defRPr sz="1800" kern="1200">
+                <a:solidFill>
+                  <a:schemeClr val="dk1"/>
+                </a:solidFill>
+                <a:latin typeface="+mn-lt"/>
+                <a:ea typeface="+mn-ea"/>
+                <a:cs typeface="+mn-cs"/>
+              </a:defRPr>
+            </a:lvl4pPr>
+            <a:lvl5pPr marL="1828800" algn="l" defTabSz="457200" rtl="0" eaLnBrk="1" latinLnBrk="0" hangingPunct="1">
+              <a:defRPr sz="1800" kern="1200">
+                <a:solidFill>
+                  <a:schemeClr val="dk1"/>
+                </a:solidFill>
+                <a:latin typeface="+mn-lt"/>
+                <a:ea typeface="+mn-ea"/>
+                <a:cs typeface="+mn-cs"/>
+              </a:defRPr>
+            </a:lvl5pPr>
+            <a:lvl6pPr marL="2286000" algn="l" defTabSz="457200" rtl="0" eaLnBrk="1" latinLnBrk="0" hangingPunct="1">
+              <a:defRPr sz="1800" kern="1200">
+                <a:solidFill>
+                  <a:schemeClr val="dk1"/>
+                </a:solidFill>
+                <a:latin typeface="+mn-lt"/>
+                <a:ea typeface="+mn-ea"/>
+                <a:cs typeface="+mn-cs"/>
+              </a:defRPr>
+            </a:lvl6pPr>
+            <a:lvl7pPr marL="2743200" algn="l" defTabSz="457200" rtl="0" eaLnBrk="1" latinLnBrk="0" hangingPunct="1">
+              <a:defRPr sz="1800" kern="1200">
+                <a:solidFill>
+                  <a:schemeClr val="dk1"/>
+                </a:solidFill>
+                <a:latin typeface="+mn-lt"/>
+                <a:ea typeface="+mn-ea"/>
+                <a:cs typeface="+mn-cs"/>
+              </a:defRPr>
+            </a:lvl7pPr>
+            <a:lvl8pPr marL="3200400" algn="l" defTabSz="457200" rtl="0" eaLnBrk="1" latinLnBrk="0" hangingPunct="1">
+              <a:defRPr sz="1800" kern="1200">
+                <a:solidFill>
+                  <a:schemeClr val="dk1"/>
+                </a:solidFill>
+                <a:latin typeface="+mn-lt"/>
+                <a:ea typeface="+mn-ea"/>
+                <a:cs typeface="+mn-cs"/>
+              </a:defRPr>
+            </a:lvl8pPr>
+            <a:lvl9pPr marL="3657600" algn="l" defTabSz="457200" rtl="0" eaLnBrk="1" latinLnBrk="0" hangingPunct="1">
+              <a:defRPr sz="1800" kern="1200">
+                <a:solidFill>
+                  <a:schemeClr val="dk1"/>
+                </a:solidFill>
+                <a:latin typeface="+mn-lt"/>
+                <a:ea typeface="+mn-ea"/>
+                <a:cs typeface="+mn-cs"/>
+              </a:defRPr>
+            </a:lvl9pPr>
+          </a:lstStyle>
+          <a:p>
+            <a:pPr algn="ctr"/>
+            <a:r>
+              <a:rPr lang="en-GB" sz="1700" dirty="0"/>
+              <a:t>Google Maps/Search API</a:t>
+            </a:r>
+          </a:p>
+        </p:txBody>
+      </p:sp>
+      <p:cxnSp>
+        <p:nvCxnSpPr>
+          <p:cNvPr id="10" name="Straight Arrow Connector 9">
+            <a:extLst>
+              <a:ext uri="{FF2B5EF4-FFF2-40B4-BE49-F238E27FC236}">
+                <a16:creationId xmlns="" xmlns:a16="http://schemas.microsoft.com/office/drawing/2014/main" xmlns:lc="http://schemas.openxmlformats.org/drawingml/2006/lockedCanvas" id="{B55D699D-AA73-4291-9F66-3CC406F2B1F1}"/>
+              </a:ext>
+            </a:extLst>
+          </p:cNvPr>
+          <p:cNvCxnSpPr/>
+          <p:nvPr/>
+        </p:nvCxnSpPr>
+        <p:spPr>
+          <a:xfrm>
+            <a:off x="1121898" y="3432517"/>
+            <a:ext cx="675252" cy="0"/>
+          </a:xfrm>
+          <a:prstGeom prst="straightConnector1">
+            <a:avLst/>
+          </a:prstGeom>
+          <a:ln>
+            <a:headEnd type="triangle"/>
+            <a:tailEnd type="triangle"/>
+          </a:ln>
+        </p:spPr>
+        <p:style>
+          <a:lnRef idx="1">
+            <a:schemeClr val="dk1"/>
+          </a:lnRef>
+          <a:fillRef idx="0">
+            <a:schemeClr val="dk1"/>
+          </a:fillRef>
+          <a:effectRef idx="0">
+            <a:schemeClr val="dk1"/>
+          </a:effectRef>
+          <a:fontRef idx="minor">
+            <a:schemeClr val="tx1"/>
+          </a:fontRef>
+        </p:style>
+      </p:cxnSp>
+      <p:cxnSp>
+        <p:nvCxnSpPr>
+          <p:cNvPr id="11" name="Straight Arrow Connector 10">
+            <a:extLst>
+              <a:ext uri="{FF2B5EF4-FFF2-40B4-BE49-F238E27FC236}">
+                <a16:creationId xmlns="" xmlns:a16="http://schemas.microsoft.com/office/drawing/2014/main" xmlns:lc="http://schemas.openxmlformats.org/drawingml/2006/lockedCanvas" id="{421EB064-C123-401C-8916-BD749239F660}"/>
+              </a:ext>
+            </a:extLst>
+          </p:cNvPr>
+          <p:cNvCxnSpPr/>
+          <p:nvPr/>
+        </p:nvCxnSpPr>
+        <p:spPr>
+          <a:xfrm>
+            <a:off x="3267223" y="3052689"/>
+            <a:ext cx="1012873" cy="0"/>
+          </a:xfrm>
+          <a:prstGeom prst="straightConnector1">
+            <a:avLst/>
+          </a:prstGeom>
+          <a:ln>
+            <a:tailEnd type="triangle"/>
+          </a:ln>
+        </p:spPr>
+        <p:style>
+          <a:lnRef idx="1">
+            <a:schemeClr val="dk1"/>
+          </a:lnRef>
+          <a:fillRef idx="0">
+            <a:schemeClr val="dk1"/>
+          </a:fillRef>
+          <a:effectRef idx="0">
+            <a:schemeClr val="dk1"/>
+          </a:effectRef>
+          <a:fontRef idx="minor">
+            <a:schemeClr val="tx1"/>
+          </a:fontRef>
+        </p:style>
+      </p:cxnSp>
+      <p:cxnSp>
+        <p:nvCxnSpPr>
+          <p:cNvPr id="12" name="Straight Arrow Connector 11">
+            <a:extLst>
+              <a:ext uri="{FF2B5EF4-FFF2-40B4-BE49-F238E27FC236}">
+                <a16:creationId xmlns="" xmlns:a16="http://schemas.microsoft.com/office/drawing/2014/main" xmlns:lc="http://schemas.openxmlformats.org/drawingml/2006/lockedCanvas" id="{7BEA5191-9807-4E93-BFEC-1F9975B34C64}"/>
+              </a:ext>
+            </a:extLst>
+          </p:cNvPr>
+          <p:cNvCxnSpPr/>
+          <p:nvPr/>
+        </p:nvCxnSpPr>
+        <p:spPr>
+          <a:xfrm flipH="1">
+            <a:off x="3267223" y="3668150"/>
+            <a:ext cx="1012873" cy="0"/>
+          </a:xfrm>
+          <a:prstGeom prst="straightConnector1">
+            <a:avLst/>
+          </a:prstGeom>
+          <a:ln>
+            <a:tailEnd type="triangle"/>
+          </a:ln>
+        </p:spPr>
+        <p:style>
+          <a:lnRef idx="1">
+            <a:schemeClr val="dk1"/>
+          </a:lnRef>
+          <a:fillRef idx="0">
+            <a:schemeClr val="dk1"/>
+          </a:fillRef>
+          <a:effectRef idx="0">
+            <a:schemeClr val="dk1"/>
+          </a:effectRef>
+          <a:fontRef idx="minor">
+            <a:schemeClr val="tx1"/>
+          </a:fontRef>
+        </p:style>
+      </p:cxnSp>
+      <p:sp>
+        <p:nvSpPr>
+          <p:cNvPr id="13" name="Rectangle 12">
+            <a:extLst>
+              <a:ext uri="{FF2B5EF4-FFF2-40B4-BE49-F238E27FC236}">
+                <a16:creationId xmlns="" xmlns:a16="http://schemas.microsoft.com/office/drawing/2014/main" xmlns:lc="http://schemas.openxmlformats.org/drawingml/2006/lockedCanvas" id="{57BD7027-013B-4781-BA76-526CB5D06242}"/>
+              </a:ext>
+            </a:extLst>
+          </p:cNvPr>
+          <p:cNvSpPr/>
+          <p:nvPr/>
+        </p:nvSpPr>
+        <p:spPr>
+          <a:xfrm>
+            <a:off x="1930791" y="2933119"/>
+            <a:ext cx="1223890" cy="267283"/>
+          </a:xfrm>
+          <a:prstGeom prst="rect">
+            <a:avLst/>
+          </a:prstGeom>
+          <a:ln>
+            <a:solidFill>
+              <a:schemeClr val="tx1"/>
+            </a:solidFill>
+          </a:ln>
+        </p:spPr>
+        <p:style>
+          <a:lnRef idx="2">
+            <a:schemeClr val="accent6"/>
+          </a:lnRef>
+          <a:fillRef idx="1">
+            <a:schemeClr val="lt1"/>
+          </a:fillRef>
+          <a:effectRef idx="0">
+            <a:schemeClr val="accent6"/>
+          </a:effectRef>
+          <a:fontRef idx="minor">
+            <a:schemeClr val="dk1"/>
+          </a:fontRef>
+        </p:style>
+        <p:txBody>
+          <a:bodyPr rtlCol="0" anchor="ctr"/>
+          <a:lstStyle>
+            <a:defPPr>
+              <a:defRPr lang="en-US"/>
+            </a:defPPr>
+            <a:lvl1pPr marL="0" algn="l" defTabSz="457200" rtl="0" eaLnBrk="1" latinLnBrk="0" hangingPunct="1">
+              <a:defRPr sz="1800" kern="1200">
+                <a:solidFill>
+                  <a:schemeClr val="dk1"/>
+                </a:solidFill>
+                <a:latin typeface="+mn-lt"/>
+                <a:ea typeface="+mn-ea"/>
+                <a:cs typeface="+mn-cs"/>
+              </a:defRPr>
+            </a:lvl1pPr>
+            <a:lvl2pPr marL="457200" algn="l" defTabSz="457200" rtl="0" eaLnBrk="1" latinLnBrk="0" hangingPunct="1">
+              <a:defRPr sz="1800" kern="1200">
+                <a:solidFill>
+                  <a:schemeClr val="dk1"/>
+                </a:solidFill>
+                <a:latin typeface="+mn-lt"/>
+                <a:ea typeface="+mn-ea"/>
+                <a:cs typeface="+mn-cs"/>
+              </a:defRPr>
+            </a:lvl2pPr>
+            <a:lvl3pPr marL="914400" algn="l" defTabSz="457200" rtl="0" eaLnBrk="1" latinLnBrk="0" hangingPunct="1">
+              <a:defRPr sz="1800" kern="1200">
+                <a:solidFill>
+                  <a:schemeClr val="dk1"/>
+                </a:solidFill>
+                <a:latin typeface="+mn-lt"/>
+                <a:ea typeface="+mn-ea"/>
+                <a:cs typeface="+mn-cs"/>
+              </a:defRPr>
+            </a:lvl3pPr>
+            <a:lvl4pPr marL="1371600" algn="l" defTabSz="457200" rtl="0" eaLnBrk="1" latinLnBrk="0" hangingPunct="1">
+              <a:defRPr sz="1800" kern="1200">
+                <a:solidFill>
+                  <a:schemeClr val="dk1"/>
+                </a:solidFill>
+                <a:latin typeface="+mn-lt"/>
+                <a:ea typeface="+mn-ea"/>
+                <a:cs typeface="+mn-cs"/>
+              </a:defRPr>
+            </a:lvl4pPr>
+            <a:lvl5pPr marL="1828800" algn="l" defTabSz="457200" rtl="0" eaLnBrk="1" latinLnBrk="0" hangingPunct="1">
+              <a:defRPr sz="1800" kern="1200">
+                <a:solidFill>
+                  <a:schemeClr val="dk1"/>
+                </a:solidFill>
+                <a:latin typeface="+mn-lt"/>
+                <a:ea typeface="+mn-ea"/>
+                <a:cs typeface="+mn-cs"/>
+              </a:defRPr>
+            </a:lvl5pPr>
+            <a:lvl6pPr marL="2286000" algn="l" defTabSz="457200" rtl="0" eaLnBrk="1" latinLnBrk="0" hangingPunct="1">
+              <a:defRPr sz="1800" kern="1200">
+                <a:solidFill>
+                  <a:schemeClr val="dk1"/>
+                </a:solidFill>
+                <a:latin typeface="+mn-lt"/>
+                <a:ea typeface="+mn-ea"/>
+                <a:cs typeface="+mn-cs"/>
+              </a:defRPr>
+            </a:lvl6pPr>
+            <a:lvl7pPr marL="2743200" algn="l" defTabSz="457200" rtl="0" eaLnBrk="1" latinLnBrk="0" hangingPunct="1">
+              <a:defRPr sz="1800" kern="1200">
+                <a:solidFill>
+                  <a:schemeClr val="dk1"/>
+                </a:solidFill>
+                <a:latin typeface="+mn-lt"/>
+                <a:ea typeface="+mn-ea"/>
+                <a:cs typeface="+mn-cs"/>
+              </a:defRPr>
+            </a:lvl7pPr>
+            <a:lvl8pPr marL="3200400" algn="l" defTabSz="457200" rtl="0" eaLnBrk="1" latinLnBrk="0" hangingPunct="1">
+              <a:defRPr sz="1800" kern="1200">
+                <a:solidFill>
+                  <a:schemeClr val="dk1"/>
+                </a:solidFill>
+                <a:latin typeface="+mn-lt"/>
+                <a:ea typeface="+mn-ea"/>
+                <a:cs typeface="+mn-cs"/>
+              </a:defRPr>
+            </a:lvl8pPr>
+            <a:lvl9pPr marL="3657600" algn="l" defTabSz="457200" rtl="0" eaLnBrk="1" latinLnBrk="0" hangingPunct="1">
+              <a:defRPr sz="1800" kern="1200">
+                <a:solidFill>
+                  <a:schemeClr val="dk1"/>
+                </a:solidFill>
+                <a:latin typeface="+mn-lt"/>
+                <a:ea typeface="+mn-ea"/>
+                <a:cs typeface="+mn-cs"/>
+              </a:defRPr>
+            </a:lvl9pPr>
+          </a:lstStyle>
+          <a:p>
+            <a:pPr algn="ctr"/>
+            <a:r>
+              <a:rPr lang="en-GB" dirty="0"/>
+              <a:t>Content</a:t>
+            </a:r>
+          </a:p>
+        </p:txBody>
+      </p:sp>
+      <p:sp>
+        <p:nvSpPr>
+          <p:cNvPr id="14" name="Rectangle 13">
+            <a:extLst>
+              <a:ext uri="{FF2B5EF4-FFF2-40B4-BE49-F238E27FC236}">
+                <a16:creationId xmlns="" xmlns:a16="http://schemas.microsoft.com/office/drawing/2014/main" xmlns:lc="http://schemas.openxmlformats.org/drawingml/2006/lockedCanvas" id="{CA0406A8-ADC9-4812-B145-2A6767AC9C37}"/>
+              </a:ext>
+            </a:extLst>
+          </p:cNvPr>
+          <p:cNvSpPr/>
+          <p:nvPr/>
+        </p:nvSpPr>
+        <p:spPr>
+          <a:xfrm>
+            <a:off x="1930791" y="3520438"/>
+            <a:ext cx="1223890" cy="267283"/>
+          </a:xfrm>
+          <a:prstGeom prst="rect">
+            <a:avLst/>
+          </a:prstGeom>
+          <a:ln>
+            <a:solidFill>
+              <a:schemeClr val="tx1"/>
+            </a:solidFill>
+          </a:ln>
+        </p:spPr>
+        <p:style>
+          <a:lnRef idx="2">
+            <a:schemeClr val="accent6"/>
+          </a:lnRef>
+          <a:fillRef idx="1">
+            <a:schemeClr val="lt1"/>
+          </a:fillRef>
+          <a:effectRef idx="0">
+            <a:schemeClr val="accent6"/>
+          </a:effectRef>
+          <a:fontRef idx="minor">
+            <a:schemeClr val="dk1"/>
+          </a:fontRef>
+        </p:style>
+        <p:txBody>
+          <a:bodyPr rtlCol="0" anchor="ctr"/>
+          <a:lstStyle>
+            <a:defPPr>
+              <a:defRPr lang="en-US"/>
+            </a:defPPr>
+            <a:lvl1pPr marL="0" algn="l" defTabSz="457200" rtl="0" eaLnBrk="1" latinLnBrk="0" hangingPunct="1">
+              <a:defRPr sz="1800" kern="1200">
+                <a:solidFill>
+                  <a:schemeClr val="dk1"/>
+                </a:solidFill>
+                <a:latin typeface="+mn-lt"/>
+                <a:ea typeface="+mn-ea"/>
+                <a:cs typeface="+mn-cs"/>
+              </a:defRPr>
+            </a:lvl1pPr>
+            <a:lvl2pPr marL="457200" algn="l" defTabSz="457200" rtl="0" eaLnBrk="1" latinLnBrk="0" hangingPunct="1">
+              <a:defRPr sz="1800" kern="1200">
+                <a:solidFill>
+                  <a:schemeClr val="dk1"/>
+                </a:solidFill>
+                <a:latin typeface="+mn-lt"/>
+                <a:ea typeface="+mn-ea"/>
+                <a:cs typeface="+mn-cs"/>
+              </a:defRPr>
+            </a:lvl2pPr>
+            <a:lvl3pPr marL="914400" algn="l" defTabSz="457200" rtl="0" eaLnBrk="1" latinLnBrk="0" hangingPunct="1">
+              <a:defRPr sz="1800" kern="1200">
+                <a:solidFill>
+                  <a:schemeClr val="dk1"/>
+                </a:solidFill>
+                <a:latin typeface="+mn-lt"/>
+                <a:ea typeface="+mn-ea"/>
+                <a:cs typeface="+mn-cs"/>
+              </a:defRPr>
+            </a:lvl3pPr>
+            <a:lvl4pPr marL="1371600" algn="l" defTabSz="457200" rtl="0" eaLnBrk="1" latinLnBrk="0" hangingPunct="1">
+              <a:defRPr sz="1800" kern="1200">
+                <a:solidFill>
+                  <a:schemeClr val="dk1"/>
+                </a:solidFill>
+                <a:latin typeface="+mn-lt"/>
+                <a:ea typeface="+mn-ea"/>
+                <a:cs typeface="+mn-cs"/>
+              </a:defRPr>
+            </a:lvl4pPr>
+            <a:lvl5pPr marL="1828800" algn="l" defTabSz="457200" rtl="0" eaLnBrk="1" latinLnBrk="0" hangingPunct="1">
+              <a:defRPr sz="1800" kern="1200">
+                <a:solidFill>
+                  <a:schemeClr val="dk1"/>
+                </a:solidFill>
+                <a:latin typeface="+mn-lt"/>
+                <a:ea typeface="+mn-ea"/>
+                <a:cs typeface="+mn-cs"/>
+              </a:defRPr>
+            </a:lvl5pPr>
+            <a:lvl6pPr marL="2286000" algn="l" defTabSz="457200" rtl="0" eaLnBrk="1" latinLnBrk="0" hangingPunct="1">
+              <a:defRPr sz="1800" kern="1200">
+                <a:solidFill>
+                  <a:schemeClr val="dk1"/>
+                </a:solidFill>
+                <a:latin typeface="+mn-lt"/>
+                <a:ea typeface="+mn-ea"/>
+                <a:cs typeface="+mn-cs"/>
+              </a:defRPr>
+            </a:lvl6pPr>
+            <a:lvl7pPr marL="2743200" algn="l" defTabSz="457200" rtl="0" eaLnBrk="1" latinLnBrk="0" hangingPunct="1">
+              <a:defRPr sz="1800" kern="1200">
+                <a:solidFill>
+                  <a:schemeClr val="dk1"/>
+                </a:solidFill>
+                <a:latin typeface="+mn-lt"/>
+                <a:ea typeface="+mn-ea"/>
+                <a:cs typeface="+mn-cs"/>
+              </a:defRPr>
+            </a:lvl7pPr>
+            <a:lvl8pPr marL="3200400" algn="l" defTabSz="457200" rtl="0" eaLnBrk="1" latinLnBrk="0" hangingPunct="1">
+              <a:defRPr sz="1800" kern="1200">
+                <a:solidFill>
+                  <a:schemeClr val="dk1"/>
+                </a:solidFill>
+                <a:latin typeface="+mn-lt"/>
+                <a:ea typeface="+mn-ea"/>
+                <a:cs typeface="+mn-cs"/>
+              </a:defRPr>
+            </a:lvl8pPr>
+            <a:lvl9pPr marL="3657600" algn="l" defTabSz="457200" rtl="0" eaLnBrk="1" latinLnBrk="0" hangingPunct="1">
+              <a:defRPr sz="1800" kern="1200">
+                <a:solidFill>
+                  <a:schemeClr val="dk1"/>
+                </a:solidFill>
+                <a:latin typeface="+mn-lt"/>
+                <a:ea typeface="+mn-ea"/>
+                <a:cs typeface="+mn-cs"/>
+              </a:defRPr>
+            </a:lvl9pPr>
+          </a:lstStyle>
+          <a:p>
+            <a:pPr algn="ctr"/>
+            <a:r>
+              <a:rPr lang="en-GB" sz="1500" dirty="0"/>
+              <a:t>Presentation</a:t>
+            </a:r>
+          </a:p>
+        </p:txBody>
+      </p:sp>
+      <p:sp>
+        <p:nvSpPr>
+          <p:cNvPr id="15" name="TextBox 16">
+            <a:extLst>
+              <a:ext uri="{FF2B5EF4-FFF2-40B4-BE49-F238E27FC236}">
+                <a16:creationId xmlns="" xmlns:a16="http://schemas.microsoft.com/office/drawing/2014/main" xmlns:lc="http://schemas.openxmlformats.org/drawingml/2006/lockedCanvas" id="{A7529262-3903-4209-A4D1-67903BF8ACD3}"/>
+              </a:ext>
+            </a:extLst>
+          </p:cNvPr>
+          <p:cNvSpPr txBox="1"/>
+          <p:nvPr/>
+        </p:nvSpPr>
+        <p:spPr>
+          <a:xfrm>
+            <a:off x="3424591" y="2805150"/>
+            <a:ext cx="718979" cy="523220"/>
+          </a:xfrm>
+          <a:prstGeom prst="rect">
+            <a:avLst/>
+          </a:prstGeom>
+          <a:solidFill>
+            <a:schemeClr val="bg1"/>
+          </a:solidFill>
+        </p:spPr>
+        <p:txBody>
+          <a:bodyPr wrap="none" rtlCol="0">
+            <a:spAutoFit/>
+          </a:bodyPr>
+          <a:lstStyle>
+            <a:defPPr>
+              <a:defRPr lang="en-US"/>
+            </a:defPPr>
+            <a:lvl1pPr marL="0" algn="l" defTabSz="457200" rtl="0" eaLnBrk="1" latinLnBrk="0" hangingPunct="1">
+              <a:defRPr sz="1800" kern="1200">
+                <a:solidFill>
+                  <a:schemeClr val="tx1"/>
+                </a:solidFill>
+                <a:latin typeface="+mn-lt"/>
+                <a:ea typeface="+mn-ea"/>
+                <a:cs typeface="+mn-cs"/>
+              </a:defRPr>
+            </a:lvl1pPr>
+            <a:lvl2pPr marL="457200" algn="l" defTabSz="457200" rtl="0" eaLnBrk="1" latinLnBrk="0" hangingPunct="1">
+              <a:defRPr sz="1800" kern="1200">
+                <a:solidFill>
+                  <a:schemeClr val="tx1"/>
+                </a:solidFill>
+                <a:latin typeface="+mn-lt"/>
+                <a:ea typeface="+mn-ea"/>
+                <a:cs typeface="+mn-cs"/>
+              </a:defRPr>
+            </a:lvl2pPr>
+            <a:lvl3pPr marL="914400" algn="l" defTabSz="457200" rtl="0" eaLnBrk="1" latinLnBrk="0" hangingPunct="1">
+              <a:defRPr sz="1800" kern="1200">
+                <a:solidFill>
+                  <a:schemeClr val="tx1"/>
+                </a:solidFill>
+                <a:latin typeface="+mn-lt"/>
+                <a:ea typeface="+mn-ea"/>
+                <a:cs typeface="+mn-cs"/>
+              </a:defRPr>
+            </a:lvl3pPr>
+            <a:lvl4pPr marL="1371600" algn="l" defTabSz="457200" rtl="0" eaLnBrk="1" latinLnBrk="0" hangingPunct="1">
+              <a:defRPr sz="1800" kern="1200">
+                <a:solidFill>
+                  <a:schemeClr val="tx1"/>
+                </a:solidFill>
+                <a:latin typeface="+mn-lt"/>
+                <a:ea typeface="+mn-ea"/>
+                <a:cs typeface="+mn-cs"/>
+              </a:defRPr>
+            </a:lvl4pPr>
+            <a:lvl5pPr marL="1828800" algn="l" defTabSz="457200" rtl="0" eaLnBrk="1" latinLnBrk="0" hangingPunct="1">
+              <a:defRPr sz="1800" kern="1200">
+                <a:solidFill>
+                  <a:schemeClr val="tx1"/>
+                </a:solidFill>
+                <a:latin typeface="+mn-lt"/>
+                <a:ea typeface="+mn-ea"/>
+                <a:cs typeface="+mn-cs"/>
+              </a:defRPr>
+            </a:lvl5pPr>
+            <a:lvl6pPr marL="2286000" algn="l" defTabSz="457200" rtl="0" eaLnBrk="1" latinLnBrk="0" hangingPunct="1">
+              <a:defRPr sz="1800" kern="1200">
+                <a:solidFill>
+                  <a:schemeClr val="tx1"/>
+                </a:solidFill>
+                <a:latin typeface="+mn-lt"/>
+                <a:ea typeface="+mn-ea"/>
+                <a:cs typeface="+mn-cs"/>
+              </a:defRPr>
+            </a:lvl6pPr>
+            <a:lvl7pPr marL="2743200" algn="l" defTabSz="457200" rtl="0" eaLnBrk="1" latinLnBrk="0" hangingPunct="1">
+              <a:defRPr sz="1800" kern="1200">
+                <a:solidFill>
+                  <a:schemeClr val="tx1"/>
+                </a:solidFill>
+                <a:latin typeface="+mn-lt"/>
+                <a:ea typeface="+mn-ea"/>
+                <a:cs typeface="+mn-cs"/>
+              </a:defRPr>
+            </a:lvl7pPr>
+            <a:lvl8pPr marL="3200400" algn="l" defTabSz="457200" rtl="0" eaLnBrk="1" latinLnBrk="0" hangingPunct="1">
+              <a:defRPr sz="1800" kern="1200">
+                <a:solidFill>
+                  <a:schemeClr val="tx1"/>
+                </a:solidFill>
+                <a:latin typeface="+mn-lt"/>
+                <a:ea typeface="+mn-ea"/>
+                <a:cs typeface="+mn-cs"/>
+              </a:defRPr>
+            </a:lvl8pPr>
+            <a:lvl9pPr marL="3657600" algn="l" defTabSz="457200" rtl="0" eaLnBrk="1" latinLnBrk="0" hangingPunct="1">
+              <a:defRPr sz="1800" kern="1200">
+                <a:solidFill>
+                  <a:schemeClr val="tx1"/>
+                </a:solidFill>
+                <a:latin typeface="+mn-lt"/>
+                <a:ea typeface="+mn-ea"/>
+                <a:cs typeface="+mn-cs"/>
+              </a:defRPr>
+            </a:lvl9pPr>
+          </a:lstStyle>
+          <a:p>
+            <a:pPr algn="ctr"/>
+            <a:r>
+              <a:rPr lang="en-GB" sz="1400" dirty="0"/>
+              <a:t>URL+</a:t>
+            </a:r>
+          </a:p>
+          <a:p>
+            <a:pPr algn="ctr"/>
+            <a:r>
+              <a:rPr lang="en-GB" sz="1400" dirty="0" err="1"/>
+              <a:t>Params</a:t>
+            </a:r>
+            <a:endParaRPr lang="en-GB" sz="1400" dirty="0"/>
+          </a:p>
+        </p:txBody>
+      </p:sp>
+      <p:sp>
+        <p:nvSpPr>
+          <p:cNvPr id="16" name="TextBox 17">
+            <a:extLst>
+              <a:ext uri="{FF2B5EF4-FFF2-40B4-BE49-F238E27FC236}">
+                <a16:creationId xmlns="" xmlns:a16="http://schemas.microsoft.com/office/drawing/2014/main" xmlns:lc="http://schemas.openxmlformats.org/drawingml/2006/lockedCanvas" id="{EC5B60FF-6956-4E97-BDC4-3CDF156ECA9E}"/>
+              </a:ext>
+            </a:extLst>
+          </p:cNvPr>
+          <p:cNvSpPr txBox="1"/>
+          <p:nvPr/>
+        </p:nvSpPr>
+        <p:spPr>
+          <a:xfrm>
+            <a:off x="3400863" y="3422021"/>
+            <a:ext cx="766436" cy="523220"/>
+          </a:xfrm>
+          <a:prstGeom prst="rect">
+            <a:avLst/>
+          </a:prstGeom>
+          <a:solidFill>
+            <a:schemeClr val="bg1"/>
+          </a:solidFill>
+        </p:spPr>
+        <p:txBody>
+          <a:bodyPr wrap="square" rtlCol="0">
+            <a:spAutoFit/>
+          </a:bodyPr>
+          <a:lstStyle>
+            <a:defPPr>
+              <a:defRPr lang="en-US"/>
+            </a:defPPr>
+            <a:lvl1pPr marL="0" algn="l" defTabSz="457200" rtl="0" eaLnBrk="1" latinLnBrk="0" hangingPunct="1">
+              <a:defRPr sz="1800" kern="1200">
+                <a:solidFill>
+                  <a:schemeClr val="tx1"/>
+                </a:solidFill>
+                <a:latin typeface="+mn-lt"/>
+                <a:ea typeface="+mn-ea"/>
+                <a:cs typeface="+mn-cs"/>
+              </a:defRPr>
+            </a:lvl1pPr>
+            <a:lvl2pPr marL="457200" algn="l" defTabSz="457200" rtl="0" eaLnBrk="1" latinLnBrk="0" hangingPunct="1">
+              <a:defRPr sz="1800" kern="1200">
+                <a:solidFill>
+                  <a:schemeClr val="tx1"/>
+                </a:solidFill>
+                <a:latin typeface="+mn-lt"/>
+                <a:ea typeface="+mn-ea"/>
+                <a:cs typeface="+mn-cs"/>
+              </a:defRPr>
+            </a:lvl2pPr>
+            <a:lvl3pPr marL="914400" algn="l" defTabSz="457200" rtl="0" eaLnBrk="1" latinLnBrk="0" hangingPunct="1">
+              <a:defRPr sz="1800" kern="1200">
+                <a:solidFill>
+                  <a:schemeClr val="tx1"/>
+                </a:solidFill>
+                <a:latin typeface="+mn-lt"/>
+                <a:ea typeface="+mn-ea"/>
+                <a:cs typeface="+mn-cs"/>
+              </a:defRPr>
+            </a:lvl3pPr>
+            <a:lvl4pPr marL="1371600" algn="l" defTabSz="457200" rtl="0" eaLnBrk="1" latinLnBrk="0" hangingPunct="1">
+              <a:defRPr sz="1800" kern="1200">
+                <a:solidFill>
+                  <a:schemeClr val="tx1"/>
+                </a:solidFill>
+                <a:latin typeface="+mn-lt"/>
+                <a:ea typeface="+mn-ea"/>
+                <a:cs typeface="+mn-cs"/>
+              </a:defRPr>
+            </a:lvl4pPr>
+            <a:lvl5pPr marL="1828800" algn="l" defTabSz="457200" rtl="0" eaLnBrk="1" latinLnBrk="0" hangingPunct="1">
+              <a:defRPr sz="1800" kern="1200">
+                <a:solidFill>
+                  <a:schemeClr val="tx1"/>
+                </a:solidFill>
+                <a:latin typeface="+mn-lt"/>
+                <a:ea typeface="+mn-ea"/>
+                <a:cs typeface="+mn-cs"/>
+              </a:defRPr>
+            </a:lvl5pPr>
+            <a:lvl6pPr marL="2286000" algn="l" defTabSz="457200" rtl="0" eaLnBrk="1" latinLnBrk="0" hangingPunct="1">
+              <a:defRPr sz="1800" kern="1200">
+                <a:solidFill>
+                  <a:schemeClr val="tx1"/>
+                </a:solidFill>
+                <a:latin typeface="+mn-lt"/>
+                <a:ea typeface="+mn-ea"/>
+                <a:cs typeface="+mn-cs"/>
+              </a:defRPr>
+            </a:lvl6pPr>
+            <a:lvl7pPr marL="2743200" algn="l" defTabSz="457200" rtl="0" eaLnBrk="1" latinLnBrk="0" hangingPunct="1">
+              <a:defRPr sz="1800" kern="1200">
+                <a:solidFill>
+                  <a:schemeClr val="tx1"/>
+                </a:solidFill>
+                <a:latin typeface="+mn-lt"/>
+                <a:ea typeface="+mn-ea"/>
+                <a:cs typeface="+mn-cs"/>
+              </a:defRPr>
+            </a:lvl7pPr>
+            <a:lvl8pPr marL="3200400" algn="l" defTabSz="457200" rtl="0" eaLnBrk="1" latinLnBrk="0" hangingPunct="1">
+              <a:defRPr sz="1800" kern="1200">
+                <a:solidFill>
+                  <a:schemeClr val="tx1"/>
+                </a:solidFill>
+                <a:latin typeface="+mn-lt"/>
+                <a:ea typeface="+mn-ea"/>
+                <a:cs typeface="+mn-cs"/>
+              </a:defRPr>
+            </a:lvl8pPr>
+            <a:lvl9pPr marL="3657600" algn="l" defTabSz="457200" rtl="0" eaLnBrk="1" latinLnBrk="0" hangingPunct="1">
+              <a:defRPr sz="1800" kern="1200">
+                <a:solidFill>
+                  <a:schemeClr val="tx1"/>
+                </a:solidFill>
+                <a:latin typeface="+mn-lt"/>
+                <a:ea typeface="+mn-ea"/>
+                <a:cs typeface="+mn-cs"/>
+              </a:defRPr>
+            </a:lvl9pPr>
+          </a:lstStyle>
+          <a:p>
+            <a:pPr algn="ctr"/>
+            <a:r>
+              <a:rPr lang="en-GB" sz="1400" dirty="0"/>
+              <a:t>HTML+CSS</a:t>
+            </a:r>
+          </a:p>
+        </p:txBody>
+      </p:sp>
+      <p:cxnSp>
+        <p:nvCxnSpPr>
+          <p:cNvPr id="17" name="Straight Arrow Connector 16">
+            <a:extLst>
+              <a:ext uri="{FF2B5EF4-FFF2-40B4-BE49-F238E27FC236}">
+                <a16:creationId xmlns="" xmlns:a16="http://schemas.microsoft.com/office/drawing/2014/main" xmlns:lc="http://schemas.openxmlformats.org/drawingml/2006/lockedCanvas" id="{AE7A2AB0-8ABE-4898-8B62-81D71839AB86}"/>
+              </a:ext>
+            </a:extLst>
+          </p:cNvPr>
+          <p:cNvCxnSpPr>
+            <a:cxnSpLocks/>
+          </p:cNvCxnSpPr>
+          <p:nvPr/>
+        </p:nvCxnSpPr>
+        <p:spPr>
+          <a:xfrm flipV="1">
+            <a:off x="5940080" y="2321169"/>
+            <a:ext cx="217925" cy="211015"/>
+          </a:xfrm>
+          <a:prstGeom prst="straightConnector1">
+            <a:avLst/>
+          </a:prstGeom>
+          <a:ln>
+            <a:tailEnd type="triangle"/>
+          </a:ln>
+        </p:spPr>
+        <p:style>
+          <a:lnRef idx="1">
+            <a:schemeClr val="dk1"/>
+          </a:lnRef>
+          <a:fillRef idx="0">
+            <a:schemeClr val="dk1"/>
+          </a:fillRef>
+          <a:effectRef idx="0">
+            <a:schemeClr val="dk1"/>
+          </a:effectRef>
+          <a:fontRef idx="minor">
+            <a:schemeClr val="tx1"/>
+          </a:fontRef>
+        </p:style>
+      </p:cxnSp>
+      <p:cxnSp>
+        <p:nvCxnSpPr>
+          <p:cNvPr id="18" name="Straight Arrow Connector 17">
+            <a:extLst>
+              <a:ext uri="{FF2B5EF4-FFF2-40B4-BE49-F238E27FC236}">
+                <a16:creationId xmlns="" xmlns:a16="http://schemas.microsoft.com/office/drawing/2014/main" xmlns:lc="http://schemas.openxmlformats.org/drawingml/2006/lockedCanvas" id="{5CADEF16-C162-4C87-A04B-6F9B93F3F5B7}"/>
+              </a:ext>
+            </a:extLst>
+          </p:cNvPr>
+          <p:cNvCxnSpPr>
+            <a:cxnSpLocks/>
+          </p:cNvCxnSpPr>
+          <p:nvPr/>
+        </p:nvCxnSpPr>
+        <p:spPr>
+          <a:xfrm flipH="1">
+            <a:off x="5940080" y="2606040"/>
+            <a:ext cx="583554" cy="587326"/>
+          </a:xfrm>
+          <a:prstGeom prst="straightConnector1">
+            <a:avLst/>
+          </a:prstGeom>
+          <a:ln>
+            <a:tailEnd type="triangle"/>
+          </a:ln>
+        </p:spPr>
+        <p:style>
+          <a:lnRef idx="1">
+            <a:schemeClr val="dk1"/>
+          </a:lnRef>
+          <a:fillRef idx="0">
+            <a:schemeClr val="dk1"/>
+          </a:fillRef>
+          <a:effectRef idx="0">
+            <a:schemeClr val="dk1"/>
+          </a:effectRef>
+          <a:fontRef idx="minor">
+            <a:schemeClr val="tx1"/>
+          </a:fontRef>
+        </p:style>
+      </p:cxnSp>
+      <p:cxnSp>
+        <p:nvCxnSpPr>
+          <p:cNvPr id="19" name="Straight Arrow Connector 18">
+            <a:extLst>
+              <a:ext uri="{FF2B5EF4-FFF2-40B4-BE49-F238E27FC236}">
+                <a16:creationId xmlns="" xmlns:a16="http://schemas.microsoft.com/office/drawing/2014/main" xmlns:lc="http://schemas.openxmlformats.org/drawingml/2006/lockedCanvas" id="{10184162-74F3-4537-9440-65BEB7E75D86}"/>
+              </a:ext>
+            </a:extLst>
+          </p:cNvPr>
+          <p:cNvCxnSpPr>
+            <a:cxnSpLocks/>
+          </p:cNvCxnSpPr>
+          <p:nvPr/>
+        </p:nvCxnSpPr>
+        <p:spPr>
+          <a:xfrm>
+            <a:off x="5940080" y="3787721"/>
+            <a:ext cx="422040" cy="263775"/>
+          </a:xfrm>
+          <a:prstGeom prst="straightConnector1">
+            <a:avLst/>
+          </a:prstGeom>
+          <a:ln>
+            <a:tailEnd type="triangle"/>
+          </a:ln>
+        </p:spPr>
+        <p:style>
+          <a:lnRef idx="1">
+            <a:schemeClr val="dk1"/>
+          </a:lnRef>
+          <a:fillRef idx="0">
+            <a:schemeClr val="dk1"/>
+          </a:fillRef>
+          <a:effectRef idx="0">
+            <a:schemeClr val="dk1"/>
+          </a:effectRef>
+          <a:fontRef idx="minor">
+            <a:schemeClr val="tx1"/>
+          </a:fontRef>
+        </p:style>
+      </p:cxnSp>
+      <p:cxnSp>
+        <p:nvCxnSpPr>
+          <p:cNvPr id="20" name="Straight Arrow Connector 19">
+            <a:extLst>
+              <a:ext uri="{FF2B5EF4-FFF2-40B4-BE49-F238E27FC236}">
+                <a16:creationId xmlns="" xmlns:a16="http://schemas.microsoft.com/office/drawing/2014/main" xmlns:lc="http://schemas.openxmlformats.org/drawingml/2006/lockedCanvas" id="{C0993F0E-01DC-4605-937D-F89034A76AD7}"/>
+              </a:ext>
+            </a:extLst>
+          </p:cNvPr>
+          <p:cNvCxnSpPr>
+            <a:cxnSpLocks/>
+          </p:cNvCxnSpPr>
+          <p:nvPr/>
+        </p:nvCxnSpPr>
+        <p:spPr>
+          <a:xfrm flipH="1" flipV="1">
+            <a:off x="5940080" y="4125345"/>
+            <a:ext cx="422040" cy="263776"/>
+          </a:xfrm>
+          <a:prstGeom prst="straightConnector1">
+            <a:avLst/>
+          </a:prstGeom>
+          <a:ln>
+            <a:tailEnd type="triangle"/>
+          </a:ln>
+        </p:spPr>
+        <p:style>
+          <a:lnRef idx="1">
+            <a:schemeClr val="dk1"/>
+          </a:lnRef>
+          <a:fillRef idx="0">
+            <a:schemeClr val="dk1"/>
+          </a:fillRef>
+          <a:effectRef idx="0">
+            <a:schemeClr val="dk1"/>
+          </a:effectRef>
+          <a:fontRef idx="minor">
+            <a:schemeClr val="tx1"/>
+          </a:fontRef>
+        </p:style>
+      </p:cxnSp>
+      <p:sp>
+        <p:nvSpPr>
+          <p:cNvPr id="21" name="TextBox 37">
+            <a:extLst>
+              <a:ext uri="{FF2B5EF4-FFF2-40B4-BE49-F238E27FC236}">
+                <a16:creationId xmlns="" xmlns:a16="http://schemas.microsoft.com/office/drawing/2014/main" xmlns:lc="http://schemas.openxmlformats.org/drawingml/2006/lockedCanvas" id="{A7BEE1E4-2D76-45F0-9200-84B2AE1C7997}"/>
+              </a:ext>
+            </a:extLst>
+          </p:cNvPr>
+          <p:cNvSpPr txBox="1"/>
+          <p:nvPr/>
+        </p:nvSpPr>
+        <p:spPr>
+          <a:xfrm>
+            <a:off x="5940080" y="3590773"/>
+            <a:ext cx="2858731" cy="307777"/>
+          </a:xfrm>
+          <a:prstGeom prst="rect">
+            <a:avLst/>
+          </a:prstGeom>
+          <a:noFill/>
+        </p:spPr>
+        <p:txBody>
+          <a:bodyPr wrap="none" rtlCol="0">
+            <a:spAutoFit/>
+          </a:bodyPr>
+          <a:lstStyle>
+            <a:defPPr>
+              <a:defRPr lang="en-US"/>
+            </a:defPPr>
+            <a:lvl1pPr marL="0" algn="l" defTabSz="457200" rtl="0" eaLnBrk="1" latinLnBrk="0" hangingPunct="1">
+              <a:defRPr sz="1800" kern="1200">
+                <a:solidFill>
+                  <a:schemeClr val="tx1"/>
+                </a:solidFill>
+                <a:latin typeface="+mn-lt"/>
+                <a:ea typeface="+mn-ea"/>
+                <a:cs typeface="+mn-cs"/>
+              </a:defRPr>
+            </a:lvl1pPr>
+            <a:lvl2pPr marL="457200" algn="l" defTabSz="457200" rtl="0" eaLnBrk="1" latinLnBrk="0" hangingPunct="1">
+              <a:defRPr sz="1800" kern="1200">
+                <a:solidFill>
+                  <a:schemeClr val="tx1"/>
+                </a:solidFill>
+                <a:latin typeface="+mn-lt"/>
+                <a:ea typeface="+mn-ea"/>
+                <a:cs typeface="+mn-cs"/>
+              </a:defRPr>
+            </a:lvl2pPr>
+            <a:lvl3pPr marL="914400" algn="l" defTabSz="457200" rtl="0" eaLnBrk="1" latinLnBrk="0" hangingPunct="1">
+              <a:defRPr sz="1800" kern="1200">
+                <a:solidFill>
+                  <a:schemeClr val="tx1"/>
+                </a:solidFill>
+                <a:latin typeface="+mn-lt"/>
+                <a:ea typeface="+mn-ea"/>
+                <a:cs typeface="+mn-cs"/>
+              </a:defRPr>
+            </a:lvl3pPr>
+            <a:lvl4pPr marL="1371600" algn="l" defTabSz="457200" rtl="0" eaLnBrk="1" latinLnBrk="0" hangingPunct="1">
+              <a:defRPr sz="1800" kern="1200">
+                <a:solidFill>
+                  <a:schemeClr val="tx1"/>
+                </a:solidFill>
+                <a:latin typeface="+mn-lt"/>
+                <a:ea typeface="+mn-ea"/>
+                <a:cs typeface="+mn-cs"/>
+              </a:defRPr>
+            </a:lvl4pPr>
+            <a:lvl5pPr marL="1828800" algn="l" defTabSz="457200" rtl="0" eaLnBrk="1" latinLnBrk="0" hangingPunct="1">
+              <a:defRPr sz="1800" kern="1200">
+                <a:solidFill>
+                  <a:schemeClr val="tx1"/>
+                </a:solidFill>
+                <a:latin typeface="+mn-lt"/>
+                <a:ea typeface="+mn-ea"/>
+                <a:cs typeface="+mn-cs"/>
+              </a:defRPr>
+            </a:lvl5pPr>
+            <a:lvl6pPr marL="2286000" algn="l" defTabSz="457200" rtl="0" eaLnBrk="1" latinLnBrk="0" hangingPunct="1">
+              <a:defRPr sz="1800" kern="1200">
+                <a:solidFill>
+                  <a:schemeClr val="tx1"/>
+                </a:solidFill>
+                <a:latin typeface="+mn-lt"/>
+                <a:ea typeface="+mn-ea"/>
+                <a:cs typeface="+mn-cs"/>
+              </a:defRPr>
+            </a:lvl6pPr>
+            <a:lvl7pPr marL="2743200" algn="l" defTabSz="457200" rtl="0" eaLnBrk="1" latinLnBrk="0" hangingPunct="1">
+              <a:defRPr sz="1800" kern="1200">
+                <a:solidFill>
+                  <a:schemeClr val="tx1"/>
+                </a:solidFill>
+                <a:latin typeface="+mn-lt"/>
+                <a:ea typeface="+mn-ea"/>
+                <a:cs typeface="+mn-cs"/>
+              </a:defRPr>
+            </a:lvl7pPr>
+            <a:lvl8pPr marL="3200400" algn="l" defTabSz="457200" rtl="0" eaLnBrk="1" latinLnBrk="0" hangingPunct="1">
+              <a:defRPr sz="1800" kern="1200">
+                <a:solidFill>
+                  <a:schemeClr val="tx1"/>
+                </a:solidFill>
+                <a:latin typeface="+mn-lt"/>
+                <a:ea typeface="+mn-ea"/>
+                <a:cs typeface="+mn-cs"/>
+              </a:defRPr>
+            </a:lvl8pPr>
+            <a:lvl9pPr marL="3657600" algn="l" defTabSz="457200" rtl="0" eaLnBrk="1" latinLnBrk="0" hangingPunct="1">
+              <a:defRPr sz="1800" kern="1200">
+                <a:solidFill>
+                  <a:schemeClr val="tx1"/>
+                </a:solidFill>
+                <a:latin typeface="+mn-lt"/>
+                <a:ea typeface="+mn-ea"/>
+                <a:cs typeface="+mn-cs"/>
+              </a:defRPr>
+            </a:lvl9pPr>
+          </a:lstStyle>
+          <a:p>
+            <a:r>
+              <a:rPr lang="en-GB" sz="1400" dirty="0"/>
+              <a:t>Request models from search criteria </a:t>
+            </a:r>
+          </a:p>
+        </p:txBody>
+      </p:sp>
+      <p:sp>
+        <p:nvSpPr>
+          <p:cNvPr id="22" name="TextBox 38">
+            <a:extLst>
+              <a:ext uri="{FF2B5EF4-FFF2-40B4-BE49-F238E27FC236}">
+                <a16:creationId xmlns="" xmlns:a16="http://schemas.microsoft.com/office/drawing/2014/main" xmlns:lc="http://schemas.openxmlformats.org/drawingml/2006/lockedCanvas" id="{0E25F410-5105-4FD8-AFC9-9FB88EB97FFC}"/>
+              </a:ext>
+            </a:extLst>
+          </p:cNvPr>
+          <p:cNvSpPr txBox="1"/>
+          <p:nvPr/>
+        </p:nvSpPr>
+        <p:spPr>
+          <a:xfrm>
+            <a:off x="4649535" y="4262513"/>
+            <a:ext cx="1712585" cy="307777"/>
+          </a:xfrm>
+          <a:prstGeom prst="rect">
+            <a:avLst/>
+          </a:prstGeom>
+          <a:noFill/>
+        </p:spPr>
+        <p:txBody>
+          <a:bodyPr wrap="none" rtlCol="0">
+            <a:spAutoFit/>
+          </a:bodyPr>
+          <a:lstStyle>
+            <a:defPPr>
+              <a:defRPr lang="en-US"/>
+            </a:defPPr>
+            <a:lvl1pPr marL="0" algn="l" defTabSz="457200" rtl="0" eaLnBrk="1" latinLnBrk="0" hangingPunct="1">
+              <a:defRPr sz="1800" kern="1200">
+                <a:solidFill>
+                  <a:schemeClr val="tx1"/>
+                </a:solidFill>
+                <a:latin typeface="+mn-lt"/>
+                <a:ea typeface="+mn-ea"/>
+                <a:cs typeface="+mn-cs"/>
+              </a:defRPr>
+            </a:lvl1pPr>
+            <a:lvl2pPr marL="457200" algn="l" defTabSz="457200" rtl="0" eaLnBrk="1" latinLnBrk="0" hangingPunct="1">
+              <a:defRPr sz="1800" kern="1200">
+                <a:solidFill>
+                  <a:schemeClr val="tx1"/>
+                </a:solidFill>
+                <a:latin typeface="+mn-lt"/>
+                <a:ea typeface="+mn-ea"/>
+                <a:cs typeface="+mn-cs"/>
+              </a:defRPr>
+            </a:lvl2pPr>
+            <a:lvl3pPr marL="914400" algn="l" defTabSz="457200" rtl="0" eaLnBrk="1" latinLnBrk="0" hangingPunct="1">
+              <a:defRPr sz="1800" kern="1200">
+                <a:solidFill>
+                  <a:schemeClr val="tx1"/>
+                </a:solidFill>
+                <a:latin typeface="+mn-lt"/>
+                <a:ea typeface="+mn-ea"/>
+                <a:cs typeface="+mn-cs"/>
+              </a:defRPr>
+            </a:lvl3pPr>
+            <a:lvl4pPr marL="1371600" algn="l" defTabSz="457200" rtl="0" eaLnBrk="1" latinLnBrk="0" hangingPunct="1">
+              <a:defRPr sz="1800" kern="1200">
+                <a:solidFill>
+                  <a:schemeClr val="tx1"/>
+                </a:solidFill>
+                <a:latin typeface="+mn-lt"/>
+                <a:ea typeface="+mn-ea"/>
+                <a:cs typeface="+mn-cs"/>
+              </a:defRPr>
+            </a:lvl4pPr>
+            <a:lvl5pPr marL="1828800" algn="l" defTabSz="457200" rtl="0" eaLnBrk="1" latinLnBrk="0" hangingPunct="1">
+              <a:defRPr sz="1800" kern="1200">
+                <a:solidFill>
+                  <a:schemeClr val="tx1"/>
+                </a:solidFill>
+                <a:latin typeface="+mn-lt"/>
+                <a:ea typeface="+mn-ea"/>
+                <a:cs typeface="+mn-cs"/>
+              </a:defRPr>
+            </a:lvl5pPr>
+            <a:lvl6pPr marL="2286000" algn="l" defTabSz="457200" rtl="0" eaLnBrk="1" latinLnBrk="0" hangingPunct="1">
+              <a:defRPr sz="1800" kern="1200">
+                <a:solidFill>
+                  <a:schemeClr val="tx1"/>
+                </a:solidFill>
+                <a:latin typeface="+mn-lt"/>
+                <a:ea typeface="+mn-ea"/>
+                <a:cs typeface="+mn-cs"/>
+              </a:defRPr>
+            </a:lvl6pPr>
+            <a:lvl7pPr marL="2743200" algn="l" defTabSz="457200" rtl="0" eaLnBrk="1" latinLnBrk="0" hangingPunct="1">
+              <a:defRPr sz="1800" kern="1200">
+                <a:solidFill>
+                  <a:schemeClr val="tx1"/>
+                </a:solidFill>
+                <a:latin typeface="+mn-lt"/>
+                <a:ea typeface="+mn-ea"/>
+                <a:cs typeface="+mn-cs"/>
+              </a:defRPr>
+            </a:lvl7pPr>
+            <a:lvl8pPr marL="3200400" algn="l" defTabSz="457200" rtl="0" eaLnBrk="1" latinLnBrk="0" hangingPunct="1">
+              <a:defRPr sz="1800" kern="1200">
+                <a:solidFill>
+                  <a:schemeClr val="tx1"/>
+                </a:solidFill>
+                <a:latin typeface="+mn-lt"/>
+                <a:ea typeface="+mn-ea"/>
+                <a:cs typeface="+mn-cs"/>
+              </a:defRPr>
+            </a:lvl8pPr>
+            <a:lvl9pPr marL="3657600" algn="l" defTabSz="457200" rtl="0" eaLnBrk="1" latinLnBrk="0" hangingPunct="1">
+              <a:defRPr sz="1800" kern="1200">
+                <a:solidFill>
+                  <a:schemeClr val="tx1"/>
+                </a:solidFill>
+                <a:latin typeface="+mn-lt"/>
+                <a:ea typeface="+mn-ea"/>
+                <a:cs typeface="+mn-cs"/>
+              </a:defRPr>
+            </a:lvl9pPr>
+          </a:lstStyle>
+          <a:p>
+            <a:r>
+              <a:rPr lang="en-GB" sz="1400" dirty="0"/>
+              <a:t>Required model data</a:t>
+            </a:r>
+          </a:p>
+        </p:txBody>
+      </p:sp>
+      <p:sp>
+        <p:nvSpPr>
+          <p:cNvPr id="23" name="TextBox 39">
+            <a:extLst>
+              <a:ext uri="{FF2B5EF4-FFF2-40B4-BE49-F238E27FC236}">
+                <a16:creationId xmlns="" xmlns:a16="http://schemas.microsoft.com/office/drawing/2014/main" xmlns:lc="http://schemas.openxmlformats.org/drawingml/2006/lockedCanvas" id="{6A0D94D3-5211-4295-AA8D-84628DCA26EB}"/>
+              </a:ext>
+            </a:extLst>
+          </p:cNvPr>
+          <p:cNvSpPr txBox="1"/>
+          <p:nvPr/>
+        </p:nvSpPr>
+        <p:spPr>
+          <a:xfrm>
+            <a:off x="4509770" y="2197126"/>
+            <a:ext cx="1613199" cy="307777"/>
+          </a:xfrm>
+          <a:prstGeom prst="rect">
+            <a:avLst/>
+          </a:prstGeom>
+          <a:noFill/>
+        </p:spPr>
+        <p:txBody>
+          <a:bodyPr wrap="none" rtlCol="0">
+            <a:spAutoFit/>
+          </a:bodyPr>
+          <a:lstStyle>
+            <a:defPPr>
+              <a:defRPr lang="en-US"/>
+            </a:defPPr>
+            <a:lvl1pPr marL="0" algn="l" defTabSz="457200" rtl="0" eaLnBrk="1" latinLnBrk="0" hangingPunct="1">
+              <a:defRPr sz="1800" kern="1200">
+                <a:solidFill>
+                  <a:schemeClr val="tx1"/>
+                </a:solidFill>
+                <a:latin typeface="+mn-lt"/>
+                <a:ea typeface="+mn-ea"/>
+                <a:cs typeface="+mn-cs"/>
+              </a:defRPr>
+            </a:lvl1pPr>
+            <a:lvl2pPr marL="457200" algn="l" defTabSz="457200" rtl="0" eaLnBrk="1" latinLnBrk="0" hangingPunct="1">
+              <a:defRPr sz="1800" kern="1200">
+                <a:solidFill>
+                  <a:schemeClr val="tx1"/>
+                </a:solidFill>
+                <a:latin typeface="+mn-lt"/>
+                <a:ea typeface="+mn-ea"/>
+                <a:cs typeface="+mn-cs"/>
+              </a:defRPr>
+            </a:lvl2pPr>
+            <a:lvl3pPr marL="914400" algn="l" defTabSz="457200" rtl="0" eaLnBrk="1" latinLnBrk="0" hangingPunct="1">
+              <a:defRPr sz="1800" kern="1200">
+                <a:solidFill>
+                  <a:schemeClr val="tx1"/>
+                </a:solidFill>
+                <a:latin typeface="+mn-lt"/>
+                <a:ea typeface="+mn-ea"/>
+                <a:cs typeface="+mn-cs"/>
+              </a:defRPr>
+            </a:lvl3pPr>
+            <a:lvl4pPr marL="1371600" algn="l" defTabSz="457200" rtl="0" eaLnBrk="1" latinLnBrk="0" hangingPunct="1">
+              <a:defRPr sz="1800" kern="1200">
+                <a:solidFill>
+                  <a:schemeClr val="tx1"/>
+                </a:solidFill>
+                <a:latin typeface="+mn-lt"/>
+                <a:ea typeface="+mn-ea"/>
+                <a:cs typeface="+mn-cs"/>
+              </a:defRPr>
+            </a:lvl4pPr>
+            <a:lvl5pPr marL="1828800" algn="l" defTabSz="457200" rtl="0" eaLnBrk="1" latinLnBrk="0" hangingPunct="1">
+              <a:defRPr sz="1800" kern="1200">
+                <a:solidFill>
+                  <a:schemeClr val="tx1"/>
+                </a:solidFill>
+                <a:latin typeface="+mn-lt"/>
+                <a:ea typeface="+mn-ea"/>
+                <a:cs typeface="+mn-cs"/>
+              </a:defRPr>
+            </a:lvl5pPr>
+            <a:lvl6pPr marL="2286000" algn="l" defTabSz="457200" rtl="0" eaLnBrk="1" latinLnBrk="0" hangingPunct="1">
+              <a:defRPr sz="1800" kern="1200">
+                <a:solidFill>
+                  <a:schemeClr val="tx1"/>
+                </a:solidFill>
+                <a:latin typeface="+mn-lt"/>
+                <a:ea typeface="+mn-ea"/>
+                <a:cs typeface="+mn-cs"/>
+              </a:defRPr>
+            </a:lvl6pPr>
+            <a:lvl7pPr marL="2743200" algn="l" defTabSz="457200" rtl="0" eaLnBrk="1" latinLnBrk="0" hangingPunct="1">
+              <a:defRPr sz="1800" kern="1200">
+                <a:solidFill>
+                  <a:schemeClr val="tx1"/>
+                </a:solidFill>
+                <a:latin typeface="+mn-lt"/>
+                <a:ea typeface="+mn-ea"/>
+                <a:cs typeface="+mn-cs"/>
+              </a:defRPr>
+            </a:lvl7pPr>
+            <a:lvl8pPr marL="3200400" algn="l" defTabSz="457200" rtl="0" eaLnBrk="1" latinLnBrk="0" hangingPunct="1">
+              <a:defRPr sz="1800" kern="1200">
+                <a:solidFill>
+                  <a:schemeClr val="tx1"/>
+                </a:solidFill>
+                <a:latin typeface="+mn-lt"/>
+                <a:ea typeface="+mn-ea"/>
+                <a:cs typeface="+mn-cs"/>
+              </a:defRPr>
+            </a:lvl8pPr>
+            <a:lvl9pPr marL="3657600" algn="l" defTabSz="457200" rtl="0" eaLnBrk="1" latinLnBrk="0" hangingPunct="1">
+              <a:defRPr sz="1800" kern="1200">
+                <a:solidFill>
+                  <a:schemeClr val="tx1"/>
+                </a:solidFill>
+                <a:latin typeface="+mn-lt"/>
+                <a:ea typeface="+mn-ea"/>
+                <a:cs typeface="+mn-cs"/>
+              </a:defRPr>
+            </a:lvl9pPr>
+          </a:lstStyle>
+          <a:p>
+            <a:r>
+              <a:rPr lang="en-GB" sz="1400" dirty="0"/>
+              <a:t>Post search request</a:t>
+            </a:r>
+          </a:p>
+        </p:txBody>
+      </p:sp>
+      <p:sp>
+        <p:nvSpPr>
+          <p:cNvPr id="24" name="TextBox 40">
+            <a:extLst>
+              <a:ext uri="{FF2B5EF4-FFF2-40B4-BE49-F238E27FC236}">
+                <a16:creationId xmlns="" xmlns:a16="http://schemas.microsoft.com/office/drawing/2014/main" xmlns:lc="http://schemas.openxmlformats.org/drawingml/2006/lockedCanvas" id="{1BB2ACFD-E294-4943-ACE3-7ABC7F7A8E52}"/>
+              </a:ext>
+            </a:extLst>
+          </p:cNvPr>
+          <p:cNvSpPr txBox="1"/>
+          <p:nvPr/>
+        </p:nvSpPr>
+        <p:spPr>
+          <a:xfrm>
+            <a:off x="6140263" y="2862775"/>
+            <a:ext cx="2711833" cy="307777"/>
+          </a:xfrm>
+          <a:prstGeom prst="rect">
+            <a:avLst/>
+          </a:prstGeom>
+          <a:noFill/>
+        </p:spPr>
+        <p:txBody>
+          <a:bodyPr wrap="none" rtlCol="0">
+            <a:spAutoFit/>
+          </a:bodyPr>
+          <a:lstStyle>
+            <a:defPPr>
+              <a:defRPr lang="en-US"/>
+            </a:defPPr>
+            <a:lvl1pPr marL="0" algn="l" defTabSz="457200" rtl="0" eaLnBrk="1" latinLnBrk="0" hangingPunct="1">
+              <a:defRPr sz="1800" kern="1200">
+                <a:solidFill>
+                  <a:schemeClr val="tx1"/>
+                </a:solidFill>
+                <a:latin typeface="+mn-lt"/>
+                <a:ea typeface="+mn-ea"/>
+                <a:cs typeface="+mn-cs"/>
+              </a:defRPr>
+            </a:lvl1pPr>
+            <a:lvl2pPr marL="457200" algn="l" defTabSz="457200" rtl="0" eaLnBrk="1" latinLnBrk="0" hangingPunct="1">
+              <a:defRPr sz="1800" kern="1200">
+                <a:solidFill>
+                  <a:schemeClr val="tx1"/>
+                </a:solidFill>
+                <a:latin typeface="+mn-lt"/>
+                <a:ea typeface="+mn-ea"/>
+                <a:cs typeface="+mn-cs"/>
+              </a:defRPr>
+            </a:lvl2pPr>
+            <a:lvl3pPr marL="914400" algn="l" defTabSz="457200" rtl="0" eaLnBrk="1" latinLnBrk="0" hangingPunct="1">
+              <a:defRPr sz="1800" kern="1200">
+                <a:solidFill>
+                  <a:schemeClr val="tx1"/>
+                </a:solidFill>
+                <a:latin typeface="+mn-lt"/>
+                <a:ea typeface="+mn-ea"/>
+                <a:cs typeface="+mn-cs"/>
+              </a:defRPr>
+            </a:lvl3pPr>
+            <a:lvl4pPr marL="1371600" algn="l" defTabSz="457200" rtl="0" eaLnBrk="1" latinLnBrk="0" hangingPunct="1">
+              <a:defRPr sz="1800" kern="1200">
+                <a:solidFill>
+                  <a:schemeClr val="tx1"/>
+                </a:solidFill>
+                <a:latin typeface="+mn-lt"/>
+                <a:ea typeface="+mn-ea"/>
+                <a:cs typeface="+mn-cs"/>
+              </a:defRPr>
+            </a:lvl4pPr>
+            <a:lvl5pPr marL="1828800" algn="l" defTabSz="457200" rtl="0" eaLnBrk="1" latinLnBrk="0" hangingPunct="1">
+              <a:defRPr sz="1800" kern="1200">
+                <a:solidFill>
+                  <a:schemeClr val="tx1"/>
+                </a:solidFill>
+                <a:latin typeface="+mn-lt"/>
+                <a:ea typeface="+mn-ea"/>
+                <a:cs typeface="+mn-cs"/>
+              </a:defRPr>
+            </a:lvl5pPr>
+            <a:lvl6pPr marL="2286000" algn="l" defTabSz="457200" rtl="0" eaLnBrk="1" latinLnBrk="0" hangingPunct="1">
+              <a:defRPr sz="1800" kern="1200">
+                <a:solidFill>
+                  <a:schemeClr val="tx1"/>
+                </a:solidFill>
+                <a:latin typeface="+mn-lt"/>
+                <a:ea typeface="+mn-ea"/>
+                <a:cs typeface="+mn-cs"/>
+              </a:defRPr>
+            </a:lvl6pPr>
+            <a:lvl7pPr marL="2743200" algn="l" defTabSz="457200" rtl="0" eaLnBrk="1" latinLnBrk="0" hangingPunct="1">
+              <a:defRPr sz="1800" kern="1200">
+                <a:solidFill>
+                  <a:schemeClr val="tx1"/>
+                </a:solidFill>
+                <a:latin typeface="+mn-lt"/>
+                <a:ea typeface="+mn-ea"/>
+                <a:cs typeface="+mn-cs"/>
+              </a:defRPr>
+            </a:lvl7pPr>
+            <a:lvl8pPr marL="3200400" algn="l" defTabSz="457200" rtl="0" eaLnBrk="1" latinLnBrk="0" hangingPunct="1">
+              <a:defRPr sz="1800" kern="1200">
+                <a:solidFill>
+                  <a:schemeClr val="tx1"/>
+                </a:solidFill>
+                <a:latin typeface="+mn-lt"/>
+                <a:ea typeface="+mn-ea"/>
+                <a:cs typeface="+mn-cs"/>
+              </a:defRPr>
+            </a:lvl8pPr>
+            <a:lvl9pPr marL="3657600" algn="l" defTabSz="457200" rtl="0" eaLnBrk="1" latinLnBrk="0" hangingPunct="1">
+              <a:defRPr sz="1800" kern="1200">
+                <a:solidFill>
+                  <a:schemeClr val="tx1"/>
+                </a:solidFill>
+                <a:latin typeface="+mn-lt"/>
+                <a:ea typeface="+mn-ea"/>
+                <a:cs typeface="+mn-cs"/>
+              </a:defRPr>
+            </a:lvl9pPr>
+          </a:lstStyle>
+          <a:p>
+            <a:r>
+              <a:rPr lang="en-GB" sz="1400" dirty="0"/>
+              <a:t>Location/search data in map form</a:t>
+            </a:r>
           </a:p>
         </p:txBody>
       </p:sp>

</xml_diff>

<commit_message>
State of ppt as submitted
</commit_message>
<xml_diff>
--- a/design_spec/design_specification.pptx
+++ b/design_spec/design_specification.pptx
@@ -3092,13 +3092,13 @@
           <a:p>
             <a:r>
               <a:rPr lang="en-GB" sz="2000" dirty="0" smtClean="0"/>
-              <a:t>Iain Christie- 2199288c</a:t>
+              <a:t>Iain Christie - 2199288C</a:t>
             </a:r>
           </a:p>
           <a:p>
             <a:r>
               <a:rPr lang="en-GB" sz="2000" dirty="0" smtClean="0"/>
-              <a:t>Sam George – 2261522G</a:t>
+              <a:t>Sam George - 2261522G</a:t>
             </a:r>
           </a:p>
           <a:p>
@@ -3112,7 +3112,7 @@
             </a:r>
             <a:r>
               <a:rPr lang="en-GB" sz="2000" dirty="0" smtClean="0"/>
-              <a:t> – 2247156K</a:t>
+              <a:t> - 2247156K</a:t>
             </a:r>
           </a:p>
           <a:p>
@@ -3129,8 +3129,12 @@
               <a:t>Lindorfer</a:t>
             </a:r>
             <a:r>
+              <a:rPr lang="en-GB" sz="2000" smtClean="0"/>
+              <a:t> - </a:t>
+            </a:r>
+            <a:r>
               <a:rPr lang="en-GB" sz="2000" dirty="0" smtClean="0"/>
-              <a:t> – 2265846L</a:t>
+              <a:t>2265846L</a:t>
             </a:r>
           </a:p>
           <a:p>
@@ -3593,7 +3597,7 @@
       </p:sp>
       <p:pic>
         <p:nvPicPr>
-          <p:cNvPr id="3" name="Picture 2"/>
+          <p:cNvPr id="5" name="Picture 4"/>
           <p:cNvPicPr>
             <a:picLocks noChangeAspect="1"/>
           </p:cNvPicPr>
@@ -3613,8 +3617,8 @@
         </p:blipFill>
         <p:spPr>
           <a:xfrm>
-            <a:off x="333375" y="1316665"/>
-            <a:ext cx="8477250" cy="5153025"/>
+            <a:off x="0" y="1525130"/>
+            <a:ext cx="9144000" cy="3807739"/>
           </a:xfrm>
           <a:prstGeom prst="rect">
             <a:avLst/>
@@ -3631,6 +3635,13 @@
   <p:clrMapOvr>
     <a:masterClrMapping/>
   </p:clrMapOvr>
+  <p:timing>
+    <p:tnLst>
+      <p:par>
+        <p:cTn id="1" dur="indefinite" restart="never" nodeType="tmRoot"/>
+      </p:par>
+    </p:tnLst>
+  </p:timing>
 </p:sld>
 </file>
 
@@ -3713,27 +3724,14 @@
             </a:r>
             <a:r>
               <a:rPr lang="en-GB" dirty="0" smtClean="0"/>
-              <a:t> of event, category, </a:t>
-            </a:r>
+              <a:t> of event, category, location, friends attending etc.</a:t>
+            </a:r>
+          </a:p>
+          <a:p>
             <a:r>
               <a:rPr lang="en-GB" dirty="0" smtClean="0"/>
-              <a:t>location, friends attending </a:t>
-            </a:r>
-            <a:r>
-              <a:rPr lang="en-GB" dirty="0" smtClean="0"/>
-              <a:t>etc.</a:t>
-            </a:r>
-          </a:p>
-          <a:p>
-            <a:r>
-              <a:rPr lang="en-GB" dirty="0" smtClean="0"/>
-              <a:t>Users that are logged in are able to create </a:t>
-            </a:r>
-            <a:r>
-              <a:rPr lang="en-GB" dirty="0" smtClean="0"/>
-              <a:t>and edit their events. </a:t>
-            </a:r>
-            <a:endParaRPr lang="en-GB" dirty="0" smtClean="0"/>
+              <a:t>Users that are logged in are able to create and edit their events. </a:t>
+            </a:r>
           </a:p>
           <a:p>
             <a:r>
@@ -4047,15 +4045,7 @@
           <a:p>
             <a:r>
               <a:rPr lang="en-GB" dirty="0" smtClean="0"/>
-              <a:t>Doesn’t </a:t>
-            </a:r>
-            <a:r>
-              <a:rPr lang="en-GB" dirty="0" smtClean="0"/>
-              <a:t>handle verbal directions well due to language barrier so </a:t>
-            </a:r>
-            <a:r>
-              <a:rPr lang="en-GB" dirty="0" smtClean="0"/>
-              <a:t>has gotten lost</a:t>
+              <a:t>Doesn’t handle verbal directions well due to language barrier so has gotten lost</a:t>
             </a:r>
           </a:p>
           <a:p>
@@ -4341,6 +4331,13 @@
   <p:clrMapOvr>
     <a:masterClrMapping/>
   </p:clrMapOvr>
+  <p:timing>
+    <p:tnLst>
+      <p:par>
+        <p:cTn id="1" dur="indefinite" restart="never" nodeType="tmRoot"/>
+      </p:par>
+    </p:tnLst>
+  </p:timing>
 </p:sld>
 </file>
 
@@ -6634,6 +6631,13 @@
   <p:clrMapOvr>
     <a:masterClrMapping/>
   </p:clrMapOvr>
+  <p:timing>
+    <p:tnLst>
+      <p:par>
+        <p:cTn id="1" dur="indefinite" restart="never" nodeType="tmRoot"/>
+      </p:par>
+    </p:tnLst>
+  </p:timing>
 </p:sld>
 </file>
 
@@ -7834,6 +7838,13 @@
   <p:clrMapOvr>
     <a:masterClrMapping/>
   </p:clrMapOvr>
+  <p:timing>
+    <p:tnLst>
+      <p:par>
+        <p:cTn id="1" dur="indefinite" restart="never" nodeType="tmRoot"/>
+      </p:par>
+    </p:tnLst>
+  </p:timing>
 </p:sld>
 </file>
 

</xml_diff>